<commit_message>
Added SHAP results to presentation
</commit_message>
<xml_diff>
--- a/Hotel_Cancel_Culture_Presentation.pptx
+++ b/Hotel_Cancel_Culture_Presentation.pptx
@@ -5,7 +5,7 @@
     <p:sldMasterId id="2147483659" r:id="rId1"/>
   </p:sldMasterIdLst>
   <p:notesMasterIdLst>
-    <p:notesMasterId r:id="rId16"/>
+    <p:notesMasterId r:id="rId19"/>
   </p:notesMasterIdLst>
   <p:sldIdLst>
     <p:sldId id="256" r:id="rId2"/>
@@ -16,24 +16,27 @@
     <p:sldId id="259" r:id="rId7"/>
     <p:sldId id="260" r:id="rId8"/>
     <p:sldId id="261" r:id="rId9"/>
-    <p:sldId id="262" r:id="rId10"/>
-    <p:sldId id="263" r:id="rId11"/>
-    <p:sldId id="264" r:id="rId12"/>
-    <p:sldId id="265" r:id="rId13"/>
-    <p:sldId id="266" r:id="rId14"/>
-    <p:sldId id="267" r:id="rId15"/>
+    <p:sldId id="275" r:id="rId10"/>
+    <p:sldId id="270" r:id="rId11"/>
+    <p:sldId id="274" r:id="rId12"/>
+    <p:sldId id="264" r:id="rId13"/>
+    <p:sldId id="271" r:id="rId14"/>
+    <p:sldId id="265" r:id="rId15"/>
+    <p:sldId id="273" r:id="rId16"/>
+    <p:sldId id="266" r:id="rId17"/>
+    <p:sldId id="267" r:id="rId18"/>
   </p:sldIdLst>
   <p:sldSz cx="9144000" cy="5143500" type="screen16x9"/>
   <p:notesSz cx="6858000" cy="9144000"/>
   <p:embeddedFontLst>
     <p:embeddedFont>
       <p:font typeface="Average" panose="020B0604020202020204" charset="0"/>
-      <p:regular r:id="rId17"/>
+      <p:regular r:id="rId20"/>
     </p:embeddedFont>
     <p:embeddedFont>
       <p:font typeface="Oswald" panose="00000500000000000000" pitchFamily="2" charset="0"/>
-      <p:regular r:id="rId18"/>
-      <p:bold r:id="rId19"/>
+      <p:regular r:id="rId21"/>
+      <p:bold r:id="rId22"/>
     </p:embeddedFont>
   </p:embeddedFontLst>
   <p:defaultTextStyle>
@@ -282,6 +285,32 @@
     </p:ext>
   </p:extLst>
 </p:presentation>
+</file>
+
+<file path=ppt/commentAuthors.xml><?xml version="1.0" encoding="utf-8"?>
+<p:cmAuthorLst xmlns:a="http://schemas.openxmlformats.org/drawingml/2006/main" xmlns:r="http://schemas.openxmlformats.org/officeDocument/2006/relationships" xmlns:p="http://schemas.openxmlformats.org/presentationml/2006/main">
+  <p:cmAuthor id="1" name="Benjamin McCarty" initials="BM" lastIdx="1" clrIdx="0">
+    <p:extLst>
+      <p:ext uri="{19B8F6BF-5375-455C-9EA6-DF929625EA0E}">
+        <p15:presenceInfo xmlns:p15="http://schemas.microsoft.com/office/powerpoint/2012/main" userId="21987de3918af3ed" providerId="Windows Live"/>
+      </p:ext>
+    </p:extLst>
+  </p:cmAuthor>
+</p:cmAuthorLst>
+</file>
+
+<file path=ppt/comments/comment1.xml><?xml version="1.0" encoding="utf-8"?>
+<p:cmLst xmlns:a="http://schemas.openxmlformats.org/drawingml/2006/main" xmlns:r="http://schemas.openxmlformats.org/officeDocument/2006/relationships" xmlns:p="http://schemas.openxmlformats.org/presentationml/2006/main">
+  <p:cm authorId="1" dt="2021-09-14T14:16:21.873" idx="1">
+    <p:pos x="10" y="10"/>
+    <p:text/>
+    <p:extLst>
+      <p:ext uri="{C676402C-5697-4E1C-873F-D02D1690AC5C}">
+        <p15:threadingInfo xmlns:p15="http://schemas.microsoft.com/office/powerpoint/2012/main" timeZoneBias="240"/>
+      </p:ext>
+    </p:extLst>
+  </p:cm>
+</p:cmLst>
 </file>
 
 <file path=ppt/notesMasters/notesMaster1.xml><?xml version="1.0" encoding="utf-8"?>
@@ -838,7 +867,7 @@
   <p:cSld>
     <p:spTree>
       <p:nvGrpSpPr>
-        <p:cNvPr id="1" name="Shape 121"/>
+        <p:cNvPr id="1" name="Shape 141"/>
         <p:cNvGrpSpPr/>
         <p:nvPr/>
       </p:nvGrpSpPr>
@@ -852,7 +881,7 @@
       </p:grpSpPr>
       <p:sp>
         <p:nvSpPr>
-          <p:cNvPr id="122" name="Google Shape;122;gee781a16f1_0_0:notes"/>
+          <p:cNvPr id="142" name="Google Shape;142;geb8773136e_0_17:notes"/>
           <p:cNvSpPr>
             <a:spLocks noGrp="1" noRot="1" noChangeAspect="1"/>
           </p:cNvSpPr>
@@ -893,7 +922,7 @@
       </p:sp>
       <p:sp>
         <p:nvSpPr>
-          <p:cNvPr id="123" name="Google Shape;123;gee781a16f1_0_0:notes"/>
+          <p:cNvPr id="143" name="Google Shape;143;geb8773136e_0_17:notes"/>
           <p:cNvSpPr txBox="1">
             <a:spLocks noGrp="1"/>
           </p:cNvSpPr>
@@ -927,13 +956,18 @@
             </a:pPr>
             <a:r>
               <a:rPr lang="en-US" dirty="0"/>
-              <a:t># cars may not be known</a:t>
+              <a:t>Laser pointer helpful!!</a:t>
             </a:r>
             <a:endParaRPr dirty="0"/>
           </a:p>
         </p:txBody>
       </p:sp>
     </p:spTree>
+    <p:extLst>
+      <p:ext uri="{BB962C8B-B14F-4D97-AF65-F5344CB8AC3E}">
+        <p14:creationId xmlns:p14="http://schemas.microsoft.com/office/powerpoint/2010/main" val="3802580768"/>
+      </p:ext>
+    </p:extLst>
   </p:cSld>
   <p:clrMapOvr>
     <a:masterClrMapping/>
@@ -942,6 +976,118 @@
 </file>
 
 <file path=ppt/notesSlides/notesSlide11.xml><?xml version="1.0" encoding="utf-8"?>
+<p:notes xmlns:a="http://schemas.openxmlformats.org/drawingml/2006/main" xmlns:r="http://schemas.openxmlformats.org/officeDocument/2006/relationships" xmlns:p="http://schemas.openxmlformats.org/presentationml/2006/main" showMasterSp="0" showMasterPhAnim="0">
+  <p:cSld>
+    <p:spTree>
+      <p:nvGrpSpPr>
+        <p:cNvPr id="1" name="Shape 101"/>
+        <p:cNvGrpSpPr/>
+        <p:nvPr/>
+      </p:nvGrpSpPr>
+      <p:grpSpPr>
+        <a:xfrm>
+          <a:off x="0" y="0"/>
+          <a:ext cx="0" cy="0"/>
+          <a:chOff x="0" y="0"/>
+          <a:chExt cx="0" cy="0"/>
+        </a:xfrm>
+      </p:grpSpPr>
+      <p:sp>
+        <p:nvSpPr>
+          <p:cNvPr id="102" name="Google Shape;102;gee8737ae05_0_0:notes"/>
+          <p:cNvSpPr>
+            <a:spLocks noGrp="1" noRot="1" noChangeAspect="1"/>
+          </p:cNvSpPr>
+          <p:nvPr>
+            <p:ph type="sldImg" idx="2"/>
+          </p:nvPr>
+        </p:nvSpPr>
+        <p:spPr>
+          <a:xfrm>
+            <a:off x="381000" y="685800"/>
+            <a:ext cx="6096000" cy="3429000"/>
+          </a:xfrm>
+          <a:custGeom>
+            <a:avLst/>
+            <a:gdLst/>
+            <a:ahLst/>
+            <a:cxnLst/>
+            <a:rect l="l" t="t" r="r" b="b"/>
+            <a:pathLst>
+              <a:path w="120000" h="120000" extrusionOk="0">
+                <a:moveTo>
+                  <a:pt x="0" y="0"/>
+                </a:moveTo>
+                <a:lnTo>
+                  <a:pt x="120000" y="0"/>
+                </a:lnTo>
+                <a:lnTo>
+                  <a:pt x="120000" y="120000"/>
+                </a:lnTo>
+                <a:lnTo>
+                  <a:pt x="0" y="120000"/>
+                </a:lnTo>
+                <a:close/>
+              </a:path>
+            </a:pathLst>
+          </a:custGeom>
+        </p:spPr>
+      </p:sp>
+      <p:sp>
+        <p:nvSpPr>
+          <p:cNvPr id="103" name="Google Shape;103;gee8737ae05_0_0:notes"/>
+          <p:cNvSpPr txBox="1">
+            <a:spLocks noGrp="1"/>
+          </p:cNvSpPr>
+          <p:nvPr>
+            <p:ph type="body" idx="1"/>
+          </p:nvPr>
+        </p:nvSpPr>
+        <p:spPr>
+          <a:xfrm>
+            <a:off x="685800" y="4343400"/>
+            <a:ext cx="5486400" cy="4114800"/>
+          </a:xfrm>
+          <a:prstGeom prst="rect">
+            <a:avLst/>
+          </a:prstGeom>
+        </p:spPr>
+        <p:txBody>
+          <a:bodyPr spcFirstLastPara="1" wrap="square" lIns="91425" tIns="91425" rIns="91425" bIns="91425" anchor="t" anchorCtr="0">
+            <a:noAutofit/>
+          </a:bodyPr>
+          <a:lstStyle/>
+          <a:p>
+            <a:pPr marL="171450" lvl="0" indent="-171450" algn="l" rtl="0">
+              <a:spcBef>
+                <a:spcPts val="0"/>
+              </a:spcBef>
+              <a:spcAft>
+                <a:spcPts val="0"/>
+              </a:spcAft>
+            </a:pPr>
+            <a:r>
+              <a:rPr lang="en-US" dirty="0"/>
+              <a:t>Details specific for each hotel – different locations, room types, etc.</a:t>
+            </a:r>
+            <a:endParaRPr dirty="0"/>
+          </a:p>
+        </p:txBody>
+      </p:sp>
+    </p:spTree>
+    <p:extLst>
+      <p:ext uri="{BB962C8B-B14F-4D97-AF65-F5344CB8AC3E}">
+        <p14:creationId xmlns:p14="http://schemas.microsoft.com/office/powerpoint/2010/main" val="2948141614"/>
+      </p:ext>
+    </p:extLst>
+  </p:cSld>
+  <p:clrMapOvr>
+    <a:masterClrMapping/>
+  </p:clrMapOvr>
+</p:notes>
+</file>
+
+<file path=ppt/notesSlides/notesSlide12.xml><?xml version="1.0" encoding="utf-8"?>
 <p:notes xmlns:a="http://schemas.openxmlformats.org/drawingml/2006/main" xmlns:r="http://schemas.openxmlformats.org/officeDocument/2006/relationships" xmlns:p="http://schemas.openxmlformats.org/presentationml/2006/main" showMasterSp="0" showMasterPhAnim="0">
   <p:cSld>
     <p:spTree>
@@ -1035,7 +1181,22 @@
             </a:pPr>
             <a:r>
               <a:rPr lang="en-US" dirty="0"/>
-              <a:t>Laser pointer helpful!!</a:t>
+              <a:t>Res from Portugal: more likely to cancel vs. not</a:t>
+            </a:r>
+          </a:p>
+          <a:p>
+            <a:pPr marL="0" lvl="0" indent="0" algn="l" rtl="0">
+              <a:spcBef>
+                <a:spcPts val="0"/>
+              </a:spcBef>
+              <a:spcAft>
+                <a:spcPts val="0"/>
+              </a:spcAft>
+              <a:buNone/>
+            </a:pPr>
+            <a:r>
+              <a:rPr lang="en-US" dirty="0"/>
+              <a:t>Total of Special requests: fewer requests more likely to cancel</a:t>
             </a:r>
             <a:endParaRPr dirty="0"/>
           </a:p>
@@ -1049,7 +1210,119 @@
 </p:notes>
 </file>
 
-<file path=ppt/notesSlides/notesSlide12.xml><?xml version="1.0" encoding="utf-8"?>
+<file path=ppt/notesSlides/notesSlide13.xml><?xml version="1.0" encoding="utf-8"?>
+<p:notes xmlns:a="http://schemas.openxmlformats.org/drawingml/2006/main" xmlns:r="http://schemas.openxmlformats.org/officeDocument/2006/relationships" xmlns:p="http://schemas.openxmlformats.org/presentationml/2006/main" showMasterSp="0" showMasterPhAnim="0">
+  <p:cSld>
+    <p:spTree>
+      <p:nvGrpSpPr>
+        <p:cNvPr id="1" name="Shape 101"/>
+        <p:cNvGrpSpPr/>
+        <p:nvPr/>
+      </p:nvGrpSpPr>
+      <p:grpSpPr>
+        <a:xfrm>
+          <a:off x="0" y="0"/>
+          <a:ext cx="0" cy="0"/>
+          <a:chOff x="0" y="0"/>
+          <a:chExt cx="0" cy="0"/>
+        </a:xfrm>
+      </p:grpSpPr>
+      <p:sp>
+        <p:nvSpPr>
+          <p:cNvPr id="102" name="Google Shape;102;gee8737ae05_0_0:notes"/>
+          <p:cNvSpPr>
+            <a:spLocks noGrp="1" noRot="1" noChangeAspect="1"/>
+          </p:cNvSpPr>
+          <p:nvPr>
+            <p:ph type="sldImg" idx="2"/>
+          </p:nvPr>
+        </p:nvSpPr>
+        <p:spPr>
+          <a:xfrm>
+            <a:off x="381000" y="685800"/>
+            <a:ext cx="6096000" cy="3429000"/>
+          </a:xfrm>
+          <a:custGeom>
+            <a:avLst/>
+            <a:gdLst/>
+            <a:ahLst/>
+            <a:cxnLst/>
+            <a:rect l="l" t="t" r="r" b="b"/>
+            <a:pathLst>
+              <a:path w="120000" h="120000" extrusionOk="0">
+                <a:moveTo>
+                  <a:pt x="0" y="0"/>
+                </a:moveTo>
+                <a:lnTo>
+                  <a:pt x="120000" y="0"/>
+                </a:lnTo>
+                <a:lnTo>
+                  <a:pt x="120000" y="120000"/>
+                </a:lnTo>
+                <a:lnTo>
+                  <a:pt x="0" y="120000"/>
+                </a:lnTo>
+                <a:close/>
+              </a:path>
+            </a:pathLst>
+          </a:custGeom>
+        </p:spPr>
+      </p:sp>
+      <p:sp>
+        <p:nvSpPr>
+          <p:cNvPr id="103" name="Google Shape;103;gee8737ae05_0_0:notes"/>
+          <p:cNvSpPr txBox="1">
+            <a:spLocks noGrp="1"/>
+          </p:cNvSpPr>
+          <p:nvPr>
+            <p:ph type="body" idx="1"/>
+          </p:nvPr>
+        </p:nvSpPr>
+        <p:spPr>
+          <a:xfrm>
+            <a:off x="685800" y="4343400"/>
+            <a:ext cx="5486400" cy="4114800"/>
+          </a:xfrm>
+          <a:prstGeom prst="rect">
+            <a:avLst/>
+          </a:prstGeom>
+        </p:spPr>
+        <p:txBody>
+          <a:bodyPr spcFirstLastPara="1" wrap="square" lIns="91425" tIns="91425" rIns="91425" bIns="91425" anchor="t" anchorCtr="0">
+            <a:noAutofit/>
+          </a:bodyPr>
+          <a:lstStyle/>
+          <a:p>
+            <a:pPr marL="171450" lvl="0" indent="-171450" algn="l" rtl="0">
+              <a:spcBef>
+                <a:spcPts val="0"/>
+              </a:spcBef>
+              <a:spcAft>
+                <a:spcPts val="0"/>
+              </a:spcAft>
+            </a:pPr>
+            <a:r>
+              <a:rPr lang="en-US" dirty="0"/>
+              <a:t>Details specific for each hotel – different locations, room types, etc.</a:t>
+            </a:r>
+            <a:endParaRPr dirty="0"/>
+          </a:p>
+        </p:txBody>
+      </p:sp>
+    </p:spTree>
+    <p:extLst>
+      <p:ext uri="{BB962C8B-B14F-4D97-AF65-F5344CB8AC3E}">
+        <p14:creationId xmlns:p14="http://schemas.microsoft.com/office/powerpoint/2010/main" val="285603667"/>
+      </p:ext>
+    </p:extLst>
+  </p:cSld>
+  <p:clrMapOvr>
+    <a:masterClrMapping/>
+  </p:clrMapOvr>
+</p:notes>
+</file>
+
+<file path=ppt/notesSlides/notesSlide14.xml><?xml version="1.0" encoding="utf-8"?>
 <p:notes xmlns:a="http://schemas.openxmlformats.org/drawingml/2006/main" xmlns:r="http://schemas.openxmlformats.org/officeDocument/2006/relationships" xmlns:p="http://schemas.openxmlformats.org/presentationml/2006/main" showMasterSp="0" showMasterPhAnim="0">
   <p:cSld>
     <p:spTree>
@@ -1153,7 +1426,133 @@
 </p:notes>
 </file>
 
-<file path=ppt/notesSlides/notesSlide13.xml><?xml version="1.0" encoding="utf-8"?>
+<file path=ppt/notesSlides/notesSlide15.xml><?xml version="1.0" encoding="utf-8"?>
+<p:notes xmlns:a="http://schemas.openxmlformats.org/drawingml/2006/main" xmlns:r="http://schemas.openxmlformats.org/officeDocument/2006/relationships" xmlns:p="http://schemas.openxmlformats.org/presentationml/2006/main" showMasterSp="0" showMasterPhAnim="0">
+  <p:cSld>
+    <p:spTree>
+      <p:nvGrpSpPr>
+        <p:cNvPr id="1" name="Shape 68"/>
+        <p:cNvGrpSpPr/>
+        <p:nvPr/>
+      </p:nvGrpSpPr>
+      <p:grpSpPr>
+        <a:xfrm>
+          <a:off x="0" y="0"/>
+          <a:ext cx="0" cy="0"/>
+          <a:chOff x="0" y="0"/>
+          <a:chExt cx="0" cy="0"/>
+        </a:xfrm>
+      </p:grpSpPr>
+      <p:sp>
+        <p:nvSpPr>
+          <p:cNvPr id="69" name="Google Shape;69;geb9130e94c_1_315:notes"/>
+          <p:cNvSpPr>
+            <a:spLocks noGrp="1" noRot="1" noChangeAspect="1"/>
+          </p:cNvSpPr>
+          <p:nvPr>
+            <p:ph type="sldImg" idx="2"/>
+          </p:nvPr>
+        </p:nvSpPr>
+        <p:spPr>
+          <a:xfrm>
+            <a:off x="381000" y="685800"/>
+            <a:ext cx="6096000" cy="3429000"/>
+          </a:xfrm>
+          <a:custGeom>
+            <a:avLst/>
+            <a:gdLst/>
+            <a:ahLst/>
+            <a:cxnLst/>
+            <a:rect l="l" t="t" r="r" b="b"/>
+            <a:pathLst>
+              <a:path w="120000" h="120000" extrusionOk="0">
+                <a:moveTo>
+                  <a:pt x="0" y="0"/>
+                </a:moveTo>
+                <a:lnTo>
+                  <a:pt x="120000" y="0"/>
+                </a:lnTo>
+                <a:lnTo>
+                  <a:pt x="120000" y="120000"/>
+                </a:lnTo>
+                <a:lnTo>
+                  <a:pt x="0" y="120000"/>
+                </a:lnTo>
+                <a:close/>
+              </a:path>
+            </a:pathLst>
+          </a:custGeom>
+        </p:spPr>
+      </p:sp>
+      <p:sp>
+        <p:nvSpPr>
+          <p:cNvPr id="70" name="Google Shape;70;geb9130e94c_1_315:notes"/>
+          <p:cNvSpPr txBox="1">
+            <a:spLocks noGrp="1"/>
+          </p:cNvSpPr>
+          <p:nvPr>
+            <p:ph type="body" idx="1"/>
+          </p:nvPr>
+        </p:nvSpPr>
+        <p:spPr>
+          <a:xfrm>
+            <a:off x="685800" y="4343400"/>
+            <a:ext cx="5486400" cy="4114800"/>
+          </a:xfrm>
+          <a:prstGeom prst="rect">
+            <a:avLst/>
+          </a:prstGeom>
+        </p:spPr>
+        <p:txBody>
+          <a:bodyPr spcFirstLastPara="1" wrap="square" lIns="91425" tIns="91425" rIns="91425" bIns="91425" anchor="t" anchorCtr="0">
+            <a:noAutofit/>
+          </a:bodyPr>
+          <a:lstStyle/>
+          <a:p>
+            <a:pPr marL="171450" lvl="0" indent="-171450" algn="l" rtl="0">
+              <a:spcBef>
+                <a:spcPts val="0"/>
+              </a:spcBef>
+              <a:spcAft>
+                <a:spcPts val="0"/>
+              </a:spcAft>
+            </a:pPr>
+            <a:r>
+              <a:rPr lang="en-US" dirty="0"/>
+              <a:t>Basic q; useful for short- and long-term planning</a:t>
+            </a:r>
+          </a:p>
+          <a:p>
+            <a:pPr marL="171450" lvl="0" indent="-171450" algn="l" rtl="0">
+              <a:spcBef>
+                <a:spcPts val="0"/>
+              </a:spcBef>
+              <a:spcAft>
+                <a:spcPts val="0"/>
+              </a:spcAft>
+            </a:pPr>
+            <a:r>
+              <a:rPr lang="en-US" dirty="0"/>
+              <a:t>Generalizations – useful for quick decisions during busy times</a:t>
+            </a:r>
+            <a:endParaRPr dirty="0"/>
+          </a:p>
+        </p:txBody>
+      </p:sp>
+    </p:spTree>
+    <p:extLst>
+      <p:ext uri="{BB962C8B-B14F-4D97-AF65-F5344CB8AC3E}">
+        <p14:creationId xmlns:p14="http://schemas.microsoft.com/office/powerpoint/2010/main" val="3385881028"/>
+      </p:ext>
+    </p:extLst>
+  </p:cSld>
+  <p:clrMapOvr>
+    <a:masterClrMapping/>
+  </p:clrMapOvr>
+</p:notes>
+</file>
+
+<file path=ppt/notesSlides/notesSlide16.xml><?xml version="1.0" encoding="utf-8"?>
 <p:notes xmlns:a="http://schemas.openxmlformats.org/drawingml/2006/main" xmlns:r="http://schemas.openxmlformats.org/officeDocument/2006/relationships" xmlns:p="http://schemas.openxmlformats.org/presentationml/2006/main" showMasterSp="0" showMasterPhAnim="0">
   <p:cSld>
     <p:spTree>
@@ -1257,7 +1656,7 @@
 </p:notes>
 </file>
 
-<file path=ppt/notesSlides/notesSlide14.xml><?xml version="1.0" encoding="utf-8"?>
+<file path=ppt/notesSlides/notesSlide17.xml><?xml version="1.0" encoding="utf-8"?>
 <p:notes xmlns:a="http://schemas.openxmlformats.org/drawingml/2006/main" xmlns:r="http://schemas.openxmlformats.org/officeDocument/2006/relationships" xmlns:p="http://schemas.openxmlformats.org/presentationml/2006/main" showMasterSp="0" showMasterPhAnim="0">
   <p:cSld>
     <p:spTree>
@@ -2209,6 +2608,11 @@
         </p:txBody>
       </p:sp>
     </p:spTree>
+    <p:extLst>
+      <p:ext uri="{BB962C8B-B14F-4D97-AF65-F5344CB8AC3E}">
+        <p14:creationId xmlns:p14="http://schemas.microsoft.com/office/powerpoint/2010/main" val="2028897190"/>
+      </p:ext>
+    </p:extLst>
   </p:cSld>
   <p:clrMapOvr>
     <a:masterClrMapping/>
@@ -6846,7 +7250,7 @@
         <p:fade thruBlk="1"/>
       </p:transition>
     </mc:Choice>
-    <mc:Fallback xmlns:ahyp="http://schemas.microsoft.com/office/drawing/2018/hyperlinkcolor" xmlns:p15="http://schemas.microsoft.com/office/powerpoint/2012/main" xmlns:com="http://schemas.openxmlformats.org/drawingml/2006/compatibility" xmlns:pvml="urn:schemas-microsoft-com:office:powerpoint" xmlns:v="urn:schemas-microsoft-com:vml" xmlns:o="urn:schemas-microsoft-com:office:office" xmlns:dgm="http://schemas.openxmlformats.org/drawingml/2006/diagram" xmlns:c="http://schemas.openxmlformats.org/drawingml/2006/chart" xmlns:mv="urn:schemas-microsoft-com:mac:vml" xmlns="">
+    <mc:Fallback xmlns="" xmlns:mv="urn:schemas-microsoft-com:mac:vml" xmlns:c="http://schemas.openxmlformats.org/drawingml/2006/chart" xmlns:dgm="http://schemas.openxmlformats.org/drawingml/2006/diagram" xmlns:o="urn:schemas-microsoft-com:office:office" xmlns:v="urn:schemas-microsoft-com:vml" xmlns:pvml="urn:schemas-microsoft-com:office:powerpoint" xmlns:com="http://schemas.openxmlformats.org/drawingml/2006/compatibility" xmlns:p15="http://schemas.microsoft.com/office/powerpoint/2012/main" xmlns:ahyp="http://schemas.microsoft.com/office/drawing/2018/hyperlinkcolor">
       <p:transition spd="slow">
         <p:fade/>
       </p:transition>
@@ -7705,9 +8109,17 @@
 <file path=ppt/slides/slide10.xml><?xml version="1.0" encoding="utf-8"?>
 <p:sld xmlns:a="http://schemas.openxmlformats.org/drawingml/2006/main" xmlns:r="http://schemas.openxmlformats.org/officeDocument/2006/relationships" xmlns:p="http://schemas.openxmlformats.org/presentationml/2006/main">
   <p:cSld>
+    <p:bg>
+      <p:bgPr>
+        <a:solidFill>
+          <a:schemeClr val="lt1"/>
+        </a:solidFill>
+        <a:effectLst/>
+      </p:bgPr>
+    </p:bg>
     <p:spTree>
       <p:nvGrpSpPr>
-        <p:cNvPr id="1" name="Shape 124"/>
+        <p:cNvPr id="1" name="Shape 144"/>
         <p:cNvGrpSpPr/>
         <p:nvPr/>
       </p:nvGrpSpPr>
@@ -7721,7 +8133,301 @@
       </p:grpSpPr>
       <p:sp>
         <p:nvSpPr>
-          <p:cNvPr id="125" name="Google Shape;125;p20"/>
+          <p:cNvPr id="145" name="Google Shape;145;p21"/>
+          <p:cNvSpPr txBox="1">
+            <a:spLocks noGrp="1"/>
+          </p:cNvSpPr>
+          <p:nvPr>
+            <p:ph type="title"/>
+          </p:nvPr>
+        </p:nvSpPr>
+        <p:spPr>
+          <a:xfrm>
+            <a:off x="235500" y="250800"/>
+            <a:ext cx="6938506" cy="755700"/>
+          </a:xfrm>
+          <a:prstGeom prst="rect">
+            <a:avLst/>
+          </a:prstGeom>
+          <a:effectLst>
+            <a:outerShdw blurRad="57150" dist="19050" dir="5400000" algn="bl" rotWithShape="0">
+              <a:srgbClr val="000000">
+                <a:alpha val="50000"/>
+              </a:srgbClr>
+            </a:outerShdw>
+          </a:effectLst>
+        </p:spPr>
+        <p:txBody>
+          <a:bodyPr spcFirstLastPara="1" wrap="square" lIns="91425" tIns="91425" rIns="91425" bIns="91425" anchor="t" anchorCtr="0">
+            <a:noAutofit/>
+          </a:bodyPr>
+          <a:lstStyle/>
+          <a:p>
+            <a:pPr marL="0" marR="0" lvl="0" indent="0" algn="l" rtl="0">
+              <a:lnSpc>
+                <a:spcPct val="100000"/>
+              </a:lnSpc>
+              <a:spcBef>
+                <a:spcPts val="0"/>
+              </a:spcBef>
+              <a:spcAft>
+                <a:spcPts val="0"/>
+              </a:spcAft>
+              <a:buNone/>
+            </a:pPr>
+            <a:r>
+              <a:rPr lang="en" sz="3000" dirty="0"/>
+              <a:t>Visualizing Results of the Logistic Regression</a:t>
+            </a:r>
+            <a:endParaRPr sz="3000" dirty="0"/>
+          </a:p>
+        </p:txBody>
+      </p:sp>
+      <p:pic>
+        <p:nvPicPr>
+          <p:cNvPr id="147" name="Google Shape;147;p21"/>
+          <p:cNvPicPr preferRelativeResize="0"/>
+          <p:nvPr/>
+        </p:nvPicPr>
+        <p:blipFill>
+          <a:blip r:embed="rId3">
+            <a:extLst>
+              <a:ext uri="{BEBA8EAE-BF5A-486C-A8C5-ECC9F3942E4B}">
+                <a14:imgProps xmlns:a14="http://schemas.microsoft.com/office/drawing/2010/main">
+                  <a14:imgLayer r:embed="rId4">
+                    <a14:imgEffect>
+                      <a14:saturation sat="33000"/>
+                    </a14:imgEffect>
+                  </a14:imgLayer>
+                </a14:imgProps>
+              </a:ext>
+            </a:extLst>
+          </a:blip>
+          <a:srcRect/>
+          <a:stretch/>
+        </p:blipFill>
+        <p:spPr>
+          <a:xfrm>
+            <a:off x="1595549" y="1026672"/>
+            <a:ext cx="5952901" cy="3746616"/>
+          </a:xfrm>
+          <a:prstGeom prst="rect">
+            <a:avLst/>
+          </a:prstGeom>
+          <a:noFill/>
+          <a:ln>
+            <a:noFill/>
+          </a:ln>
+          <a:effectLst>
+            <a:outerShdw blurRad="57150" dist="114300" dir="2760000" algn="bl" rotWithShape="0">
+              <a:srgbClr val="000000">
+                <a:alpha val="50000"/>
+              </a:srgbClr>
+            </a:outerShdw>
+          </a:effectLst>
+        </p:spPr>
+      </p:pic>
+      <p:sp>
+        <p:nvSpPr>
+          <p:cNvPr id="2" name="Slide Number Placeholder 1">
+            <a:extLst>
+              <a:ext uri="{FF2B5EF4-FFF2-40B4-BE49-F238E27FC236}">
+                <a16:creationId xmlns:a16="http://schemas.microsoft.com/office/drawing/2014/main" id="{C2ECCDDA-3520-4494-BCC3-B8D352AD2D0C}"/>
+              </a:ext>
+            </a:extLst>
+          </p:cNvPr>
+          <p:cNvSpPr>
+            <a:spLocks noGrp="1"/>
+          </p:cNvSpPr>
+          <p:nvPr>
+            <p:ph type="sldNum" idx="12"/>
+          </p:nvPr>
+        </p:nvSpPr>
+        <p:spPr/>
+        <p:txBody>
+          <a:bodyPr/>
+          <a:lstStyle/>
+          <a:p>
+            <a:pPr marL="0" lvl="0" indent="0" algn="r" rtl="0">
+              <a:spcBef>
+                <a:spcPts val="0"/>
+              </a:spcBef>
+              <a:spcAft>
+                <a:spcPts val="0"/>
+              </a:spcAft>
+              <a:buNone/>
+            </a:pPr>
+            <a:fld id="{00000000-1234-1234-1234-123412341234}" type="slidenum">
+              <a:rPr lang="en" smtClean="0"/>
+              <a:t>10</a:t>
+            </a:fld>
+            <a:endParaRPr lang="en"/>
+          </a:p>
+        </p:txBody>
+      </p:sp>
+    </p:spTree>
+    <p:extLst>
+      <p:ext uri="{BB962C8B-B14F-4D97-AF65-F5344CB8AC3E}">
+        <p14:creationId xmlns:p14="http://schemas.microsoft.com/office/powerpoint/2010/main" val="2935295611"/>
+      </p:ext>
+    </p:extLst>
+  </p:cSld>
+  <p:clrMapOvr>
+    <a:masterClrMapping/>
+  </p:clrMapOvr>
+  <p:timing>
+    <p:tnLst>
+      <p:par>
+        <p:cTn id="1" dur="indefinite" restart="never" nodeType="tmRoot">
+          <p:childTnLst>
+            <p:seq concurrent="1" nextAc="seek">
+              <p:cTn id="2" dur="indefinite" nodeType="mainSeq">
+                <p:childTnLst>
+                  <p:par>
+                    <p:cTn id="3" fill="hold">
+                      <p:stCondLst>
+                        <p:cond delay="indefinite"/>
+                        <p:cond evt="onBegin" delay="0">
+                          <p:tn val="2"/>
+                        </p:cond>
+                      </p:stCondLst>
+                      <p:childTnLst>
+                        <p:par>
+                          <p:cTn id="4" fill="hold">
+                            <p:stCondLst>
+                              <p:cond delay="0"/>
+                            </p:stCondLst>
+                            <p:childTnLst>
+                              <p:par>
+                                <p:cTn id="5" presetID="10" presetClass="entr" presetSubtype="0" fill="hold" nodeType="withEffect">
+                                  <p:stCondLst>
+                                    <p:cond delay="0"/>
+                                  </p:stCondLst>
+                                  <p:childTnLst>
+                                    <p:set>
+                                      <p:cBhvr>
+                                        <p:cTn id="6" dur="1" fill="hold">
+                                          <p:stCondLst>
+                                            <p:cond delay="0"/>
+                                          </p:stCondLst>
+                                        </p:cTn>
+                                        <p:tgtEl>
+                                          <p:spTgt spid="145"/>
+                                        </p:tgtEl>
+                                        <p:attrNameLst>
+                                          <p:attrName>style.visibility</p:attrName>
+                                        </p:attrNameLst>
+                                      </p:cBhvr>
+                                      <p:to>
+                                        <p:strVal val="visible"/>
+                                      </p:to>
+                                    </p:set>
+                                    <p:animEffect transition="in" filter="fade">
+                                      <p:cBhvr>
+                                        <p:cTn id="7" dur="500"/>
+                                        <p:tgtEl>
+                                          <p:spTgt spid="145"/>
+                                        </p:tgtEl>
+                                      </p:cBhvr>
+                                    </p:animEffect>
+                                  </p:childTnLst>
+                                </p:cTn>
+                              </p:par>
+                            </p:childTnLst>
+                          </p:cTn>
+                        </p:par>
+                        <p:par>
+                          <p:cTn id="8" fill="hold">
+                            <p:stCondLst>
+                              <p:cond delay="500"/>
+                            </p:stCondLst>
+                            <p:childTnLst>
+                              <p:par>
+                                <p:cTn id="9" presetID="10" presetClass="entr" presetSubtype="0" fill="hold" nodeType="afterEffect">
+                                  <p:stCondLst>
+                                    <p:cond delay="0"/>
+                                  </p:stCondLst>
+                                  <p:childTnLst>
+                                    <p:set>
+                                      <p:cBhvr>
+                                        <p:cTn id="10" dur="1" fill="hold">
+                                          <p:stCondLst>
+                                            <p:cond delay="0"/>
+                                          </p:stCondLst>
+                                        </p:cTn>
+                                        <p:tgtEl>
+                                          <p:spTgt spid="147"/>
+                                        </p:tgtEl>
+                                        <p:attrNameLst>
+                                          <p:attrName>style.visibility</p:attrName>
+                                        </p:attrNameLst>
+                                      </p:cBhvr>
+                                      <p:to>
+                                        <p:strVal val="visible"/>
+                                      </p:to>
+                                    </p:set>
+                                    <p:animEffect transition="in" filter="fade">
+                                      <p:cBhvr>
+                                        <p:cTn id="11" dur="500"/>
+                                        <p:tgtEl>
+                                          <p:spTgt spid="147"/>
+                                        </p:tgtEl>
+                                      </p:cBhvr>
+                                    </p:animEffect>
+                                  </p:childTnLst>
+                                </p:cTn>
+                              </p:par>
+                            </p:childTnLst>
+                          </p:cTn>
+                        </p:par>
+                      </p:childTnLst>
+                    </p:cTn>
+                  </p:par>
+                </p:childTnLst>
+              </p:cTn>
+              <p:prevCondLst>
+                <p:cond evt="onPrev" delay="0">
+                  <p:tgtEl>
+                    <p:sldTgt/>
+                  </p:tgtEl>
+                </p:cond>
+              </p:prevCondLst>
+              <p:nextCondLst>
+                <p:cond evt="onNext" delay="0">
+                  <p:tgtEl>
+                    <p:sldTgt/>
+                  </p:tgtEl>
+                </p:cond>
+              </p:nextCondLst>
+            </p:seq>
+          </p:childTnLst>
+        </p:cTn>
+      </p:par>
+    </p:tnLst>
+  </p:timing>
+</p:sld>
+</file>
+
+<file path=ppt/slides/slide11.xml><?xml version="1.0" encoding="utf-8"?>
+<p:sld xmlns:a="http://schemas.openxmlformats.org/drawingml/2006/main" xmlns:r="http://schemas.openxmlformats.org/officeDocument/2006/relationships" xmlns:p="http://schemas.openxmlformats.org/presentationml/2006/main">
+  <p:cSld>
+    <p:spTree>
+      <p:nvGrpSpPr>
+        <p:cNvPr id="1" name="Shape 104"/>
+        <p:cNvGrpSpPr/>
+        <p:nvPr/>
+      </p:nvGrpSpPr>
+      <p:grpSpPr>
+        <a:xfrm>
+          <a:off x="0" y="0"/>
+          <a:ext cx="0" cy="0"/>
+          <a:chOff x="0" y="0"/>
+          <a:chExt cx="0" cy="0"/>
+        </a:xfrm>
+      </p:grpSpPr>
+      <p:sp>
+        <p:nvSpPr>
+          <p:cNvPr id="105" name="Google Shape;105;p19"/>
           <p:cNvSpPr txBox="1">
             <a:spLocks noGrp="1"/>
           </p:cNvSpPr>
@@ -7761,16 +8467,28 @@
               <a:buNone/>
             </a:pPr>
             <a:r>
-              <a:rPr lang="en"/>
-              <a:t>Cancellations are Least Likely When...</a:t>
+              <a:rPr lang="en-US" dirty="0"/>
+              <a:t>Most Significant Aspects:</a:t>
             </a:r>
-            <a:endParaRPr/>
+            <a:endParaRPr dirty="0"/>
+          </a:p>
+          <a:p>
+            <a:pPr marL="0" lvl="0" indent="0" algn="l" rtl="0">
+              <a:spcBef>
+                <a:spcPts val="0"/>
+              </a:spcBef>
+              <a:spcAft>
+                <a:spcPts val="0"/>
+              </a:spcAft>
+              <a:buNone/>
+            </a:pPr>
+            <a:endParaRPr dirty="0"/>
           </a:p>
         </p:txBody>
       </p:sp>
       <p:grpSp>
         <p:nvGrpSpPr>
-          <p:cNvPr id="126" name="Google Shape;126;p20"/>
+          <p:cNvPr id="106" name="Google Shape;106;p19"/>
           <p:cNvGrpSpPr/>
           <p:nvPr/>
         </p:nvGrpSpPr>
@@ -7784,7 +8502,7 @@
         </p:grpSpPr>
         <p:sp>
           <p:nvSpPr>
-            <p:cNvPr id="127" name="Google Shape;127;p20"/>
+            <p:cNvPr id="107" name="Google Shape;107;p19"/>
             <p:cNvSpPr txBox="1"/>
             <p:nvPr/>
           </p:nvSpPr>
@@ -7824,7 +8542,7 @@
         </p:sp>
         <p:sp>
           <p:nvSpPr>
-            <p:cNvPr id="128" name="Google Shape;128;p20"/>
+            <p:cNvPr id="108" name="Google Shape;108;p19"/>
             <p:cNvSpPr/>
             <p:nvPr/>
           </p:nvSpPr>
@@ -7869,7 +8587,7 @@
       </p:grpSp>
       <p:sp>
         <p:nvSpPr>
-          <p:cNvPr id="129" name="Google Shape;129;p20"/>
+          <p:cNvPr id="109" name="Google Shape;109;p19"/>
           <p:cNvSpPr txBox="1">
             <a:spLocks noGrp="1"/>
           </p:cNvSpPr>
@@ -7902,14 +8620,14 @@
               <a:buNone/>
             </a:pPr>
             <a:r>
-              <a:rPr lang="en-US" sz="1600" dirty="0">
+              <a:rPr lang="en-US" dirty="0">
                 <a:solidFill>
                   <a:schemeClr val="lt1"/>
                 </a:solidFill>
               </a:rPr>
-              <a:t>Known # of Cars</a:t>
+              <a:t>Winter Holidays</a:t>
             </a:r>
-            <a:endParaRPr sz="1600" dirty="0">
+            <a:endParaRPr dirty="0">
               <a:solidFill>
                 <a:schemeClr val="lt1"/>
               </a:solidFill>
@@ -7919,7 +8637,7 @@
       </p:sp>
       <p:sp>
         <p:nvSpPr>
-          <p:cNvPr id="130" name="Google Shape;130;p20"/>
+          <p:cNvPr id="110" name="Google Shape;110;p19"/>
           <p:cNvSpPr txBox="1">
             <a:spLocks noGrp="1"/>
           </p:cNvSpPr>
@@ -7929,8 +8647,8 @@
         </p:nvSpPr>
         <p:spPr>
           <a:xfrm>
-            <a:off x="493524" y="1850300"/>
-            <a:ext cx="2478600" cy="2293931"/>
+            <a:off x="491624" y="1952108"/>
+            <a:ext cx="2478600" cy="2499115"/>
           </a:xfrm>
           <a:prstGeom prst="rect">
             <a:avLst/>
@@ -7948,8 +8666,12 @@
               </a:spcAft>
             </a:pPr>
             <a:r>
+              <a:rPr lang="en-US" sz="1600"/>
+              <a:t>Increased </a:t>
+            </a:r>
+            <a:r>
               <a:rPr lang="en-US" sz="1600" dirty="0"/>
-              <a:t>Assumes guests disclose information prior to arrival</a:t>
+              <a:t>odds of cancellations</a:t>
             </a:r>
           </a:p>
           <a:p>
@@ -7960,7 +8682,18 @@
             </a:pPr>
             <a:r>
               <a:rPr lang="en-US" sz="1600" dirty="0"/>
-              <a:t>Guests more likely to be committed to their stay – planning ahead</a:t>
+              <a:t>Increased leisure travel during winter holidays</a:t>
+            </a:r>
+          </a:p>
+          <a:p>
+            <a:pPr marL="285750" indent="-285750">
+              <a:spcAft>
+                <a:spcPts val="1600"/>
+              </a:spcAft>
+            </a:pPr>
+            <a:r>
+              <a:rPr lang="en-US" sz="1600" dirty="0"/>
+              <a:t>Lower business travel as people take time off</a:t>
             </a:r>
             <a:endParaRPr sz="1600" dirty="0"/>
           </a:p>
@@ -7968,7 +8701,7 @@
       </p:sp>
       <p:grpSp>
         <p:nvGrpSpPr>
-          <p:cNvPr id="131" name="Google Shape;131;p20"/>
+          <p:cNvPr id="111" name="Google Shape;111;p19"/>
           <p:cNvGrpSpPr/>
           <p:nvPr/>
         </p:nvGrpSpPr>
@@ -7982,7 +8715,7 @@
         </p:grpSpPr>
         <p:sp>
           <p:nvSpPr>
-            <p:cNvPr id="132" name="Google Shape;132;p20"/>
+            <p:cNvPr id="112" name="Google Shape;112;p19"/>
             <p:cNvSpPr txBox="1"/>
             <p:nvPr/>
           </p:nvSpPr>
@@ -8016,13 +8749,13 @@
                 </a:spcAft>
                 <a:buNone/>
               </a:pPr>
-              <a:endParaRPr dirty="0"/>
+              <a:endParaRPr/>
             </a:p>
           </p:txBody>
         </p:sp>
         <p:sp>
           <p:nvSpPr>
-            <p:cNvPr id="133" name="Google Shape;133;p20"/>
+            <p:cNvPr id="113" name="Google Shape;113;p19"/>
             <p:cNvSpPr/>
             <p:nvPr/>
           </p:nvSpPr>
@@ -8067,7 +8800,7 @@
       </p:grpSp>
       <p:sp>
         <p:nvSpPr>
-          <p:cNvPr id="134" name="Google Shape;134;p20"/>
+          <p:cNvPr id="114" name="Google Shape;114;p19"/>
           <p:cNvSpPr txBox="1">
             <a:spLocks noGrp="1"/>
           </p:cNvSpPr>
@@ -8090,16 +8823,22 @@
           </a:bodyPr>
           <a:lstStyle/>
           <a:p>
-            <a:pPr marL="0" lvl="0" indent="0">
+            <a:pPr marL="0" lvl="0" indent="0" algn="l" rtl="0">
+              <a:spcBef>
+                <a:spcPts val="0"/>
+              </a:spcBef>
+              <a:spcAft>
+                <a:spcPts val="0"/>
+              </a:spcAft>
               <a:buNone/>
             </a:pPr>
             <a:r>
-              <a:rPr lang="en" dirty="0">
+              <a:rPr lang="en-US" dirty="0">
                 <a:solidFill>
                   <a:schemeClr val="lt1"/>
                 </a:solidFill>
               </a:rPr>
-              <a:t>Booked for February</a:t>
+              <a:t>Hotel-Specifics</a:t>
             </a:r>
             <a:endParaRPr dirty="0">
               <a:solidFill>
@@ -8111,7 +8850,7 @@
       </p:sp>
       <p:sp>
         <p:nvSpPr>
-          <p:cNvPr id="135" name="Google Shape;135;p20"/>
+          <p:cNvPr id="115" name="Google Shape;115;p19"/>
           <p:cNvSpPr txBox="1">
             <a:spLocks noGrp="1"/>
           </p:cNvSpPr>
@@ -8122,7 +8861,7 @@
         <p:spPr>
           <a:xfrm>
             <a:off x="5995601" y="1850300"/>
-            <a:ext cx="2478600" cy="2499115"/>
+            <a:ext cx="2478600" cy="2293931"/>
           </a:xfrm>
           <a:prstGeom prst="rect">
             <a:avLst/>
@@ -8141,7 +8880,7 @@
             </a:pPr>
             <a:r>
               <a:rPr lang="en-US" sz="1600" dirty="0"/>
-              <a:t>Valentine’s Day increases leisure travelers</a:t>
+              <a:t>Room types (standard, premium, suite) may increase odds of cancellation</a:t>
             </a:r>
           </a:p>
           <a:p>
@@ -8152,22 +8891,15 @@
             </a:pPr>
             <a:r>
               <a:rPr lang="en-US" sz="1600" dirty="0"/>
-              <a:t>Business travel still strong</a:t>
+              <a:t>Anonymous data limits interpretability</a:t>
             </a:r>
-          </a:p>
-          <a:p>
-            <a:pPr marL="285750" indent="-285750">
-              <a:spcAft>
-                <a:spcPts val="1600"/>
-              </a:spcAft>
-            </a:pPr>
-            <a:endParaRPr lang="en-US" sz="1600" dirty="0"/>
+            <a:endParaRPr sz="1600" dirty="0"/>
           </a:p>
         </p:txBody>
       </p:sp>
       <p:grpSp>
         <p:nvGrpSpPr>
-          <p:cNvPr id="136" name="Google Shape;136;p20"/>
+          <p:cNvPr id="116" name="Google Shape;116;p19"/>
           <p:cNvGrpSpPr/>
           <p:nvPr/>
         </p:nvGrpSpPr>
@@ -8181,7 +8913,7 @@
         </p:grpSpPr>
         <p:sp>
           <p:nvSpPr>
-            <p:cNvPr id="137" name="Google Shape;137;p20"/>
+            <p:cNvPr id="117" name="Google Shape;117;p19"/>
             <p:cNvSpPr txBox="1"/>
             <p:nvPr/>
           </p:nvSpPr>
@@ -8215,13 +8947,13 @@
                 </a:spcAft>
                 <a:buNone/>
               </a:pPr>
-              <a:endParaRPr dirty="0"/>
+              <a:endParaRPr/>
             </a:p>
           </p:txBody>
         </p:sp>
         <p:sp>
           <p:nvSpPr>
-            <p:cNvPr id="138" name="Google Shape;138;p20"/>
+            <p:cNvPr id="118" name="Google Shape;118;p19"/>
             <p:cNvSpPr/>
             <p:nvPr/>
           </p:nvSpPr>
@@ -8266,7 +8998,7 @@
       </p:grpSp>
       <p:sp>
         <p:nvSpPr>
-          <p:cNvPr id="139" name="Google Shape;139;p20"/>
+          <p:cNvPr id="119" name="Google Shape;119;p19"/>
           <p:cNvSpPr txBox="1">
             <a:spLocks noGrp="1"/>
           </p:cNvSpPr>
@@ -8289,34 +9021,23 @@
           </a:bodyPr>
           <a:lstStyle/>
           <a:p>
-            <a:pPr marL="0" lvl="0" indent="0" algn="l" rtl="0">
-              <a:spcBef>
-                <a:spcPts val="0"/>
-              </a:spcBef>
-              <a:spcAft>
-                <a:spcPts val="0"/>
-              </a:spcAft>
+            <a:pPr marL="0" lvl="0" indent="0">
               <a:buNone/>
             </a:pPr>
             <a:r>
-              <a:rPr lang="en" dirty="0">
+              <a:rPr lang="en-US" dirty="0">
                 <a:solidFill>
                   <a:schemeClr val="lt1"/>
                 </a:solidFill>
               </a:rPr>
-              <a:t>Booked for January</a:t>
+              <a:t>Post-New-Year’s</a:t>
             </a:r>
-            <a:endParaRPr dirty="0">
-              <a:solidFill>
-                <a:schemeClr val="lt1"/>
-              </a:solidFill>
-            </a:endParaRPr>
           </a:p>
         </p:txBody>
       </p:sp>
       <p:sp>
         <p:nvSpPr>
-          <p:cNvPr id="140" name="Google Shape;140;p20"/>
+          <p:cNvPr id="120" name="Google Shape;120;p19"/>
           <p:cNvSpPr txBox="1">
             <a:spLocks noGrp="1"/>
           </p:cNvSpPr>
@@ -8326,7 +9047,7 @@
         </p:nvSpPr>
         <p:spPr>
           <a:xfrm>
-            <a:off x="3251525" y="1850300"/>
+            <a:off x="3249625" y="1952108"/>
             <a:ext cx="2478600" cy="2499115"/>
           </a:xfrm>
           <a:prstGeom prst="rect">
@@ -8346,7 +9067,7 @@
             </a:pPr>
             <a:r>
               <a:rPr lang="en-US" sz="1600" dirty="0"/>
-              <a:t>Business travel resumes post-holidays</a:t>
+              <a:t>Decreased odds of cancellations</a:t>
             </a:r>
           </a:p>
           <a:p>
@@ -8357,7 +9078,7 @@
             </a:pPr>
             <a:r>
               <a:rPr lang="en-US" sz="1600" dirty="0"/>
-              <a:t>Fewer leisure travelers</a:t>
+              <a:t>Business travel resumes</a:t>
             </a:r>
           </a:p>
           <a:p>
@@ -8368,7 +9089,7 @@
             </a:pPr>
             <a:r>
               <a:rPr lang="en-US" sz="1600" dirty="0"/>
-              <a:t>Assumes hotel in Northern Hemisphere (winter season)</a:t>
+              <a:t>Leisure travel slows post-holidays</a:t>
             </a:r>
           </a:p>
         </p:txBody>
@@ -8378,7 +9099,7 @@
           <p:cNvPr id="2" name="Slide Number Placeholder 1">
             <a:extLst>
               <a:ext uri="{FF2B5EF4-FFF2-40B4-BE49-F238E27FC236}">
-                <a16:creationId xmlns:a16="http://schemas.microsoft.com/office/drawing/2014/main" id="{6DE6EA75-86ED-49B5-AF52-88DEE9BD8A40}"/>
+                <a16:creationId xmlns:a16="http://schemas.microsoft.com/office/drawing/2014/main" id="{F70DF4B3-D8F1-4C13-9366-25E925066C97}"/>
               </a:ext>
             </a:extLst>
           </p:cNvPr>
@@ -8405,20 +9126,22 @@
             </a:pPr>
             <a:fld id="{00000000-1234-1234-1234-123412341234}" type="slidenum">
               <a:rPr lang="en" smtClean="0"/>
-              <a:t>10</a:t>
+              <a:t>11</a:t>
             </a:fld>
             <a:endParaRPr lang="en"/>
           </a:p>
         </p:txBody>
       </p:sp>
     </p:spTree>
+    <p:extLst>
+      <p:ext uri="{BB962C8B-B14F-4D97-AF65-F5344CB8AC3E}">
+        <p14:creationId xmlns:p14="http://schemas.microsoft.com/office/powerpoint/2010/main" val="3581315976"/>
+      </p:ext>
+    </p:extLst>
   </p:cSld>
   <p:clrMapOvr>
     <a:masterClrMapping/>
   </p:clrMapOvr>
-  <p:transition spd="med">
-    <p:fade thruBlk="1"/>
-  </p:transition>
   <p:timing>
     <p:tnLst>
       <p:par>
@@ -8456,7 +9179,7 @@
                                           </p:stCondLst>
                                         </p:cTn>
                                         <p:tgtEl>
-                                          <p:spTgt spid="125"/>
+                                          <p:spTgt spid="105"/>
                                         </p:tgtEl>
                                         <p:attrNameLst>
                                           <p:attrName>style.visibility</p:attrName>
@@ -8470,7 +9193,7 @@
                                       <p:cBhvr>
                                         <p:cTn id="7" dur="500"/>
                                         <p:tgtEl>
-                                          <p:spTgt spid="125"/>
+                                          <p:spTgt spid="105"/>
                                         </p:tgtEl>
                                       </p:cBhvr>
                                     </p:animEffect>
@@ -8500,7 +9223,7 @@
                                           </p:stCondLst>
                                         </p:cTn>
                                         <p:tgtEl>
-                                          <p:spTgt spid="129"/>
+                                          <p:spTgt spid="109"/>
                                         </p:tgtEl>
                                         <p:attrNameLst>
                                           <p:attrName>style.visibility</p:attrName>
@@ -8514,7 +9237,7 @@
                                       <p:cBhvr>
                                         <p:cTn id="11" dur="500"/>
                                         <p:tgtEl>
-                                          <p:spTgt spid="129"/>
+                                          <p:spTgt spid="109"/>
                                         </p:tgtEl>
                                       </p:cBhvr>
                                     </p:animEffect>
@@ -8535,7 +9258,7 @@
                                           </p:stCondLst>
                                         </p:cTn>
                                         <p:tgtEl>
-                                          <p:spTgt spid="126"/>
+                                          <p:spTgt spid="106"/>
                                         </p:tgtEl>
                                         <p:attrNameLst>
                                           <p:attrName>style.visibility</p:attrName>
@@ -8549,7 +9272,7 @@
                                       <p:cBhvr>
                                         <p:cTn id="14" dur="500"/>
                                         <p:tgtEl>
-                                          <p:spTgt spid="126"/>
+                                          <p:spTgt spid="106"/>
                                         </p:tgtEl>
                                       </p:cBhvr>
                                     </p:animEffect>
@@ -8579,7 +9302,7 @@
                                           </p:stCondLst>
                                         </p:cTn>
                                         <p:tgtEl>
-                                          <p:spTgt spid="130"/>
+                                          <p:spTgt spid="110"/>
                                         </p:tgtEl>
                                         <p:attrNameLst>
                                           <p:attrName>style.visibility</p:attrName>
@@ -8593,7 +9316,7 @@
                                       <p:cBhvr>
                                         <p:cTn id="18" dur="500"/>
                                         <p:tgtEl>
-                                          <p:spTgt spid="130"/>
+                                          <p:spTgt spid="110"/>
                                         </p:tgtEl>
                                       </p:cBhvr>
                                     </p:animEffect>
@@ -8632,7 +9355,7 @@
                                           </p:stCondLst>
                                         </p:cTn>
                                         <p:tgtEl>
-                                          <p:spTgt spid="139"/>
+                                          <p:spTgt spid="119"/>
                                         </p:tgtEl>
                                         <p:attrNameLst>
                                           <p:attrName>style.visibility</p:attrName>
@@ -8646,7 +9369,7 @@
                                       <p:cBhvr>
                                         <p:cTn id="23" dur="500"/>
                                         <p:tgtEl>
-                                          <p:spTgt spid="139"/>
+                                          <p:spTgt spid="119"/>
                                         </p:tgtEl>
                                       </p:cBhvr>
                                     </p:animEffect>
@@ -8667,7 +9390,7 @@
                                           </p:stCondLst>
                                         </p:cTn>
                                         <p:tgtEl>
-                                          <p:spTgt spid="136"/>
+                                          <p:spTgt spid="116"/>
                                         </p:tgtEl>
                                         <p:attrNameLst>
                                           <p:attrName>style.visibility</p:attrName>
@@ -8681,7 +9404,7 @@
                                       <p:cBhvr>
                                         <p:cTn id="26" dur="500"/>
                                         <p:tgtEl>
-                                          <p:spTgt spid="136"/>
+                                          <p:spTgt spid="116"/>
                                         </p:tgtEl>
                                       </p:cBhvr>
                                     </p:animEffect>
@@ -8711,7 +9434,7 @@
                                           </p:stCondLst>
                                         </p:cTn>
                                         <p:tgtEl>
-                                          <p:spTgt spid="140"/>
+                                          <p:spTgt spid="120"/>
                                         </p:tgtEl>
                                         <p:attrNameLst>
                                           <p:attrName>style.visibility</p:attrName>
@@ -8725,7 +9448,7 @@
                                       <p:cBhvr>
                                         <p:cTn id="30" dur="500"/>
                                         <p:tgtEl>
-                                          <p:spTgt spid="140"/>
+                                          <p:spTgt spid="120"/>
                                         </p:tgtEl>
                                       </p:cBhvr>
                                     </p:animEffect>
@@ -8764,7 +9487,7 @@
                                           </p:stCondLst>
                                         </p:cTn>
                                         <p:tgtEl>
-                                          <p:spTgt spid="134"/>
+                                          <p:spTgt spid="114"/>
                                         </p:tgtEl>
                                         <p:attrNameLst>
                                           <p:attrName>style.visibility</p:attrName>
@@ -8778,7 +9501,7 @@
                                       <p:cBhvr>
                                         <p:cTn id="35" dur="500"/>
                                         <p:tgtEl>
-                                          <p:spTgt spid="134"/>
+                                          <p:spTgt spid="114"/>
                                         </p:tgtEl>
                                       </p:cBhvr>
                                     </p:animEffect>
@@ -8799,7 +9522,7 @@
                                           </p:stCondLst>
                                         </p:cTn>
                                         <p:tgtEl>
-                                          <p:spTgt spid="131"/>
+                                          <p:spTgt spid="111"/>
                                         </p:tgtEl>
                                         <p:attrNameLst>
                                           <p:attrName>style.visibility</p:attrName>
@@ -8813,7 +9536,7 @@
                                       <p:cBhvr>
                                         <p:cTn id="38" dur="500"/>
                                         <p:tgtEl>
-                                          <p:spTgt spid="131"/>
+                                          <p:spTgt spid="111"/>
                                         </p:tgtEl>
                                       </p:cBhvr>
                                     </p:animEffect>
@@ -8843,7 +9566,7 @@
                                           </p:stCondLst>
                                         </p:cTn>
                                         <p:tgtEl>
-                                          <p:spTgt spid="135"/>
+                                          <p:spTgt spid="115"/>
                                         </p:tgtEl>
                                         <p:attrNameLst>
                                           <p:attrName>style.visibility</p:attrName>
@@ -8857,7 +9580,7 @@
                                       <p:cBhvr>
                                         <p:cTn id="42" dur="500"/>
                                         <p:tgtEl>
-                                          <p:spTgt spid="135"/>
+                                          <p:spTgt spid="115"/>
                                         </p:tgtEl>
                                       </p:cBhvr>
                                     </p:animEffect>
@@ -8895,7 +9618,7 @@
 </p:sld>
 </file>
 
-<file path=ppt/slides/slide11.xml><?xml version="1.0" encoding="utf-8"?>
+<file path=ppt/slides/slide12.xml><?xml version="1.0" encoding="utf-8"?>
 <p:sld xmlns:a="http://schemas.openxmlformats.org/drawingml/2006/main" xmlns:r="http://schemas.openxmlformats.org/officeDocument/2006/relationships" xmlns:p="http://schemas.openxmlformats.org/presentationml/2006/main">
   <p:cSld>
     <p:bg>
@@ -8932,8 +9655,8 @@
         </p:nvSpPr>
         <p:spPr>
           <a:xfrm>
-            <a:off x="235500" y="250800"/>
-            <a:ext cx="2808000" cy="755700"/>
+            <a:off x="235499" y="250800"/>
+            <a:ext cx="6945229" cy="755700"/>
           </a:xfrm>
           <a:prstGeom prst="rect">
             <a:avLst/>
@@ -8965,10 +9688,10 @@
               <a:buNone/>
             </a:pPr>
             <a:r>
-              <a:rPr lang="en" sz="3000"/>
-              <a:t>Visualizing Results</a:t>
+              <a:rPr lang="en-US" sz="3000" dirty="0"/>
+              <a:t>Branching Out with the Random Forest Classifier</a:t>
             </a:r>
-            <a:endParaRPr sz="3000"/>
+            <a:endParaRPr sz="3000" dirty="0"/>
           </a:p>
         </p:txBody>
       </p:sp>
@@ -8979,26 +9702,14 @@
           <p:nvPr/>
         </p:nvPicPr>
         <p:blipFill>
-          <a:blip r:embed="rId3">
-            <a:extLst>
-              <a:ext uri="{BEBA8EAE-BF5A-486C-A8C5-ECC9F3942E4B}">
-                <a14:imgProps xmlns:a14="http://schemas.microsoft.com/office/drawing/2010/main">
-                  <a14:imgLayer r:embed="rId4">
-                    <a14:imgEffect>
-                      <a14:saturation sat="33000"/>
-                    </a14:imgEffect>
-                  </a14:imgLayer>
-                </a14:imgProps>
-              </a:ext>
-            </a:extLst>
-          </a:blip>
+          <a:blip r:embed="rId3"/>
           <a:srcRect/>
           <a:stretch/>
         </p:blipFill>
         <p:spPr>
           <a:xfrm>
-            <a:off x="1595549" y="1006500"/>
-            <a:ext cx="5952901" cy="3746616"/>
+            <a:off x="3356061" y="1006500"/>
+            <a:ext cx="5408539" cy="3746616"/>
           </a:xfrm>
           <a:prstGeom prst="rect">
             <a:avLst/>
@@ -9048,9 +9759,44 @@
             </a:pPr>
             <a:fld id="{00000000-1234-1234-1234-123412341234}" type="slidenum">
               <a:rPr lang="en" smtClean="0"/>
-              <a:t>11</a:t>
+              <a:t>12</a:t>
             </a:fld>
             <a:endParaRPr lang="en"/>
+          </a:p>
+        </p:txBody>
+      </p:sp>
+      <p:sp>
+        <p:nvSpPr>
+          <p:cNvPr id="4" name="TextBox 3">
+            <a:extLst>
+              <a:ext uri="{FF2B5EF4-FFF2-40B4-BE49-F238E27FC236}">
+                <a16:creationId xmlns:a16="http://schemas.microsoft.com/office/drawing/2014/main" id="{A32A54FD-950D-4240-A3D6-49C39B5EEB5D}"/>
+              </a:ext>
+            </a:extLst>
+          </p:cNvPr>
+          <p:cNvSpPr txBox="1"/>
+          <p:nvPr/>
+        </p:nvSpPr>
+        <p:spPr>
+          <a:xfrm>
+            <a:off x="379400" y="1006500"/>
+            <a:ext cx="2487706" cy="523220"/>
+          </a:xfrm>
+          <a:prstGeom prst="rect">
+            <a:avLst/>
+          </a:prstGeom>
+          <a:noFill/>
+        </p:spPr>
+        <p:txBody>
+          <a:bodyPr wrap="square" rtlCol="0">
+            <a:spAutoFit/>
+          </a:bodyPr>
+          <a:lstStyle/>
+          <a:p>
+            <a:r>
+              <a:rPr lang="en-US" dirty="0"/>
+              <a:t>HOW TO INTERPRET THE VISUALIZATION</a:t>
+            </a:r>
           </a:p>
         </p:txBody>
       </p:sp>
@@ -9192,7 +9938,1198 @@
 </p:sld>
 </file>
 
-<file path=ppt/slides/slide12.xml><?xml version="1.0" encoding="utf-8"?>
+<file path=ppt/slides/slide13.xml><?xml version="1.0" encoding="utf-8"?>
+<p:sld xmlns:a="http://schemas.openxmlformats.org/drawingml/2006/main" xmlns:r="http://schemas.openxmlformats.org/officeDocument/2006/relationships" xmlns:p="http://schemas.openxmlformats.org/presentationml/2006/main">
+  <p:cSld>
+    <p:spTree>
+      <p:nvGrpSpPr>
+        <p:cNvPr id="1" name="Shape 104"/>
+        <p:cNvGrpSpPr/>
+        <p:nvPr/>
+      </p:nvGrpSpPr>
+      <p:grpSpPr>
+        <a:xfrm>
+          <a:off x="0" y="0"/>
+          <a:ext cx="0" cy="0"/>
+          <a:chOff x="0" y="0"/>
+          <a:chExt cx="0" cy="0"/>
+        </a:xfrm>
+      </p:grpSpPr>
+      <p:sp>
+        <p:nvSpPr>
+          <p:cNvPr id="105" name="Google Shape;105;p19"/>
+          <p:cNvSpPr txBox="1">
+            <a:spLocks noGrp="1"/>
+          </p:cNvSpPr>
+          <p:nvPr>
+            <p:ph type="title"/>
+          </p:nvPr>
+        </p:nvSpPr>
+        <p:spPr>
+          <a:xfrm>
+            <a:off x="311700" y="445025"/>
+            <a:ext cx="8520600" cy="572700"/>
+          </a:xfrm>
+          <a:prstGeom prst="rect">
+            <a:avLst/>
+          </a:prstGeom>
+          <a:effectLst>
+            <a:outerShdw blurRad="57150" dist="19050" dir="5400000" algn="bl" rotWithShape="0">
+              <a:srgbClr val="000000">
+                <a:alpha val="50000"/>
+              </a:srgbClr>
+            </a:outerShdw>
+          </a:effectLst>
+        </p:spPr>
+        <p:txBody>
+          <a:bodyPr spcFirstLastPara="1" wrap="square" lIns="91425" tIns="91425" rIns="91425" bIns="91425" anchor="t" anchorCtr="0">
+            <a:noAutofit/>
+          </a:bodyPr>
+          <a:lstStyle/>
+          <a:p>
+            <a:pPr marL="0" lvl="0" indent="0" algn="l" rtl="0">
+              <a:spcBef>
+                <a:spcPts val="0"/>
+              </a:spcBef>
+              <a:spcAft>
+                <a:spcPts val="0"/>
+              </a:spcAft>
+              <a:buNone/>
+            </a:pPr>
+            <a:r>
+              <a:rPr lang="en-US" dirty="0"/>
+              <a:t>Strongest Characteristics – Random Forest Classifier</a:t>
+            </a:r>
+            <a:endParaRPr dirty="0"/>
+          </a:p>
+          <a:p>
+            <a:pPr marL="0" lvl="0" indent="0" algn="l" rtl="0">
+              <a:spcBef>
+                <a:spcPts val="0"/>
+              </a:spcBef>
+              <a:spcAft>
+                <a:spcPts val="0"/>
+              </a:spcAft>
+              <a:buNone/>
+            </a:pPr>
+            <a:endParaRPr dirty="0"/>
+          </a:p>
+        </p:txBody>
+      </p:sp>
+      <p:grpSp>
+        <p:nvGrpSpPr>
+          <p:cNvPr id="106" name="Google Shape;106;p19"/>
+          <p:cNvGrpSpPr/>
+          <p:nvPr/>
+        </p:nvGrpSpPr>
+        <p:grpSpPr>
+          <a:xfrm>
+            <a:off x="417124" y="1304875"/>
+            <a:ext cx="2628925" cy="3416400"/>
+            <a:chOff x="431925" y="1304875"/>
+            <a:chExt cx="2628925" cy="3416400"/>
+          </a:xfrm>
+        </p:grpSpPr>
+        <p:sp>
+          <p:nvSpPr>
+            <p:cNvPr id="107" name="Google Shape;107;p19"/>
+            <p:cNvSpPr txBox="1"/>
+            <p:nvPr/>
+          </p:nvSpPr>
+          <p:spPr>
+            <a:xfrm>
+              <a:off x="431925" y="1304875"/>
+              <a:ext cx="2628900" cy="464100"/>
+            </a:xfrm>
+            <a:prstGeom prst="rect">
+              <a:avLst/>
+            </a:prstGeom>
+            <a:solidFill>
+              <a:schemeClr val="dk1"/>
+            </a:solidFill>
+            <a:ln>
+              <a:noFill/>
+            </a:ln>
+          </p:spPr>
+          <p:txBody>
+            <a:bodyPr spcFirstLastPara="1" wrap="square" lIns="91425" tIns="91425" rIns="91425" bIns="91425" anchor="ctr" anchorCtr="0">
+              <a:noAutofit/>
+            </a:bodyPr>
+            <a:lstStyle/>
+            <a:p>
+              <a:pPr marL="0" lvl="0" indent="0" algn="l" rtl="0">
+                <a:spcBef>
+                  <a:spcPts val="0"/>
+                </a:spcBef>
+                <a:spcAft>
+                  <a:spcPts val="0"/>
+                </a:spcAft>
+                <a:buNone/>
+              </a:pPr>
+              <a:endParaRPr dirty="0"/>
+            </a:p>
+          </p:txBody>
+        </p:sp>
+        <p:sp>
+          <p:nvSpPr>
+            <p:cNvPr id="108" name="Google Shape;108;p19"/>
+            <p:cNvSpPr/>
+            <p:nvPr/>
+          </p:nvSpPr>
+          <p:spPr>
+            <a:xfrm>
+              <a:off x="431950" y="1304875"/>
+              <a:ext cx="2628900" cy="3416400"/>
+            </a:xfrm>
+            <a:prstGeom prst="rect">
+              <a:avLst/>
+            </a:prstGeom>
+            <a:noFill/>
+            <a:ln w="9525" cap="flat" cmpd="sng">
+              <a:solidFill>
+                <a:schemeClr val="dk1"/>
+              </a:solidFill>
+              <a:prstDash val="solid"/>
+              <a:round/>
+              <a:headEnd type="none" w="sm" len="sm"/>
+              <a:tailEnd type="none" w="sm" len="sm"/>
+            </a:ln>
+          </p:spPr>
+          <p:txBody>
+            <a:bodyPr spcFirstLastPara="1" wrap="square" lIns="91425" tIns="91425" rIns="91425" bIns="91425" anchor="ctr" anchorCtr="0">
+              <a:noAutofit/>
+            </a:bodyPr>
+            <a:lstStyle/>
+            <a:p>
+              <a:pPr marL="0" lvl="0" indent="0" algn="l" rtl="0">
+                <a:spcBef>
+                  <a:spcPts val="0"/>
+                </a:spcBef>
+                <a:spcAft>
+                  <a:spcPts val="0"/>
+                </a:spcAft>
+                <a:buNone/>
+              </a:pPr>
+              <a:endParaRPr/>
+            </a:p>
+          </p:txBody>
+        </p:sp>
+      </p:grpSp>
+      <p:sp>
+        <p:nvSpPr>
+          <p:cNvPr id="109" name="Google Shape;109;p19"/>
+          <p:cNvSpPr txBox="1">
+            <a:spLocks noGrp="1"/>
+          </p:cNvSpPr>
+          <p:nvPr>
+            <p:ph type="body" idx="4294967295"/>
+          </p:nvPr>
+        </p:nvSpPr>
+        <p:spPr>
+          <a:xfrm>
+            <a:off x="491624" y="1304875"/>
+            <a:ext cx="2494500" cy="461400"/>
+          </a:xfrm>
+          <a:prstGeom prst="rect">
+            <a:avLst/>
+          </a:prstGeom>
+        </p:spPr>
+        <p:txBody>
+          <a:bodyPr spcFirstLastPara="1" wrap="square" lIns="91425" tIns="91425" rIns="91425" bIns="91425" anchor="t" anchorCtr="0">
+            <a:noAutofit/>
+          </a:bodyPr>
+          <a:lstStyle/>
+          <a:p>
+            <a:pPr marL="0" lvl="0" indent="0" algn="l" rtl="0">
+              <a:spcBef>
+                <a:spcPts val="0"/>
+              </a:spcBef>
+              <a:spcAft>
+                <a:spcPts val="0"/>
+              </a:spcAft>
+              <a:buNone/>
+            </a:pPr>
+            <a:r>
+              <a:rPr lang="en-US" dirty="0">
+                <a:solidFill>
+                  <a:schemeClr val="lt1"/>
+                </a:solidFill>
+              </a:rPr>
+              <a:t>Country of Origin</a:t>
+            </a:r>
+            <a:endParaRPr dirty="0">
+              <a:solidFill>
+                <a:schemeClr val="lt1"/>
+              </a:solidFill>
+            </a:endParaRPr>
+          </a:p>
+        </p:txBody>
+      </p:sp>
+      <p:sp>
+        <p:nvSpPr>
+          <p:cNvPr id="110" name="Google Shape;110;p19"/>
+          <p:cNvSpPr txBox="1">
+            <a:spLocks noGrp="1"/>
+          </p:cNvSpPr>
+          <p:nvPr>
+            <p:ph type="body" idx="4294967295"/>
+          </p:nvPr>
+        </p:nvSpPr>
+        <p:spPr>
+          <a:xfrm>
+            <a:off x="493524" y="1850300"/>
+            <a:ext cx="2478600" cy="2293931"/>
+          </a:xfrm>
+          <a:prstGeom prst="rect">
+            <a:avLst/>
+          </a:prstGeom>
+        </p:spPr>
+        <p:txBody>
+          <a:bodyPr spcFirstLastPara="1" wrap="square" lIns="91425" tIns="91425" rIns="91425" bIns="91425" anchor="t" anchorCtr="0">
+            <a:spAutoFit/>
+          </a:bodyPr>
+          <a:lstStyle/>
+          <a:p>
+            <a:pPr marL="285750" indent="-285750">
+              <a:spcAft>
+                <a:spcPts val="1600"/>
+              </a:spcAft>
+            </a:pPr>
+            <a:r>
+              <a:rPr lang="en-US" sz="1600" dirty="0"/>
+              <a:t>Reservations from Portugal </a:t>
+            </a:r>
+          </a:p>
+          <a:p>
+            <a:pPr marL="285750" indent="-285750">
+              <a:spcAft>
+                <a:spcPts val="1600"/>
+              </a:spcAft>
+            </a:pPr>
+            <a:r>
+              <a:rPr lang="en-US" sz="1600" dirty="0"/>
+              <a:t>Most reservations from Portugal – limits impact of other countries</a:t>
+            </a:r>
+            <a:endParaRPr sz="1200" dirty="0"/>
+          </a:p>
+        </p:txBody>
+      </p:sp>
+      <p:grpSp>
+        <p:nvGrpSpPr>
+          <p:cNvPr id="111" name="Google Shape;111;p19"/>
+          <p:cNvGrpSpPr/>
+          <p:nvPr/>
+        </p:nvGrpSpPr>
+        <p:grpSpPr>
+          <a:xfrm>
+            <a:off x="5918651" y="1304875"/>
+            <a:ext cx="2632500" cy="3416400"/>
+            <a:chOff x="3320450" y="1304875"/>
+            <a:chExt cx="2632500" cy="3416400"/>
+          </a:xfrm>
+        </p:grpSpPr>
+        <p:sp>
+          <p:nvSpPr>
+            <p:cNvPr id="112" name="Google Shape;112;p19"/>
+            <p:cNvSpPr txBox="1"/>
+            <p:nvPr/>
+          </p:nvSpPr>
+          <p:spPr>
+            <a:xfrm>
+              <a:off x="3324050" y="1304875"/>
+              <a:ext cx="2628900" cy="464100"/>
+            </a:xfrm>
+            <a:prstGeom prst="rect">
+              <a:avLst/>
+            </a:prstGeom>
+            <a:solidFill>
+              <a:schemeClr val="dk1"/>
+            </a:solidFill>
+            <a:ln>
+              <a:noFill/>
+            </a:ln>
+          </p:spPr>
+          <p:txBody>
+            <a:bodyPr spcFirstLastPara="1" wrap="square" lIns="91425" tIns="91425" rIns="91425" bIns="91425" anchor="ctr" anchorCtr="0">
+              <a:noAutofit/>
+            </a:bodyPr>
+            <a:lstStyle/>
+            <a:p>
+              <a:pPr marL="0" lvl="0" indent="0" algn="l" rtl="0">
+                <a:spcBef>
+                  <a:spcPts val="0"/>
+                </a:spcBef>
+                <a:spcAft>
+                  <a:spcPts val="0"/>
+                </a:spcAft>
+                <a:buNone/>
+              </a:pPr>
+              <a:endParaRPr/>
+            </a:p>
+          </p:txBody>
+        </p:sp>
+        <p:sp>
+          <p:nvSpPr>
+            <p:cNvPr id="113" name="Google Shape;113;p19"/>
+            <p:cNvSpPr/>
+            <p:nvPr/>
+          </p:nvSpPr>
+          <p:spPr>
+            <a:xfrm>
+              <a:off x="3320450" y="1304875"/>
+              <a:ext cx="2628900" cy="3416400"/>
+            </a:xfrm>
+            <a:prstGeom prst="rect">
+              <a:avLst/>
+            </a:prstGeom>
+            <a:noFill/>
+            <a:ln w="9525" cap="flat" cmpd="sng">
+              <a:solidFill>
+                <a:schemeClr val="dk1"/>
+              </a:solidFill>
+              <a:prstDash val="solid"/>
+              <a:round/>
+              <a:headEnd type="none" w="sm" len="sm"/>
+              <a:tailEnd type="none" w="sm" len="sm"/>
+            </a:ln>
+          </p:spPr>
+          <p:txBody>
+            <a:bodyPr spcFirstLastPara="1" wrap="square" lIns="91425" tIns="91425" rIns="91425" bIns="91425" anchor="ctr" anchorCtr="0">
+              <a:noAutofit/>
+            </a:bodyPr>
+            <a:lstStyle/>
+            <a:p>
+              <a:pPr marL="0" lvl="0" indent="0" algn="l" rtl="0">
+                <a:spcBef>
+                  <a:spcPts val="0"/>
+                </a:spcBef>
+                <a:spcAft>
+                  <a:spcPts val="0"/>
+                </a:spcAft>
+                <a:buNone/>
+              </a:pPr>
+              <a:endParaRPr/>
+            </a:p>
+          </p:txBody>
+        </p:sp>
+      </p:grpSp>
+      <p:sp>
+        <p:nvSpPr>
+          <p:cNvPr id="114" name="Google Shape;114;p19"/>
+          <p:cNvSpPr txBox="1">
+            <a:spLocks noGrp="1"/>
+          </p:cNvSpPr>
+          <p:nvPr>
+            <p:ph type="body" idx="4294967295"/>
+          </p:nvPr>
+        </p:nvSpPr>
+        <p:spPr>
+          <a:xfrm>
+            <a:off x="5987651" y="1304875"/>
+            <a:ext cx="2494500" cy="461400"/>
+          </a:xfrm>
+          <a:prstGeom prst="rect">
+            <a:avLst/>
+          </a:prstGeom>
+        </p:spPr>
+        <p:txBody>
+          <a:bodyPr spcFirstLastPara="1" wrap="square" lIns="91425" tIns="91425" rIns="91425" bIns="91425" anchor="t" anchorCtr="0">
+            <a:noAutofit/>
+          </a:bodyPr>
+          <a:lstStyle/>
+          <a:p>
+            <a:pPr marL="0" lvl="0" indent="0" algn="l" rtl="0">
+              <a:spcBef>
+                <a:spcPts val="0"/>
+              </a:spcBef>
+              <a:spcAft>
+                <a:spcPts val="0"/>
+              </a:spcAft>
+              <a:buNone/>
+            </a:pPr>
+            <a:r>
+              <a:rPr lang="en-US" dirty="0">
+                <a:solidFill>
+                  <a:schemeClr val="lt1"/>
+                </a:solidFill>
+              </a:rPr>
+              <a:t>Lead Time</a:t>
+            </a:r>
+            <a:endParaRPr dirty="0">
+              <a:solidFill>
+                <a:schemeClr val="lt1"/>
+              </a:solidFill>
+            </a:endParaRPr>
+          </a:p>
+        </p:txBody>
+      </p:sp>
+      <p:sp>
+        <p:nvSpPr>
+          <p:cNvPr id="115" name="Google Shape;115;p19"/>
+          <p:cNvSpPr txBox="1">
+            <a:spLocks noGrp="1"/>
+          </p:cNvSpPr>
+          <p:nvPr>
+            <p:ph type="body" idx="4294967295"/>
+          </p:nvPr>
+        </p:nvSpPr>
+        <p:spPr>
+          <a:xfrm>
+            <a:off x="5995601" y="1850300"/>
+            <a:ext cx="2478600" cy="2010777"/>
+          </a:xfrm>
+          <a:prstGeom prst="rect">
+            <a:avLst/>
+          </a:prstGeom>
+        </p:spPr>
+        <p:txBody>
+          <a:bodyPr spcFirstLastPara="1" wrap="square" lIns="91425" tIns="91425" rIns="91425" bIns="91425" anchor="t" anchorCtr="0">
+            <a:spAutoFit/>
+          </a:bodyPr>
+          <a:lstStyle/>
+          <a:p>
+            <a:pPr marL="285750" indent="-285750">
+              <a:spcAft>
+                <a:spcPts val="1600"/>
+              </a:spcAft>
+            </a:pPr>
+            <a:r>
+              <a:rPr lang="en-US" sz="1600" dirty="0"/>
+              <a:t>Book far in advance of arrival - more time for plans to change</a:t>
+            </a:r>
+          </a:p>
+          <a:p>
+            <a:pPr marL="285750" indent="-285750">
+              <a:spcAft>
+                <a:spcPts val="1600"/>
+              </a:spcAft>
+            </a:pPr>
+            <a:r>
+              <a:rPr lang="en-US" sz="1600" dirty="0"/>
+              <a:t>Shorter time – more committed to stay</a:t>
+            </a:r>
+          </a:p>
+        </p:txBody>
+      </p:sp>
+      <p:grpSp>
+        <p:nvGrpSpPr>
+          <p:cNvPr id="116" name="Google Shape;116;p19"/>
+          <p:cNvGrpSpPr/>
+          <p:nvPr/>
+        </p:nvGrpSpPr>
+        <p:grpSpPr>
+          <a:xfrm>
+            <a:off x="3175125" y="1304875"/>
+            <a:ext cx="2628925" cy="3416400"/>
+            <a:chOff x="431925" y="1304875"/>
+            <a:chExt cx="2628925" cy="3416400"/>
+          </a:xfrm>
+        </p:grpSpPr>
+        <p:sp>
+          <p:nvSpPr>
+            <p:cNvPr id="117" name="Google Shape;117;p19"/>
+            <p:cNvSpPr txBox="1"/>
+            <p:nvPr/>
+          </p:nvSpPr>
+          <p:spPr>
+            <a:xfrm>
+              <a:off x="431925" y="1304875"/>
+              <a:ext cx="2628900" cy="464100"/>
+            </a:xfrm>
+            <a:prstGeom prst="rect">
+              <a:avLst/>
+            </a:prstGeom>
+            <a:solidFill>
+              <a:schemeClr val="dk1"/>
+            </a:solidFill>
+            <a:ln>
+              <a:noFill/>
+            </a:ln>
+          </p:spPr>
+          <p:txBody>
+            <a:bodyPr spcFirstLastPara="1" wrap="square" lIns="91425" tIns="91425" rIns="91425" bIns="91425" anchor="ctr" anchorCtr="0">
+              <a:noAutofit/>
+            </a:bodyPr>
+            <a:lstStyle/>
+            <a:p>
+              <a:pPr marL="0" lvl="0" indent="0" algn="l" rtl="0">
+                <a:spcBef>
+                  <a:spcPts val="0"/>
+                </a:spcBef>
+                <a:spcAft>
+                  <a:spcPts val="0"/>
+                </a:spcAft>
+                <a:buNone/>
+              </a:pPr>
+              <a:endParaRPr/>
+            </a:p>
+          </p:txBody>
+        </p:sp>
+        <p:sp>
+          <p:nvSpPr>
+            <p:cNvPr id="118" name="Google Shape;118;p19"/>
+            <p:cNvSpPr/>
+            <p:nvPr/>
+          </p:nvSpPr>
+          <p:spPr>
+            <a:xfrm>
+              <a:off x="431950" y="1304875"/>
+              <a:ext cx="2628900" cy="3416400"/>
+            </a:xfrm>
+            <a:prstGeom prst="rect">
+              <a:avLst/>
+            </a:prstGeom>
+            <a:noFill/>
+            <a:ln w="9525" cap="flat" cmpd="sng">
+              <a:solidFill>
+                <a:schemeClr val="dk1"/>
+              </a:solidFill>
+              <a:prstDash val="solid"/>
+              <a:round/>
+              <a:headEnd type="none" w="sm" len="sm"/>
+              <a:tailEnd type="none" w="sm" len="sm"/>
+            </a:ln>
+          </p:spPr>
+          <p:txBody>
+            <a:bodyPr spcFirstLastPara="1" wrap="square" lIns="91425" tIns="91425" rIns="91425" bIns="91425" anchor="ctr" anchorCtr="0">
+              <a:noAutofit/>
+            </a:bodyPr>
+            <a:lstStyle/>
+            <a:p>
+              <a:pPr marL="0" lvl="0" indent="0" algn="l" rtl="0">
+                <a:spcBef>
+                  <a:spcPts val="0"/>
+                </a:spcBef>
+                <a:spcAft>
+                  <a:spcPts val="0"/>
+                </a:spcAft>
+                <a:buNone/>
+              </a:pPr>
+              <a:endParaRPr/>
+            </a:p>
+          </p:txBody>
+        </p:sp>
+      </p:grpSp>
+      <p:sp>
+        <p:nvSpPr>
+          <p:cNvPr id="119" name="Google Shape;119;p19"/>
+          <p:cNvSpPr txBox="1">
+            <a:spLocks noGrp="1"/>
+          </p:cNvSpPr>
+          <p:nvPr>
+            <p:ph type="body" idx="4294967295"/>
+          </p:nvPr>
+        </p:nvSpPr>
+        <p:spPr>
+          <a:xfrm>
+            <a:off x="3249625" y="1304875"/>
+            <a:ext cx="2494500" cy="461400"/>
+          </a:xfrm>
+          <a:prstGeom prst="rect">
+            <a:avLst/>
+          </a:prstGeom>
+        </p:spPr>
+        <p:txBody>
+          <a:bodyPr spcFirstLastPara="1" wrap="square" lIns="91425" tIns="91425" rIns="91425" bIns="91425" anchor="t" anchorCtr="0">
+            <a:noAutofit/>
+          </a:bodyPr>
+          <a:lstStyle/>
+          <a:p>
+            <a:pPr marL="0" lvl="0" indent="0">
+              <a:buNone/>
+            </a:pPr>
+            <a:r>
+              <a:rPr lang="en-US" dirty="0">
+                <a:solidFill>
+                  <a:schemeClr val="lt1"/>
+                </a:solidFill>
+              </a:rPr>
+              <a:t>Number of Requests</a:t>
+            </a:r>
+          </a:p>
+        </p:txBody>
+      </p:sp>
+      <p:sp>
+        <p:nvSpPr>
+          <p:cNvPr id="120" name="Google Shape;120;p19"/>
+          <p:cNvSpPr txBox="1">
+            <a:spLocks noGrp="1"/>
+          </p:cNvSpPr>
+          <p:nvPr>
+            <p:ph type="body" idx="4294967295"/>
+          </p:nvPr>
+        </p:nvSpPr>
+        <p:spPr>
+          <a:xfrm>
+            <a:off x="3251525" y="1850300"/>
+            <a:ext cx="2478600" cy="2499115"/>
+          </a:xfrm>
+          <a:prstGeom prst="rect">
+            <a:avLst/>
+          </a:prstGeom>
+        </p:spPr>
+        <p:txBody>
+          <a:bodyPr spcFirstLastPara="1" wrap="square" lIns="91425" tIns="91425" rIns="91425" bIns="91425" anchor="t" anchorCtr="0">
+            <a:spAutoFit/>
+          </a:bodyPr>
+          <a:lstStyle/>
+          <a:p>
+            <a:pPr marL="285750" indent="-285750">
+              <a:spcAft>
+                <a:spcPts val="1600"/>
+              </a:spcAft>
+            </a:pPr>
+            <a:r>
+              <a:rPr lang="en-US" sz="1600" dirty="0"/>
+              <a:t>Fewer requests </a:t>
+            </a:r>
+          </a:p>
+          <a:p>
+            <a:pPr marL="285750" indent="-285750">
+              <a:spcAft>
+                <a:spcPts val="1600"/>
+              </a:spcAft>
+            </a:pPr>
+            <a:r>
+              <a:rPr lang="en-US" sz="1600" dirty="0"/>
+              <a:t>Greater number of requests may indicate guest is committed to staying</a:t>
+            </a:r>
+          </a:p>
+          <a:p>
+            <a:pPr marL="285750" indent="-285750">
+              <a:spcAft>
+                <a:spcPts val="1600"/>
+              </a:spcAft>
+            </a:pPr>
+            <a:endParaRPr lang="en-US" sz="1600" dirty="0"/>
+          </a:p>
+        </p:txBody>
+      </p:sp>
+      <p:sp>
+        <p:nvSpPr>
+          <p:cNvPr id="2" name="Slide Number Placeholder 1">
+            <a:extLst>
+              <a:ext uri="{FF2B5EF4-FFF2-40B4-BE49-F238E27FC236}">
+                <a16:creationId xmlns:a16="http://schemas.microsoft.com/office/drawing/2014/main" id="{F70DF4B3-D8F1-4C13-9366-25E925066C97}"/>
+              </a:ext>
+            </a:extLst>
+          </p:cNvPr>
+          <p:cNvSpPr>
+            <a:spLocks noGrp="1"/>
+          </p:cNvSpPr>
+          <p:nvPr>
+            <p:ph type="sldNum" idx="12"/>
+          </p:nvPr>
+        </p:nvSpPr>
+        <p:spPr/>
+        <p:txBody>
+          <a:bodyPr/>
+          <a:lstStyle/>
+          <a:p>
+            <a:pPr marL="0" lvl="0" indent="0" algn="r" rtl="0">
+              <a:spcBef>
+                <a:spcPts val="0"/>
+              </a:spcBef>
+              <a:spcAft>
+                <a:spcPts val="0"/>
+              </a:spcAft>
+              <a:buNone/>
+            </a:pPr>
+            <a:fld id="{00000000-1234-1234-1234-123412341234}" type="slidenum">
+              <a:rPr lang="en" smtClean="0"/>
+              <a:t>13</a:t>
+            </a:fld>
+            <a:endParaRPr lang="en"/>
+          </a:p>
+        </p:txBody>
+      </p:sp>
+    </p:spTree>
+    <p:extLst>
+      <p:ext uri="{BB962C8B-B14F-4D97-AF65-F5344CB8AC3E}">
+        <p14:creationId xmlns:p14="http://schemas.microsoft.com/office/powerpoint/2010/main" val="832844823"/>
+      </p:ext>
+    </p:extLst>
+  </p:cSld>
+  <p:clrMapOvr>
+    <a:masterClrMapping/>
+  </p:clrMapOvr>
+  <p:timing>
+    <p:tnLst>
+      <p:par>
+        <p:cTn id="1" dur="indefinite" restart="never" nodeType="tmRoot">
+          <p:childTnLst>
+            <p:seq concurrent="1" nextAc="seek">
+              <p:cTn id="2" dur="indefinite" nodeType="mainSeq">
+                <p:childTnLst>
+                  <p:par>
+                    <p:cTn id="3" fill="hold">
+                      <p:stCondLst>
+                        <p:cond delay="indefinite"/>
+                        <p:cond evt="onBegin" delay="0">
+                          <p:tn val="2"/>
+                        </p:cond>
+                      </p:stCondLst>
+                      <p:childTnLst>
+                        <p:par>
+                          <p:cTn id="4" fill="hold">
+                            <p:stCondLst>
+                              <p:cond delay="0"/>
+                            </p:stCondLst>
+                            <p:childTnLst>
+                              <p:par>
+                                <p:cTn id="5" presetID="10" presetClass="entr" presetSubtype="0" fill="hold" nodeType="withEffect">
+                                  <p:stCondLst>
+                                    <p:cond delay="0"/>
+                                  </p:stCondLst>
+                                  <p:childTnLst>
+                                    <p:set>
+                                      <p:cBhvr>
+                                        <p:cTn id="6" dur="1" fill="hold">
+                                          <p:stCondLst>
+                                            <p:cond delay="0"/>
+                                          </p:stCondLst>
+                                        </p:cTn>
+                                        <p:tgtEl>
+                                          <p:spTgt spid="105"/>
+                                        </p:tgtEl>
+                                        <p:attrNameLst>
+                                          <p:attrName>style.visibility</p:attrName>
+                                        </p:attrNameLst>
+                                      </p:cBhvr>
+                                      <p:to>
+                                        <p:strVal val="visible"/>
+                                      </p:to>
+                                    </p:set>
+                                    <p:animEffect transition="in" filter="fade">
+                                      <p:cBhvr>
+                                        <p:cTn id="7" dur="500"/>
+                                        <p:tgtEl>
+                                          <p:spTgt spid="105"/>
+                                        </p:tgtEl>
+                                      </p:cBhvr>
+                                    </p:animEffect>
+                                  </p:childTnLst>
+                                </p:cTn>
+                              </p:par>
+                            </p:childTnLst>
+                          </p:cTn>
+                        </p:par>
+                        <p:par>
+                          <p:cTn id="8" fill="hold">
+                            <p:stCondLst>
+                              <p:cond delay="500"/>
+                            </p:stCondLst>
+                            <p:childTnLst>
+                              <p:par>
+                                <p:cTn id="9" presetID="10" presetClass="entr" presetSubtype="0" fill="hold" nodeType="afterEffect">
+                                  <p:stCondLst>
+                                    <p:cond delay="0"/>
+                                  </p:stCondLst>
+                                  <p:childTnLst>
+                                    <p:set>
+                                      <p:cBhvr>
+                                        <p:cTn id="10" dur="1" fill="hold">
+                                          <p:stCondLst>
+                                            <p:cond delay="0"/>
+                                          </p:stCondLst>
+                                        </p:cTn>
+                                        <p:tgtEl>
+                                          <p:spTgt spid="109"/>
+                                        </p:tgtEl>
+                                        <p:attrNameLst>
+                                          <p:attrName>style.visibility</p:attrName>
+                                        </p:attrNameLst>
+                                      </p:cBhvr>
+                                      <p:to>
+                                        <p:strVal val="visible"/>
+                                      </p:to>
+                                    </p:set>
+                                    <p:animEffect transition="in" filter="fade">
+                                      <p:cBhvr>
+                                        <p:cTn id="11" dur="500"/>
+                                        <p:tgtEl>
+                                          <p:spTgt spid="109"/>
+                                        </p:tgtEl>
+                                      </p:cBhvr>
+                                    </p:animEffect>
+                                  </p:childTnLst>
+                                </p:cTn>
+                              </p:par>
+                              <p:par>
+                                <p:cTn id="12" presetID="10" presetClass="entr" presetSubtype="0" fill="hold" nodeType="withEffect">
+                                  <p:stCondLst>
+                                    <p:cond delay="0"/>
+                                  </p:stCondLst>
+                                  <p:childTnLst>
+                                    <p:set>
+                                      <p:cBhvr>
+                                        <p:cTn id="13" dur="1" fill="hold">
+                                          <p:stCondLst>
+                                            <p:cond delay="0"/>
+                                          </p:stCondLst>
+                                        </p:cTn>
+                                        <p:tgtEl>
+                                          <p:spTgt spid="106"/>
+                                        </p:tgtEl>
+                                        <p:attrNameLst>
+                                          <p:attrName>style.visibility</p:attrName>
+                                        </p:attrNameLst>
+                                      </p:cBhvr>
+                                      <p:to>
+                                        <p:strVal val="visible"/>
+                                      </p:to>
+                                    </p:set>
+                                    <p:animEffect transition="in" filter="fade">
+                                      <p:cBhvr>
+                                        <p:cTn id="14" dur="500"/>
+                                        <p:tgtEl>
+                                          <p:spTgt spid="106"/>
+                                        </p:tgtEl>
+                                      </p:cBhvr>
+                                    </p:animEffect>
+                                  </p:childTnLst>
+                                </p:cTn>
+                              </p:par>
+                            </p:childTnLst>
+                          </p:cTn>
+                        </p:par>
+                        <p:par>
+                          <p:cTn id="15" fill="hold">
+                            <p:stCondLst>
+                              <p:cond delay="1000"/>
+                            </p:stCondLst>
+                            <p:childTnLst>
+                              <p:par>
+                                <p:cTn id="16" presetID="10" presetClass="entr" presetSubtype="0" fill="hold" nodeType="afterEffect">
+                                  <p:stCondLst>
+                                    <p:cond delay="0"/>
+                                  </p:stCondLst>
+                                  <p:childTnLst>
+                                    <p:set>
+                                      <p:cBhvr>
+                                        <p:cTn id="17" dur="1" fill="hold">
+                                          <p:stCondLst>
+                                            <p:cond delay="0"/>
+                                          </p:stCondLst>
+                                        </p:cTn>
+                                        <p:tgtEl>
+                                          <p:spTgt spid="110"/>
+                                        </p:tgtEl>
+                                        <p:attrNameLst>
+                                          <p:attrName>style.visibility</p:attrName>
+                                        </p:attrNameLst>
+                                      </p:cBhvr>
+                                      <p:to>
+                                        <p:strVal val="visible"/>
+                                      </p:to>
+                                    </p:set>
+                                    <p:animEffect transition="in" filter="fade">
+                                      <p:cBhvr>
+                                        <p:cTn id="18" dur="500"/>
+                                        <p:tgtEl>
+                                          <p:spTgt spid="110"/>
+                                        </p:tgtEl>
+                                      </p:cBhvr>
+                                    </p:animEffect>
+                                  </p:childTnLst>
+                                </p:cTn>
+                              </p:par>
+                            </p:childTnLst>
+                          </p:cTn>
+                        </p:par>
+                      </p:childTnLst>
+                    </p:cTn>
+                  </p:par>
+                  <p:par>
+                    <p:cTn id="19" fill="hold">
+                      <p:stCondLst>
+                        <p:cond delay="indefinite"/>
+                      </p:stCondLst>
+                      <p:childTnLst>
+                        <p:par>
+                          <p:cTn id="20" fill="hold">
+                            <p:stCondLst>
+                              <p:cond delay="0"/>
+                            </p:stCondLst>
+                            <p:childTnLst>
+                              <p:par>
+                                <p:cTn id="21" presetID="10" presetClass="entr" presetSubtype="0" fill="hold" nodeType="clickEffect">
+                                  <p:stCondLst>
+                                    <p:cond delay="0"/>
+                                  </p:stCondLst>
+                                  <p:childTnLst>
+                                    <p:set>
+                                      <p:cBhvr>
+                                        <p:cTn id="22" dur="1" fill="hold">
+                                          <p:stCondLst>
+                                            <p:cond delay="0"/>
+                                          </p:stCondLst>
+                                        </p:cTn>
+                                        <p:tgtEl>
+                                          <p:spTgt spid="119"/>
+                                        </p:tgtEl>
+                                        <p:attrNameLst>
+                                          <p:attrName>style.visibility</p:attrName>
+                                        </p:attrNameLst>
+                                      </p:cBhvr>
+                                      <p:to>
+                                        <p:strVal val="visible"/>
+                                      </p:to>
+                                    </p:set>
+                                    <p:animEffect transition="in" filter="fade">
+                                      <p:cBhvr>
+                                        <p:cTn id="23" dur="500"/>
+                                        <p:tgtEl>
+                                          <p:spTgt spid="119"/>
+                                        </p:tgtEl>
+                                      </p:cBhvr>
+                                    </p:animEffect>
+                                  </p:childTnLst>
+                                </p:cTn>
+                              </p:par>
+                              <p:par>
+                                <p:cTn id="24" presetID="10" presetClass="entr" presetSubtype="0" fill="hold" nodeType="withEffect">
+                                  <p:stCondLst>
+                                    <p:cond delay="0"/>
+                                  </p:stCondLst>
+                                  <p:childTnLst>
+                                    <p:set>
+                                      <p:cBhvr>
+                                        <p:cTn id="25" dur="1" fill="hold">
+                                          <p:stCondLst>
+                                            <p:cond delay="0"/>
+                                          </p:stCondLst>
+                                        </p:cTn>
+                                        <p:tgtEl>
+                                          <p:spTgt spid="116"/>
+                                        </p:tgtEl>
+                                        <p:attrNameLst>
+                                          <p:attrName>style.visibility</p:attrName>
+                                        </p:attrNameLst>
+                                      </p:cBhvr>
+                                      <p:to>
+                                        <p:strVal val="visible"/>
+                                      </p:to>
+                                    </p:set>
+                                    <p:animEffect transition="in" filter="fade">
+                                      <p:cBhvr>
+                                        <p:cTn id="26" dur="500"/>
+                                        <p:tgtEl>
+                                          <p:spTgt spid="116"/>
+                                        </p:tgtEl>
+                                      </p:cBhvr>
+                                    </p:animEffect>
+                                  </p:childTnLst>
+                                </p:cTn>
+                              </p:par>
+                            </p:childTnLst>
+                          </p:cTn>
+                        </p:par>
+                        <p:par>
+                          <p:cTn id="27" fill="hold">
+                            <p:stCondLst>
+                              <p:cond delay="500"/>
+                            </p:stCondLst>
+                            <p:childTnLst>
+                              <p:par>
+                                <p:cTn id="28" presetID="10" presetClass="entr" presetSubtype="0" fill="hold" nodeType="afterEffect">
+                                  <p:stCondLst>
+                                    <p:cond delay="0"/>
+                                  </p:stCondLst>
+                                  <p:childTnLst>
+                                    <p:set>
+                                      <p:cBhvr>
+                                        <p:cTn id="29" dur="1" fill="hold">
+                                          <p:stCondLst>
+                                            <p:cond delay="0"/>
+                                          </p:stCondLst>
+                                        </p:cTn>
+                                        <p:tgtEl>
+                                          <p:spTgt spid="120"/>
+                                        </p:tgtEl>
+                                        <p:attrNameLst>
+                                          <p:attrName>style.visibility</p:attrName>
+                                        </p:attrNameLst>
+                                      </p:cBhvr>
+                                      <p:to>
+                                        <p:strVal val="visible"/>
+                                      </p:to>
+                                    </p:set>
+                                    <p:animEffect transition="in" filter="fade">
+                                      <p:cBhvr>
+                                        <p:cTn id="30" dur="500"/>
+                                        <p:tgtEl>
+                                          <p:spTgt spid="120"/>
+                                        </p:tgtEl>
+                                      </p:cBhvr>
+                                    </p:animEffect>
+                                  </p:childTnLst>
+                                </p:cTn>
+                              </p:par>
+                            </p:childTnLst>
+                          </p:cTn>
+                        </p:par>
+                      </p:childTnLst>
+                    </p:cTn>
+                  </p:par>
+                  <p:par>
+                    <p:cTn id="31" fill="hold">
+                      <p:stCondLst>
+                        <p:cond delay="indefinite"/>
+                      </p:stCondLst>
+                      <p:childTnLst>
+                        <p:par>
+                          <p:cTn id="32" fill="hold">
+                            <p:stCondLst>
+                              <p:cond delay="0"/>
+                            </p:stCondLst>
+                            <p:childTnLst>
+                              <p:par>
+                                <p:cTn id="33" presetID="10" presetClass="entr" presetSubtype="0" fill="hold" nodeType="clickEffect">
+                                  <p:stCondLst>
+                                    <p:cond delay="0"/>
+                                  </p:stCondLst>
+                                  <p:childTnLst>
+                                    <p:set>
+                                      <p:cBhvr>
+                                        <p:cTn id="34" dur="1" fill="hold">
+                                          <p:stCondLst>
+                                            <p:cond delay="0"/>
+                                          </p:stCondLst>
+                                        </p:cTn>
+                                        <p:tgtEl>
+                                          <p:spTgt spid="114"/>
+                                        </p:tgtEl>
+                                        <p:attrNameLst>
+                                          <p:attrName>style.visibility</p:attrName>
+                                        </p:attrNameLst>
+                                      </p:cBhvr>
+                                      <p:to>
+                                        <p:strVal val="visible"/>
+                                      </p:to>
+                                    </p:set>
+                                    <p:animEffect transition="in" filter="fade">
+                                      <p:cBhvr>
+                                        <p:cTn id="35" dur="500"/>
+                                        <p:tgtEl>
+                                          <p:spTgt spid="114"/>
+                                        </p:tgtEl>
+                                      </p:cBhvr>
+                                    </p:animEffect>
+                                  </p:childTnLst>
+                                </p:cTn>
+                              </p:par>
+                              <p:par>
+                                <p:cTn id="36" presetID="10" presetClass="entr" presetSubtype="0" fill="hold" nodeType="withEffect">
+                                  <p:stCondLst>
+                                    <p:cond delay="0"/>
+                                  </p:stCondLst>
+                                  <p:childTnLst>
+                                    <p:set>
+                                      <p:cBhvr>
+                                        <p:cTn id="37" dur="1" fill="hold">
+                                          <p:stCondLst>
+                                            <p:cond delay="0"/>
+                                          </p:stCondLst>
+                                        </p:cTn>
+                                        <p:tgtEl>
+                                          <p:spTgt spid="111"/>
+                                        </p:tgtEl>
+                                        <p:attrNameLst>
+                                          <p:attrName>style.visibility</p:attrName>
+                                        </p:attrNameLst>
+                                      </p:cBhvr>
+                                      <p:to>
+                                        <p:strVal val="visible"/>
+                                      </p:to>
+                                    </p:set>
+                                    <p:animEffect transition="in" filter="fade">
+                                      <p:cBhvr>
+                                        <p:cTn id="38" dur="500"/>
+                                        <p:tgtEl>
+                                          <p:spTgt spid="111"/>
+                                        </p:tgtEl>
+                                      </p:cBhvr>
+                                    </p:animEffect>
+                                  </p:childTnLst>
+                                </p:cTn>
+                              </p:par>
+                            </p:childTnLst>
+                          </p:cTn>
+                        </p:par>
+                        <p:par>
+                          <p:cTn id="39" fill="hold">
+                            <p:stCondLst>
+                              <p:cond delay="500"/>
+                            </p:stCondLst>
+                            <p:childTnLst>
+                              <p:par>
+                                <p:cTn id="40" presetID="10" presetClass="entr" presetSubtype="0" fill="hold" nodeType="afterEffect">
+                                  <p:stCondLst>
+                                    <p:cond delay="0"/>
+                                  </p:stCondLst>
+                                  <p:childTnLst>
+                                    <p:set>
+                                      <p:cBhvr>
+                                        <p:cTn id="41" dur="1" fill="hold">
+                                          <p:stCondLst>
+                                            <p:cond delay="0"/>
+                                          </p:stCondLst>
+                                        </p:cTn>
+                                        <p:tgtEl>
+                                          <p:spTgt spid="115"/>
+                                        </p:tgtEl>
+                                        <p:attrNameLst>
+                                          <p:attrName>style.visibility</p:attrName>
+                                        </p:attrNameLst>
+                                      </p:cBhvr>
+                                      <p:to>
+                                        <p:strVal val="visible"/>
+                                      </p:to>
+                                    </p:set>
+                                    <p:animEffect transition="in" filter="fade">
+                                      <p:cBhvr>
+                                        <p:cTn id="42" dur="500"/>
+                                        <p:tgtEl>
+                                          <p:spTgt spid="115"/>
+                                        </p:tgtEl>
+                                      </p:cBhvr>
+                                    </p:animEffect>
+                                  </p:childTnLst>
+                                </p:cTn>
+                              </p:par>
+                            </p:childTnLst>
+                          </p:cTn>
+                        </p:par>
+                      </p:childTnLst>
+                    </p:cTn>
+                  </p:par>
+                </p:childTnLst>
+              </p:cTn>
+              <p:prevCondLst>
+                <p:cond evt="onPrev" delay="0">
+                  <p:tgtEl>
+                    <p:sldTgt/>
+                  </p:tgtEl>
+                </p:cond>
+              </p:prevCondLst>
+              <p:nextCondLst>
+                <p:cond evt="onNext" delay="0">
+                  <p:tgtEl>
+                    <p:sldTgt/>
+                  </p:tgtEl>
+                </p:cond>
+              </p:nextCondLst>
+            </p:seq>
+          </p:childTnLst>
+        </p:cTn>
+      </p:par>
+    </p:tnLst>
+  </p:timing>
+</p:sld>
+</file>
+
+<file path=ppt/slides/slide14.xml><?xml version="1.0" encoding="utf-8"?>
 <p:sld xmlns:a="http://schemas.openxmlformats.org/drawingml/2006/main" xmlns:r="http://schemas.openxmlformats.org/officeDocument/2006/relationships" xmlns:p="http://schemas.openxmlformats.org/presentationml/2006/main">
   <p:cSld>
     <p:spTree>
@@ -9251,10 +11188,10 @@
               <a:buNone/>
             </a:pPr>
             <a:r>
-              <a:rPr lang="en"/>
-              <a:t>Recommendations:</a:t>
+              <a:rPr lang="en" dirty="0"/>
+              <a:t>Recommendations Based on Random Forest Classifier:</a:t>
             </a:r>
-            <a:endParaRPr/>
+            <a:endParaRPr dirty="0"/>
           </a:p>
         </p:txBody>
       </p:sp>
@@ -9297,14 +11234,14 @@
               <a:buChar char="●"/>
             </a:pPr>
             <a:r>
-              <a:rPr lang="en">
+              <a:rPr lang="en" dirty="0">
                 <a:solidFill>
                   <a:schemeClr val="lt1"/>
                 </a:solidFill>
               </a:rPr>
               <a:t>Lower-income areas more volatile</a:t>
             </a:r>
-            <a:endParaRPr>
+            <a:endParaRPr dirty="0">
               <a:solidFill>
                 <a:schemeClr val="lt1"/>
               </a:solidFill>
@@ -9325,14 +11262,14 @@
               <a:buChar char="●"/>
             </a:pPr>
             <a:r>
-              <a:rPr lang="en">
+              <a:rPr lang="en" dirty="0">
                 <a:solidFill>
                   <a:schemeClr val="lt1"/>
                 </a:solidFill>
               </a:rPr>
               <a:t>Higher-income more stable</a:t>
             </a:r>
-            <a:endParaRPr>
+            <a:endParaRPr dirty="0">
               <a:solidFill>
                 <a:schemeClr val="lt1"/>
               </a:solidFill>
@@ -10010,7 +11947,7 @@
             </a:pPr>
             <a:fld id="{00000000-1234-1234-1234-123412341234}" type="slidenum">
               <a:rPr lang="en" smtClean="0"/>
-              <a:t>12</a:t>
+              <a:t>14</a:t>
             </a:fld>
             <a:endParaRPr lang="en"/>
           </a:p>
@@ -10478,7 +12415,1128 @@
 </p:sld>
 </file>
 
-<file path=ppt/slides/slide13.xml><?xml version="1.0" encoding="utf-8"?>
+<file path=ppt/slides/slide15.xml><?xml version="1.0" encoding="utf-8"?>
+<p:sld xmlns:a="http://schemas.openxmlformats.org/drawingml/2006/main" xmlns:r="http://schemas.openxmlformats.org/officeDocument/2006/relationships" xmlns:p="http://schemas.openxmlformats.org/presentationml/2006/main" show="0">
+  <p:cSld>
+    <p:spTree>
+      <p:nvGrpSpPr>
+        <p:cNvPr id="1" name="Shape 71"/>
+        <p:cNvGrpSpPr/>
+        <p:nvPr/>
+      </p:nvGrpSpPr>
+      <p:grpSpPr>
+        <a:xfrm>
+          <a:off x="0" y="0"/>
+          <a:ext cx="0" cy="0"/>
+          <a:chOff x="0" y="0"/>
+          <a:chExt cx="0" cy="0"/>
+        </a:xfrm>
+      </p:grpSpPr>
+      <p:sp>
+        <p:nvSpPr>
+          <p:cNvPr id="72" name="Google Shape;72;p15"/>
+          <p:cNvSpPr txBox="1">
+            <a:spLocks noGrp="1"/>
+          </p:cNvSpPr>
+          <p:nvPr>
+            <p:ph type="title"/>
+          </p:nvPr>
+        </p:nvSpPr>
+        <p:spPr>
+          <a:xfrm>
+            <a:off x="311700" y="368825"/>
+            <a:ext cx="8520600" cy="572700"/>
+          </a:xfrm>
+          <a:prstGeom prst="rect">
+            <a:avLst/>
+          </a:prstGeom>
+        </p:spPr>
+        <p:txBody>
+          <a:bodyPr spcFirstLastPara="1" wrap="square" lIns="91425" tIns="91425" rIns="91425" bIns="91425" anchor="t" anchorCtr="0">
+            <a:noAutofit/>
+          </a:bodyPr>
+          <a:lstStyle/>
+          <a:p>
+            <a:pPr marL="0" lvl="0" indent="0" algn="l" rtl="0">
+              <a:spcBef>
+                <a:spcPts val="0"/>
+              </a:spcBef>
+              <a:spcAft>
+                <a:spcPts val="0"/>
+              </a:spcAft>
+              <a:buNone/>
+            </a:pPr>
+            <a:r>
+              <a:rPr lang="en" dirty="0"/>
+              <a:t>Guiding Questions:</a:t>
+            </a:r>
+            <a:endParaRPr dirty="0"/>
+          </a:p>
+        </p:txBody>
+      </p:sp>
+      <p:sp>
+        <p:nvSpPr>
+          <p:cNvPr id="73" name="Google Shape;73;p15"/>
+          <p:cNvSpPr txBox="1">
+            <a:spLocks noGrp="1"/>
+          </p:cNvSpPr>
+          <p:nvPr>
+            <p:ph type="body" idx="2"/>
+          </p:nvPr>
+        </p:nvSpPr>
+        <p:spPr>
+          <a:xfrm>
+            <a:off x="4466616" y="1152475"/>
+            <a:ext cx="3748500" cy="1740900"/>
+          </a:xfrm>
+          <a:prstGeom prst="rect">
+            <a:avLst/>
+          </a:prstGeom>
+          <a:ln w="9525" cap="flat" cmpd="sng">
+            <a:solidFill>
+              <a:schemeClr val="dk1"/>
+            </a:solidFill>
+            <a:prstDash val="dot"/>
+            <a:round/>
+            <a:headEnd type="none" w="sm" len="sm"/>
+            <a:tailEnd type="none" w="sm" len="sm"/>
+          </a:ln>
+        </p:spPr>
+        <p:txBody>
+          <a:bodyPr spcFirstLastPara="1" wrap="square" lIns="91425" tIns="91425" rIns="91425" bIns="91425" anchor="t" anchorCtr="0">
+            <a:noAutofit/>
+          </a:bodyPr>
+          <a:lstStyle/>
+          <a:p>
+            <a:pPr marL="0" lvl="0" indent="0" algn="l" rtl="0">
+              <a:spcAft>
+                <a:spcPts val="0"/>
+              </a:spcAft>
+              <a:buNone/>
+            </a:pPr>
+            <a:r>
+              <a:rPr lang="en" sz="1800" dirty="0">
+                <a:solidFill>
+                  <a:schemeClr val="lt2"/>
+                </a:solidFill>
+              </a:rPr>
+              <a:t>Pros and Cons</a:t>
+            </a:r>
+            <a:endParaRPr sz="1000" dirty="0">
+              <a:solidFill>
+                <a:schemeClr val="lt2"/>
+              </a:solidFill>
+            </a:endParaRPr>
+          </a:p>
+          <a:p>
+            <a:pPr marL="457200" lvl="0" indent="-317500" algn="l" rtl="0">
+              <a:spcBef>
+                <a:spcPts val="1000"/>
+              </a:spcBef>
+              <a:spcAft>
+                <a:spcPts val="0"/>
+              </a:spcAft>
+              <a:buClr>
+                <a:schemeClr val="lt2"/>
+              </a:buClr>
+              <a:buSzPts val="1400"/>
+              <a:buChar char="●"/>
+            </a:pPr>
+            <a:r>
+              <a:rPr lang="en" dirty="0">
+                <a:solidFill>
+                  <a:schemeClr val="lt2"/>
+                </a:solidFill>
+              </a:rPr>
+              <a:t>Practical use for same-day decision-making</a:t>
+            </a:r>
+            <a:endParaRPr dirty="0">
+              <a:solidFill>
+                <a:schemeClr val="lt2"/>
+              </a:solidFill>
+            </a:endParaRPr>
+          </a:p>
+          <a:p>
+            <a:pPr marL="457200" lvl="0" indent="-317500" algn="l" rtl="0">
+              <a:spcBef>
+                <a:spcPts val="1000"/>
+              </a:spcBef>
+              <a:spcAft>
+                <a:spcPts val="1000"/>
+              </a:spcAft>
+              <a:buClr>
+                <a:schemeClr val="lt2"/>
+              </a:buClr>
+              <a:buSzPts val="1400"/>
+              <a:buChar char="●"/>
+            </a:pPr>
+            <a:r>
+              <a:rPr lang="en" dirty="0">
+                <a:solidFill>
+                  <a:schemeClr val="lt2"/>
+                </a:solidFill>
+              </a:rPr>
+              <a:t>Useful for forecasting future demand</a:t>
+            </a:r>
+            <a:endParaRPr dirty="0">
+              <a:solidFill>
+                <a:schemeClr val="lt2"/>
+              </a:solidFill>
+            </a:endParaRPr>
+          </a:p>
+        </p:txBody>
+      </p:sp>
+      <p:sp>
+        <p:nvSpPr>
+          <p:cNvPr id="74" name="Google Shape;74;p15"/>
+          <p:cNvSpPr txBox="1">
+            <a:spLocks noGrp="1"/>
+          </p:cNvSpPr>
+          <p:nvPr>
+            <p:ph type="body" idx="1"/>
+          </p:nvPr>
+        </p:nvSpPr>
+        <p:spPr>
+          <a:xfrm>
+            <a:off x="616500" y="1152475"/>
+            <a:ext cx="3748500" cy="1740900"/>
+          </a:xfrm>
+          <a:prstGeom prst="rect">
+            <a:avLst/>
+          </a:prstGeom>
+          <a:ln w="9525" cap="flat" cmpd="sng">
+            <a:solidFill>
+              <a:schemeClr val="dk1"/>
+            </a:solidFill>
+            <a:prstDash val="dot"/>
+            <a:round/>
+            <a:headEnd type="none" w="sm" len="sm"/>
+            <a:tailEnd type="none" w="sm" len="sm"/>
+          </a:ln>
+        </p:spPr>
+        <p:txBody>
+          <a:bodyPr spcFirstLastPara="1" wrap="square" lIns="91425" tIns="91425" rIns="91425" bIns="91425" anchor="t" anchorCtr="0">
+            <a:noAutofit/>
+          </a:bodyPr>
+          <a:lstStyle/>
+          <a:p>
+            <a:pPr marL="0" lvl="0" indent="0">
+              <a:buNone/>
+            </a:pPr>
+            <a:r>
+              <a:rPr lang="en" sz="2000" dirty="0">
+                <a:solidFill>
+                  <a:schemeClr val="lt2"/>
+                </a:solidFill>
+              </a:rPr>
+              <a:t>Check-Out or Cancel?</a:t>
+            </a:r>
+            <a:endParaRPr sz="1300" dirty="0">
+              <a:solidFill>
+                <a:schemeClr val="lt2"/>
+              </a:solidFill>
+            </a:endParaRPr>
+          </a:p>
+          <a:p>
+            <a:pPr marL="0" lvl="0" indent="0" algn="l" rtl="0">
+              <a:lnSpc>
+                <a:spcPct val="115000"/>
+              </a:lnSpc>
+              <a:spcBef>
+                <a:spcPts val="1000"/>
+              </a:spcBef>
+              <a:spcAft>
+                <a:spcPts val="0"/>
+              </a:spcAft>
+              <a:buNone/>
+            </a:pPr>
+            <a:r>
+              <a:rPr lang="en" sz="1500" dirty="0">
+                <a:solidFill>
+                  <a:schemeClr val="lt2"/>
+                </a:solidFill>
+              </a:rPr>
+              <a:t>What is the likelihood of a given reservation canceling?</a:t>
+            </a:r>
+            <a:endParaRPr sz="1500" dirty="0">
+              <a:solidFill>
+                <a:schemeClr val="lt2"/>
+              </a:solidFill>
+            </a:endParaRPr>
+          </a:p>
+        </p:txBody>
+      </p:sp>
+      <p:sp>
+        <p:nvSpPr>
+          <p:cNvPr id="75" name="Google Shape;75;p15"/>
+          <p:cNvSpPr txBox="1"/>
+          <p:nvPr/>
+        </p:nvSpPr>
+        <p:spPr>
+          <a:xfrm>
+            <a:off x="616500" y="3005102"/>
+            <a:ext cx="3748500" cy="1740900"/>
+          </a:xfrm>
+          <a:prstGeom prst="rect">
+            <a:avLst/>
+          </a:prstGeom>
+          <a:noFill/>
+          <a:ln w="9525" cap="flat" cmpd="sng">
+            <a:solidFill>
+              <a:schemeClr val="dk1"/>
+            </a:solidFill>
+            <a:prstDash val="dot"/>
+            <a:round/>
+            <a:headEnd type="none" w="sm" len="sm"/>
+            <a:tailEnd type="none" w="sm" len="sm"/>
+          </a:ln>
+        </p:spPr>
+        <p:txBody>
+          <a:bodyPr spcFirstLastPara="1" wrap="square" lIns="91425" tIns="91425" rIns="91425" bIns="91425" anchor="t" anchorCtr="0">
+            <a:noAutofit/>
+          </a:bodyPr>
+          <a:lstStyle/>
+          <a:p>
+            <a:pPr marL="0" lvl="0" indent="0" algn="l" rtl="0">
+              <a:lnSpc>
+                <a:spcPct val="115000"/>
+              </a:lnSpc>
+              <a:spcBef>
+                <a:spcPts val="0"/>
+              </a:spcBef>
+              <a:spcAft>
+                <a:spcPts val="0"/>
+              </a:spcAft>
+              <a:buNone/>
+            </a:pPr>
+            <a:r>
+              <a:rPr lang="en" sz="2000" dirty="0">
+                <a:solidFill>
+                  <a:schemeClr val="lt2"/>
+                </a:solidFill>
+                <a:latin typeface="Average"/>
+                <a:ea typeface="Average"/>
+                <a:cs typeface="Average"/>
+                <a:sym typeface="Average"/>
+              </a:rPr>
+              <a:t>Guest Generalizations</a:t>
+            </a:r>
+            <a:endParaRPr sz="1000" dirty="0">
+              <a:solidFill>
+                <a:schemeClr val="lt2"/>
+              </a:solidFill>
+              <a:latin typeface="Average"/>
+              <a:ea typeface="Average"/>
+              <a:cs typeface="Average"/>
+              <a:sym typeface="Average"/>
+            </a:endParaRPr>
+          </a:p>
+          <a:p>
+            <a:pPr marL="0" lvl="0" indent="0" algn="l" rtl="0">
+              <a:lnSpc>
+                <a:spcPct val="115000"/>
+              </a:lnSpc>
+              <a:spcBef>
+                <a:spcPts val="1000"/>
+              </a:spcBef>
+              <a:spcAft>
+                <a:spcPts val="0"/>
+              </a:spcAft>
+              <a:buNone/>
+            </a:pPr>
+            <a:r>
+              <a:rPr lang="en" sz="1500" dirty="0">
+                <a:solidFill>
+                  <a:schemeClr val="lt2"/>
+                </a:solidFill>
+                <a:latin typeface="Average"/>
+                <a:ea typeface="Average"/>
+                <a:cs typeface="Average"/>
+                <a:sym typeface="Average"/>
+              </a:rPr>
+              <a:t>Can we generalize certain attributes are more/less likely to cancel?</a:t>
+            </a:r>
+            <a:endParaRPr sz="1500" dirty="0">
+              <a:solidFill>
+                <a:schemeClr val="lt2"/>
+              </a:solidFill>
+              <a:latin typeface="Average"/>
+              <a:ea typeface="Average"/>
+              <a:cs typeface="Average"/>
+              <a:sym typeface="Average"/>
+            </a:endParaRPr>
+          </a:p>
+        </p:txBody>
+      </p:sp>
+      <p:sp>
+        <p:nvSpPr>
+          <p:cNvPr id="76" name="Google Shape;76;p15"/>
+          <p:cNvSpPr txBox="1"/>
+          <p:nvPr/>
+        </p:nvSpPr>
+        <p:spPr>
+          <a:xfrm>
+            <a:off x="4466616" y="3005102"/>
+            <a:ext cx="3748500" cy="1740900"/>
+          </a:xfrm>
+          <a:prstGeom prst="rect">
+            <a:avLst/>
+          </a:prstGeom>
+          <a:noFill/>
+          <a:ln w="9525" cap="flat" cmpd="sng">
+            <a:solidFill>
+              <a:schemeClr val="dk1"/>
+            </a:solidFill>
+            <a:prstDash val="dot"/>
+            <a:round/>
+            <a:headEnd type="none" w="sm" len="sm"/>
+            <a:tailEnd type="none" w="sm" len="sm"/>
+          </a:ln>
+        </p:spPr>
+        <p:txBody>
+          <a:bodyPr spcFirstLastPara="1" wrap="square" lIns="91425" tIns="91425" rIns="91425" bIns="91425" anchor="t" anchorCtr="0">
+            <a:noAutofit/>
+          </a:bodyPr>
+          <a:lstStyle/>
+          <a:p>
+            <a:pPr marL="0" lvl="0" indent="0" algn="l" rtl="0">
+              <a:lnSpc>
+                <a:spcPct val="115000"/>
+              </a:lnSpc>
+              <a:spcAft>
+                <a:spcPts val="0"/>
+              </a:spcAft>
+              <a:buNone/>
+            </a:pPr>
+            <a:r>
+              <a:rPr lang="en" sz="1800" dirty="0">
+                <a:solidFill>
+                  <a:schemeClr val="lt2"/>
+                </a:solidFill>
+                <a:latin typeface="Average"/>
+                <a:ea typeface="Average"/>
+                <a:cs typeface="Average"/>
+                <a:sym typeface="Average"/>
+              </a:rPr>
+              <a:t>Pros and Cons</a:t>
+            </a:r>
+            <a:endParaRPr sz="1800" dirty="0">
+              <a:solidFill>
+                <a:schemeClr val="lt2"/>
+              </a:solidFill>
+              <a:latin typeface="Average"/>
+              <a:ea typeface="Average"/>
+              <a:cs typeface="Average"/>
+              <a:sym typeface="Average"/>
+            </a:endParaRPr>
+          </a:p>
+          <a:p>
+            <a:pPr marL="457200" lvl="0" indent="-317500" algn="l" rtl="0">
+              <a:lnSpc>
+                <a:spcPct val="115000"/>
+              </a:lnSpc>
+              <a:spcBef>
+                <a:spcPts val="1000"/>
+              </a:spcBef>
+              <a:spcAft>
+                <a:spcPts val="0"/>
+              </a:spcAft>
+              <a:buClr>
+                <a:schemeClr val="lt2"/>
+              </a:buClr>
+              <a:buSzPts val="1400"/>
+              <a:buFont typeface="Average"/>
+              <a:buChar char="●"/>
+            </a:pPr>
+            <a:r>
+              <a:rPr lang="en" dirty="0">
+                <a:solidFill>
+                  <a:schemeClr val="lt2"/>
+                </a:solidFill>
+                <a:latin typeface="Average"/>
+                <a:ea typeface="Average"/>
+                <a:cs typeface="Average"/>
+                <a:sym typeface="Average"/>
+              </a:rPr>
+              <a:t>Simple/easily understood</a:t>
+            </a:r>
+            <a:endParaRPr dirty="0">
+              <a:solidFill>
+                <a:schemeClr val="lt2"/>
+              </a:solidFill>
+              <a:latin typeface="Average"/>
+              <a:ea typeface="Average"/>
+              <a:cs typeface="Average"/>
+              <a:sym typeface="Average"/>
+            </a:endParaRPr>
+          </a:p>
+          <a:p>
+            <a:pPr marL="457200" lvl="0" indent="-317500" algn="l" rtl="0">
+              <a:lnSpc>
+                <a:spcPct val="115000"/>
+              </a:lnSpc>
+              <a:spcBef>
+                <a:spcPts val="1000"/>
+              </a:spcBef>
+              <a:spcAft>
+                <a:spcPts val="0"/>
+              </a:spcAft>
+              <a:buClr>
+                <a:schemeClr val="lt2"/>
+              </a:buClr>
+              <a:buSzPts val="1400"/>
+              <a:buFont typeface="Average"/>
+              <a:buChar char="●"/>
+            </a:pPr>
+            <a:r>
+              <a:rPr lang="en" dirty="0">
+                <a:solidFill>
+                  <a:schemeClr val="lt2"/>
+                </a:solidFill>
+                <a:latin typeface="Average"/>
+                <a:ea typeface="Average"/>
+                <a:cs typeface="Average"/>
+                <a:sym typeface="Average"/>
+              </a:rPr>
+              <a:t>Less accurate vs. full analysis</a:t>
+            </a:r>
+            <a:endParaRPr dirty="0">
+              <a:solidFill>
+                <a:schemeClr val="lt2"/>
+              </a:solidFill>
+              <a:latin typeface="Average"/>
+              <a:ea typeface="Average"/>
+              <a:cs typeface="Average"/>
+              <a:sym typeface="Average"/>
+            </a:endParaRPr>
+          </a:p>
+          <a:p>
+            <a:pPr marL="457200" lvl="0" indent="-317500" algn="l" rtl="0">
+              <a:lnSpc>
+                <a:spcPct val="115000"/>
+              </a:lnSpc>
+              <a:spcBef>
+                <a:spcPts val="1000"/>
+              </a:spcBef>
+              <a:spcAft>
+                <a:spcPts val="1000"/>
+              </a:spcAft>
+              <a:buClr>
+                <a:schemeClr val="lt2"/>
+              </a:buClr>
+              <a:buSzPts val="1400"/>
+              <a:buFont typeface="Average"/>
+              <a:buChar char="●"/>
+            </a:pPr>
+            <a:r>
+              <a:rPr lang="en" dirty="0">
+                <a:solidFill>
+                  <a:schemeClr val="lt2"/>
+                </a:solidFill>
+                <a:latin typeface="Average"/>
+                <a:ea typeface="Average"/>
+                <a:cs typeface="Average"/>
+                <a:sym typeface="Average"/>
+              </a:rPr>
+              <a:t>May lead to biases about guests</a:t>
+            </a:r>
+            <a:endParaRPr dirty="0">
+              <a:solidFill>
+                <a:schemeClr val="lt2"/>
+              </a:solidFill>
+              <a:latin typeface="Average"/>
+              <a:ea typeface="Average"/>
+              <a:cs typeface="Average"/>
+              <a:sym typeface="Average"/>
+            </a:endParaRPr>
+          </a:p>
+        </p:txBody>
+      </p:sp>
+      <p:cxnSp>
+        <p:nvCxnSpPr>
+          <p:cNvPr id="77" name="Google Shape;77;p15"/>
+          <p:cNvCxnSpPr/>
+          <p:nvPr/>
+        </p:nvCxnSpPr>
+        <p:spPr>
+          <a:xfrm>
+            <a:off x="771900" y="1581150"/>
+            <a:ext cx="1761300" cy="0"/>
+          </a:xfrm>
+          <a:prstGeom prst="straightConnector1">
+            <a:avLst/>
+          </a:prstGeom>
+          <a:noFill/>
+          <a:ln w="9525" cap="flat" cmpd="sng">
+            <a:solidFill>
+              <a:schemeClr val="dk2"/>
+            </a:solidFill>
+            <a:prstDash val="solid"/>
+            <a:round/>
+            <a:headEnd type="none" w="med" len="med"/>
+            <a:tailEnd type="none" w="med" len="med"/>
+          </a:ln>
+        </p:spPr>
+      </p:cxnSp>
+      <p:cxnSp>
+        <p:nvCxnSpPr>
+          <p:cNvPr id="78" name="Google Shape;78;p15"/>
+          <p:cNvCxnSpPr/>
+          <p:nvPr/>
+        </p:nvCxnSpPr>
+        <p:spPr>
+          <a:xfrm>
+            <a:off x="771900" y="3409950"/>
+            <a:ext cx="1761300" cy="0"/>
+          </a:xfrm>
+          <a:prstGeom prst="straightConnector1">
+            <a:avLst/>
+          </a:prstGeom>
+          <a:noFill/>
+          <a:ln w="9525" cap="flat" cmpd="sng">
+            <a:solidFill>
+              <a:schemeClr val="dk2"/>
+            </a:solidFill>
+            <a:prstDash val="solid"/>
+            <a:round/>
+            <a:headEnd type="none" w="med" len="med"/>
+            <a:tailEnd type="none" w="med" len="med"/>
+          </a:ln>
+        </p:spPr>
+      </p:cxnSp>
+      <p:cxnSp>
+        <p:nvCxnSpPr>
+          <p:cNvPr id="79" name="Google Shape;79;p15"/>
+          <p:cNvCxnSpPr/>
+          <p:nvPr/>
+        </p:nvCxnSpPr>
+        <p:spPr>
+          <a:xfrm>
+            <a:off x="4643625" y="1581150"/>
+            <a:ext cx="956100" cy="0"/>
+          </a:xfrm>
+          <a:prstGeom prst="straightConnector1">
+            <a:avLst/>
+          </a:prstGeom>
+          <a:noFill/>
+          <a:ln w="9525" cap="flat" cmpd="sng">
+            <a:solidFill>
+              <a:schemeClr val="dk2"/>
+            </a:solidFill>
+            <a:prstDash val="solid"/>
+            <a:round/>
+            <a:headEnd type="none" w="med" len="med"/>
+            <a:tailEnd type="none" w="med" len="med"/>
+          </a:ln>
+        </p:spPr>
+      </p:cxnSp>
+      <p:cxnSp>
+        <p:nvCxnSpPr>
+          <p:cNvPr id="80" name="Google Shape;80;p15"/>
+          <p:cNvCxnSpPr/>
+          <p:nvPr/>
+        </p:nvCxnSpPr>
+        <p:spPr>
+          <a:xfrm>
+            <a:off x="4619025" y="3409950"/>
+            <a:ext cx="956100" cy="0"/>
+          </a:xfrm>
+          <a:prstGeom prst="straightConnector1">
+            <a:avLst/>
+          </a:prstGeom>
+          <a:noFill/>
+          <a:ln w="9525" cap="flat" cmpd="sng">
+            <a:solidFill>
+              <a:schemeClr val="dk2"/>
+            </a:solidFill>
+            <a:prstDash val="solid"/>
+            <a:round/>
+            <a:headEnd type="none" w="med" len="med"/>
+            <a:tailEnd type="none" w="med" len="med"/>
+          </a:ln>
+        </p:spPr>
+      </p:cxnSp>
+      <p:sp>
+        <p:nvSpPr>
+          <p:cNvPr id="2" name="Slide Number Placeholder 1">
+            <a:extLst>
+              <a:ext uri="{FF2B5EF4-FFF2-40B4-BE49-F238E27FC236}">
+                <a16:creationId xmlns:a16="http://schemas.microsoft.com/office/drawing/2014/main" id="{D69DC018-E350-45E2-9FB6-716DF8136EDF}"/>
+              </a:ext>
+            </a:extLst>
+          </p:cNvPr>
+          <p:cNvSpPr>
+            <a:spLocks noGrp="1"/>
+          </p:cNvSpPr>
+          <p:nvPr>
+            <p:ph type="sldNum" idx="12"/>
+          </p:nvPr>
+        </p:nvSpPr>
+        <p:spPr/>
+        <p:txBody>
+          <a:bodyPr/>
+          <a:lstStyle/>
+          <a:p>
+            <a:pPr marL="0" lvl="0" indent="0" algn="r" rtl="0">
+              <a:spcBef>
+                <a:spcPts val="0"/>
+              </a:spcBef>
+              <a:spcAft>
+                <a:spcPts val="0"/>
+              </a:spcAft>
+              <a:buNone/>
+            </a:pPr>
+            <a:fld id="{00000000-1234-1234-1234-123412341234}" type="slidenum">
+              <a:rPr lang="en" smtClean="0"/>
+              <a:t>15</a:t>
+            </a:fld>
+            <a:endParaRPr lang="en"/>
+          </a:p>
+        </p:txBody>
+      </p:sp>
+    </p:spTree>
+    <p:extLst>
+      <p:ext uri="{BB962C8B-B14F-4D97-AF65-F5344CB8AC3E}">
+        <p14:creationId xmlns:p14="http://schemas.microsoft.com/office/powerpoint/2010/main" val="3285367196"/>
+      </p:ext>
+    </p:extLst>
+  </p:cSld>
+  <p:clrMapOvr>
+    <a:masterClrMapping/>
+  </p:clrMapOvr>
+  <p:timing>
+    <p:tnLst>
+      <p:par>
+        <p:cTn id="1" dur="indefinite" restart="never" nodeType="tmRoot">
+          <p:childTnLst>
+            <p:seq concurrent="1" nextAc="seek">
+              <p:cTn id="2" dur="indefinite" nodeType="mainSeq">
+                <p:childTnLst>
+                  <p:par>
+                    <p:cTn id="3" fill="hold">
+                      <p:stCondLst>
+                        <p:cond delay="indefinite"/>
+                        <p:cond evt="onBegin" delay="0">
+                          <p:tn val="2"/>
+                        </p:cond>
+                      </p:stCondLst>
+                      <p:childTnLst>
+                        <p:par>
+                          <p:cTn id="4" fill="hold">
+                            <p:stCondLst>
+                              <p:cond delay="0"/>
+                            </p:stCondLst>
+                            <p:childTnLst>
+                              <p:par>
+                                <p:cTn id="5" presetID="10" presetClass="entr" presetSubtype="0" fill="hold" nodeType="withEffect">
+                                  <p:stCondLst>
+                                    <p:cond delay="0"/>
+                                  </p:stCondLst>
+                                  <p:childTnLst>
+                                    <p:set>
+                                      <p:cBhvr>
+                                        <p:cTn id="6" dur="1" fill="hold">
+                                          <p:stCondLst>
+                                            <p:cond delay="0"/>
+                                          </p:stCondLst>
+                                        </p:cTn>
+                                        <p:tgtEl>
+                                          <p:spTgt spid="72"/>
+                                        </p:tgtEl>
+                                        <p:attrNameLst>
+                                          <p:attrName>style.visibility</p:attrName>
+                                        </p:attrNameLst>
+                                      </p:cBhvr>
+                                      <p:to>
+                                        <p:strVal val="visible"/>
+                                      </p:to>
+                                    </p:set>
+                                    <p:animEffect transition="in" filter="fade">
+                                      <p:cBhvr>
+                                        <p:cTn id="7" dur="500"/>
+                                        <p:tgtEl>
+                                          <p:spTgt spid="72"/>
+                                        </p:tgtEl>
+                                      </p:cBhvr>
+                                    </p:animEffect>
+                                  </p:childTnLst>
+                                </p:cTn>
+                              </p:par>
+                            </p:childTnLst>
+                          </p:cTn>
+                        </p:par>
+                        <p:par>
+                          <p:cTn id="8" fill="hold">
+                            <p:stCondLst>
+                              <p:cond delay="500"/>
+                            </p:stCondLst>
+                            <p:childTnLst>
+                              <p:par>
+                                <p:cTn id="9" presetID="10" presetClass="entr" presetSubtype="0" fill="hold" nodeType="afterEffect">
+                                  <p:stCondLst>
+                                    <p:cond delay="0"/>
+                                  </p:stCondLst>
+                                  <p:childTnLst>
+                                    <p:set>
+                                      <p:cBhvr>
+                                        <p:cTn id="10" dur="1" fill="hold">
+                                          <p:stCondLst>
+                                            <p:cond delay="0"/>
+                                          </p:stCondLst>
+                                        </p:cTn>
+                                        <p:tgtEl>
+                                          <p:spTgt spid="74"/>
+                                        </p:tgtEl>
+                                        <p:attrNameLst>
+                                          <p:attrName>style.visibility</p:attrName>
+                                        </p:attrNameLst>
+                                      </p:cBhvr>
+                                      <p:to>
+                                        <p:strVal val="visible"/>
+                                      </p:to>
+                                    </p:set>
+                                    <p:animEffect transition="in" filter="fade">
+                                      <p:cBhvr>
+                                        <p:cTn id="11" dur="500"/>
+                                        <p:tgtEl>
+                                          <p:spTgt spid="74"/>
+                                        </p:tgtEl>
+                                      </p:cBhvr>
+                                    </p:animEffect>
+                                  </p:childTnLst>
+                                </p:cTn>
+                              </p:par>
+                              <p:par>
+                                <p:cTn id="12" presetID="10" presetClass="entr" presetSubtype="0" fill="hold" nodeType="withEffect">
+                                  <p:stCondLst>
+                                    <p:cond delay="0"/>
+                                  </p:stCondLst>
+                                  <p:childTnLst>
+                                    <p:set>
+                                      <p:cBhvr>
+                                        <p:cTn id="13" dur="1" fill="hold">
+                                          <p:stCondLst>
+                                            <p:cond delay="0"/>
+                                          </p:stCondLst>
+                                        </p:cTn>
+                                        <p:tgtEl>
+                                          <p:spTgt spid="77"/>
+                                        </p:tgtEl>
+                                        <p:attrNameLst>
+                                          <p:attrName>style.visibility</p:attrName>
+                                        </p:attrNameLst>
+                                      </p:cBhvr>
+                                      <p:to>
+                                        <p:strVal val="visible"/>
+                                      </p:to>
+                                    </p:set>
+                                    <p:animEffect transition="in" filter="fade">
+                                      <p:cBhvr>
+                                        <p:cTn id="14" dur="500"/>
+                                        <p:tgtEl>
+                                          <p:spTgt spid="77"/>
+                                        </p:tgtEl>
+                                      </p:cBhvr>
+                                    </p:animEffect>
+                                  </p:childTnLst>
+                                </p:cTn>
+                              </p:par>
+                            </p:childTnLst>
+                          </p:cTn>
+                        </p:par>
+                      </p:childTnLst>
+                    </p:cTn>
+                  </p:par>
+                  <p:par>
+                    <p:cTn id="15" fill="hold">
+                      <p:stCondLst>
+                        <p:cond delay="indefinite"/>
+                      </p:stCondLst>
+                      <p:childTnLst>
+                        <p:par>
+                          <p:cTn id="16" fill="hold">
+                            <p:stCondLst>
+                              <p:cond delay="0"/>
+                            </p:stCondLst>
+                            <p:childTnLst>
+                              <p:par>
+                                <p:cTn id="17" presetID="10" presetClass="entr" presetSubtype="0" fill="hold" nodeType="clickEffect">
+                                  <p:stCondLst>
+                                    <p:cond delay="0"/>
+                                  </p:stCondLst>
+                                  <p:childTnLst>
+                                    <p:set>
+                                      <p:cBhvr>
+                                        <p:cTn id="18" dur="1" fill="hold">
+                                          <p:stCondLst>
+                                            <p:cond delay="0"/>
+                                          </p:stCondLst>
+                                        </p:cTn>
+                                        <p:tgtEl>
+                                          <p:spTgt spid="73"/>
+                                        </p:tgtEl>
+                                        <p:attrNameLst>
+                                          <p:attrName>style.visibility</p:attrName>
+                                        </p:attrNameLst>
+                                      </p:cBhvr>
+                                      <p:to>
+                                        <p:strVal val="visible"/>
+                                      </p:to>
+                                    </p:set>
+                                    <p:animEffect transition="in" filter="fade">
+                                      <p:cBhvr>
+                                        <p:cTn id="19" dur="500"/>
+                                        <p:tgtEl>
+                                          <p:spTgt spid="73"/>
+                                        </p:tgtEl>
+                                      </p:cBhvr>
+                                    </p:animEffect>
+                                  </p:childTnLst>
+                                </p:cTn>
+                              </p:par>
+                              <p:par>
+                                <p:cTn id="20" presetID="10" presetClass="entr" presetSubtype="0" fill="hold" nodeType="withEffect">
+                                  <p:stCondLst>
+                                    <p:cond delay="0"/>
+                                  </p:stCondLst>
+                                  <p:childTnLst>
+                                    <p:set>
+                                      <p:cBhvr>
+                                        <p:cTn id="21" dur="1" fill="hold">
+                                          <p:stCondLst>
+                                            <p:cond delay="0"/>
+                                          </p:stCondLst>
+                                        </p:cTn>
+                                        <p:tgtEl>
+                                          <p:spTgt spid="79"/>
+                                        </p:tgtEl>
+                                        <p:attrNameLst>
+                                          <p:attrName>style.visibility</p:attrName>
+                                        </p:attrNameLst>
+                                      </p:cBhvr>
+                                      <p:to>
+                                        <p:strVal val="visible"/>
+                                      </p:to>
+                                    </p:set>
+                                    <p:animEffect transition="in" filter="fade">
+                                      <p:cBhvr>
+                                        <p:cTn id="22" dur="500"/>
+                                        <p:tgtEl>
+                                          <p:spTgt spid="79"/>
+                                        </p:tgtEl>
+                                      </p:cBhvr>
+                                    </p:animEffect>
+                                  </p:childTnLst>
+                                </p:cTn>
+                              </p:par>
+                            </p:childTnLst>
+                          </p:cTn>
+                        </p:par>
+                      </p:childTnLst>
+                    </p:cTn>
+                  </p:par>
+                  <p:par>
+                    <p:cTn id="23" fill="hold">
+                      <p:stCondLst>
+                        <p:cond delay="indefinite"/>
+                      </p:stCondLst>
+                      <p:childTnLst>
+                        <p:par>
+                          <p:cTn id="24" fill="hold">
+                            <p:stCondLst>
+                              <p:cond delay="0"/>
+                            </p:stCondLst>
+                            <p:childTnLst>
+                              <p:par>
+                                <p:cTn id="25" presetID="10" presetClass="entr" presetSubtype="0" fill="hold" nodeType="clickEffect">
+                                  <p:stCondLst>
+                                    <p:cond delay="0"/>
+                                  </p:stCondLst>
+                                  <p:childTnLst>
+                                    <p:set>
+                                      <p:cBhvr>
+                                        <p:cTn id="26" dur="1" fill="hold">
+                                          <p:stCondLst>
+                                            <p:cond delay="0"/>
+                                          </p:stCondLst>
+                                        </p:cTn>
+                                        <p:tgtEl>
+                                          <p:spTgt spid="75"/>
+                                        </p:tgtEl>
+                                        <p:attrNameLst>
+                                          <p:attrName>style.visibility</p:attrName>
+                                        </p:attrNameLst>
+                                      </p:cBhvr>
+                                      <p:to>
+                                        <p:strVal val="visible"/>
+                                      </p:to>
+                                    </p:set>
+                                    <p:animEffect transition="in" filter="fade">
+                                      <p:cBhvr>
+                                        <p:cTn id="27" dur="500"/>
+                                        <p:tgtEl>
+                                          <p:spTgt spid="75"/>
+                                        </p:tgtEl>
+                                      </p:cBhvr>
+                                    </p:animEffect>
+                                  </p:childTnLst>
+                                </p:cTn>
+                              </p:par>
+                              <p:par>
+                                <p:cTn id="28" presetID="10" presetClass="entr" presetSubtype="0" fill="hold" nodeType="withEffect">
+                                  <p:stCondLst>
+                                    <p:cond delay="0"/>
+                                  </p:stCondLst>
+                                  <p:childTnLst>
+                                    <p:set>
+                                      <p:cBhvr>
+                                        <p:cTn id="29" dur="1" fill="hold">
+                                          <p:stCondLst>
+                                            <p:cond delay="0"/>
+                                          </p:stCondLst>
+                                        </p:cTn>
+                                        <p:tgtEl>
+                                          <p:spTgt spid="78"/>
+                                        </p:tgtEl>
+                                        <p:attrNameLst>
+                                          <p:attrName>style.visibility</p:attrName>
+                                        </p:attrNameLst>
+                                      </p:cBhvr>
+                                      <p:to>
+                                        <p:strVal val="visible"/>
+                                      </p:to>
+                                    </p:set>
+                                    <p:animEffect transition="in" filter="fade">
+                                      <p:cBhvr>
+                                        <p:cTn id="30" dur="500"/>
+                                        <p:tgtEl>
+                                          <p:spTgt spid="78"/>
+                                        </p:tgtEl>
+                                      </p:cBhvr>
+                                    </p:animEffect>
+                                  </p:childTnLst>
+                                </p:cTn>
+                              </p:par>
+                            </p:childTnLst>
+                          </p:cTn>
+                        </p:par>
+                      </p:childTnLst>
+                    </p:cTn>
+                  </p:par>
+                  <p:par>
+                    <p:cTn id="31" fill="hold">
+                      <p:stCondLst>
+                        <p:cond delay="indefinite"/>
+                      </p:stCondLst>
+                      <p:childTnLst>
+                        <p:par>
+                          <p:cTn id="32" fill="hold">
+                            <p:stCondLst>
+                              <p:cond delay="0"/>
+                            </p:stCondLst>
+                            <p:childTnLst>
+                              <p:par>
+                                <p:cTn id="33" presetID="10" presetClass="entr" presetSubtype="0" fill="hold" nodeType="clickEffect">
+                                  <p:stCondLst>
+                                    <p:cond delay="0"/>
+                                  </p:stCondLst>
+                                  <p:childTnLst>
+                                    <p:set>
+                                      <p:cBhvr>
+                                        <p:cTn id="34" dur="1" fill="hold">
+                                          <p:stCondLst>
+                                            <p:cond delay="0"/>
+                                          </p:stCondLst>
+                                        </p:cTn>
+                                        <p:tgtEl>
+                                          <p:spTgt spid="76"/>
+                                        </p:tgtEl>
+                                        <p:attrNameLst>
+                                          <p:attrName>style.visibility</p:attrName>
+                                        </p:attrNameLst>
+                                      </p:cBhvr>
+                                      <p:to>
+                                        <p:strVal val="visible"/>
+                                      </p:to>
+                                    </p:set>
+                                    <p:animEffect transition="in" filter="fade">
+                                      <p:cBhvr>
+                                        <p:cTn id="35" dur="500"/>
+                                        <p:tgtEl>
+                                          <p:spTgt spid="76"/>
+                                        </p:tgtEl>
+                                      </p:cBhvr>
+                                    </p:animEffect>
+                                  </p:childTnLst>
+                                </p:cTn>
+                              </p:par>
+                              <p:par>
+                                <p:cTn id="36" presetID="10" presetClass="entr" presetSubtype="0" fill="hold" nodeType="withEffect">
+                                  <p:stCondLst>
+                                    <p:cond delay="0"/>
+                                  </p:stCondLst>
+                                  <p:childTnLst>
+                                    <p:set>
+                                      <p:cBhvr>
+                                        <p:cTn id="37" dur="1" fill="hold">
+                                          <p:stCondLst>
+                                            <p:cond delay="0"/>
+                                          </p:stCondLst>
+                                        </p:cTn>
+                                        <p:tgtEl>
+                                          <p:spTgt spid="80"/>
+                                        </p:tgtEl>
+                                        <p:attrNameLst>
+                                          <p:attrName>style.visibility</p:attrName>
+                                        </p:attrNameLst>
+                                      </p:cBhvr>
+                                      <p:to>
+                                        <p:strVal val="visible"/>
+                                      </p:to>
+                                    </p:set>
+                                    <p:animEffect transition="in" filter="fade">
+                                      <p:cBhvr>
+                                        <p:cTn id="38" dur="500"/>
+                                        <p:tgtEl>
+                                          <p:spTgt spid="80"/>
+                                        </p:tgtEl>
+                                      </p:cBhvr>
+                                    </p:animEffect>
+                                  </p:childTnLst>
+                                </p:cTn>
+                              </p:par>
+                            </p:childTnLst>
+                          </p:cTn>
+                        </p:par>
+                      </p:childTnLst>
+                    </p:cTn>
+                  </p:par>
+                </p:childTnLst>
+              </p:cTn>
+              <p:prevCondLst>
+                <p:cond evt="onPrev" delay="0">
+                  <p:tgtEl>
+                    <p:sldTgt/>
+                  </p:tgtEl>
+                </p:cond>
+              </p:prevCondLst>
+              <p:nextCondLst>
+                <p:cond evt="onNext" delay="0">
+                  <p:tgtEl>
+                    <p:sldTgt/>
+                  </p:tgtEl>
+                </p:cond>
+              </p:nextCondLst>
+            </p:seq>
+          </p:childTnLst>
+        </p:cTn>
+      </p:par>
+    </p:tnLst>
+  </p:timing>
+</p:sld>
+</file>
+
+<file path=ppt/slides/slide16.xml><?xml version="1.0" encoding="utf-8"?>
 <p:sld xmlns:a="http://schemas.openxmlformats.org/drawingml/2006/main" xmlns:r="http://schemas.openxmlformats.org/officeDocument/2006/relationships" xmlns:p="http://schemas.openxmlformats.org/presentationml/2006/main">
   <p:cSld>
     <p:spTree>
@@ -10587,7 +13645,7 @@
         </p:nvSpPr>
         <p:spPr>
           <a:xfrm>
-            <a:off x="4939500" y="1108332"/>
+            <a:off x="4939500" y="953268"/>
             <a:ext cx="3837000" cy="1477297"/>
           </a:xfrm>
           <a:prstGeom prst="rect">
@@ -10614,12 +13672,8 @@
               <a:buChar char="●"/>
             </a:pPr>
             <a:r>
-              <a:rPr lang="en" sz="1700"/>
-              <a:t>Consider </a:t>
-            </a:r>
-            <a:r>
               <a:rPr lang="en" sz="1700" dirty="0"/>
-              <a:t>additional factors</a:t>
+              <a:t>Consider additional factors</a:t>
             </a:r>
             <a:endParaRPr sz="1700" dirty="0"/>
           </a:p>
@@ -10697,8 +13751,8 @@
         </p:nvSpPr>
         <p:spPr>
           <a:xfrm>
-            <a:off x="4939500" y="2557545"/>
-            <a:ext cx="3837000" cy="577051"/>
+            <a:off x="4939500" y="2430565"/>
+            <a:ext cx="3837000" cy="969466"/>
           </a:xfrm>
           <a:prstGeom prst="rect">
             <a:avLst/>
@@ -10710,24 +13764,16 @@
           </a:bodyPr>
           <a:lstStyle/>
           <a:p>
-            <a:pPr marL="457200" lvl="0" indent="-336550" algn="l" rtl="0">
+            <a:pPr lvl="0" indent="-336550">
               <a:lnSpc>
                 <a:spcPct val="150000"/>
               </a:lnSpc>
-              <a:spcBef>
-                <a:spcPts val="0"/>
-              </a:spcBef>
-              <a:spcAft>
-                <a:spcPts val="0"/>
-              </a:spcAft>
               <a:buSzPts val="1700"/>
-              <a:buChar char="●"/>
             </a:pPr>
             <a:r>
-              <a:rPr lang="en" sz="1700" dirty="0"/>
-              <a:t>Forecast cancellations</a:t>
+              <a:rPr lang="en-US" sz="1700" dirty="0"/>
+              <a:t>Predict, forecast bookings and cancellations by room type</a:t>
             </a:r>
-            <a:endParaRPr sz="1700" dirty="0"/>
           </a:p>
         </p:txBody>
       </p:sp>
@@ -10743,7 +13789,7 @@
         </p:nvSpPr>
         <p:spPr>
           <a:xfrm>
-            <a:off x="4939500" y="3153817"/>
+            <a:off x="4939500" y="3400031"/>
             <a:ext cx="3837000" cy="969466"/>
           </a:xfrm>
           <a:prstGeom prst="rect">
@@ -10771,7 +13817,7 @@
             </a:pPr>
             <a:r>
               <a:rPr lang="en" sz="1700" dirty="0"/>
-              <a:t>Predict, forecast bookings by room type</a:t>
+              <a:t>Reduce reservation details – more generalizable to other hotels</a:t>
             </a:r>
             <a:endParaRPr sz="1700" dirty="0"/>
           </a:p>
@@ -10809,7 +13855,7 @@
             </a:pPr>
             <a:fld id="{00000000-1234-1234-1234-123412341234}" type="slidenum">
               <a:rPr lang="en" smtClean="0"/>
-              <a:t>13</a:t>
+              <a:t>16</a:t>
             </a:fld>
             <a:endParaRPr lang="en"/>
           </a:p>
@@ -11059,7 +14105,7 @@
 </p:sld>
 </file>
 
-<file path=ppt/slides/slide14.xml><?xml version="1.0" encoding="utf-8"?>
+<file path=ppt/slides/slide17.xml><?xml version="1.0" encoding="utf-8"?>
 <p:sld xmlns:a="http://schemas.openxmlformats.org/drawingml/2006/main" xmlns:r="http://schemas.openxmlformats.org/officeDocument/2006/relationships" xmlns:p="http://schemas.openxmlformats.org/presentationml/2006/main">
   <p:cSld>
     <p:spTree>
@@ -11463,7 +14509,7 @@
             </a:pPr>
             <a:fld id="{00000000-1234-1234-1234-123412341234}" type="slidenum">
               <a:rPr lang="en" smtClean="0"/>
-              <a:t>14</a:t>
+              <a:t>17</a:t>
             </a:fld>
             <a:endParaRPr lang="en"/>
           </a:p>
@@ -11887,13 +14933,13 @@
   <p:clrMapOvr>
     <a:masterClrMapping/>
   </p:clrMapOvr>
-  <mc:AlternateContent xmlns:mc="http://schemas.openxmlformats.org/markup-compatibility/2006">
-    <mc:Choice xmlns:p14="http://schemas.microsoft.com/office/powerpoint/2010/main" Requires="p14">
+  <mc:AlternateContent xmlns:mc="http://schemas.openxmlformats.org/markup-compatibility/2006" xmlns:p14="http://schemas.microsoft.com/office/powerpoint/2010/main">
+    <mc:Choice Requires="p14">
       <p:transition spd="med" p14:dur="700">
         <p:fade/>
       </p:transition>
     </mc:Choice>
-    <mc:Fallback>
+    <mc:Fallback xmlns="">
       <p:transition spd="med">
         <p:fade/>
       </p:transition>
@@ -12247,7 +15293,7 @@
           <a:p>
             <a:r>
               <a:rPr lang="en-US" dirty="0"/>
-              <a:t>“Putting Heads in Beds”</a:t>
+              <a:t>“Heads in Beds” Philosophy</a:t>
             </a:r>
           </a:p>
         </p:txBody>
@@ -14327,7 +17373,7 @@
         <p:spPr>
           <a:xfrm>
             <a:off x="4939500" y="2114100"/>
-            <a:ext cx="3837000" cy="631425"/>
+            <a:ext cx="3837000" cy="949973"/>
           </a:xfrm>
           <a:prstGeom prst="rect">
             <a:avLst/>
@@ -14361,6 +17407,18 @@
               <a:buChar char="●"/>
             </a:pPr>
             <a:r>
+              <a:rPr lang="en-US" sz="1800" dirty="0">
+                <a:solidFill>
+                  <a:schemeClr val="lt1"/>
+                </a:solidFill>
+                <a:latin typeface="Average"/>
+                <a:ea typeface="Average"/>
+                <a:cs typeface="Average"/>
+                <a:sym typeface="Average"/>
+              </a:rPr>
+              <a:t>N</a:t>
+            </a:r>
+            <a:r>
               <a:rPr lang="en" sz="1800" dirty="0">
                 <a:solidFill>
                   <a:schemeClr val="lt1"/>
@@ -14370,14 +17428,8 @@
                 <a:cs typeface="Average"/>
                 <a:sym typeface="Average"/>
               </a:rPr>
-              <a:t>Reservations from 2015 to 2017</a:t>
+              <a:t>early 120,000 reservations from 2015 to 2017</a:t>
             </a:r>
-            <a:endParaRPr dirty="0">
-              <a:latin typeface="Average"/>
-              <a:ea typeface="Average"/>
-              <a:cs typeface="Average"/>
-              <a:sym typeface="Average"/>
-            </a:endParaRPr>
           </a:p>
         </p:txBody>
       </p:sp>
@@ -14389,7 +17441,7 @@
         </p:nvSpPr>
         <p:spPr>
           <a:xfrm>
-            <a:off x="4939500" y="2745525"/>
+            <a:off x="4939500" y="2893452"/>
             <a:ext cx="3837000" cy="949973"/>
           </a:xfrm>
           <a:prstGeom prst="rect">
@@ -15164,7 +18216,7 @@
   <p:clrMapOvr>
     <a:masterClrMapping/>
   </p:clrMapOvr>
-  <p:transition spd="med" advTm="500">
+  <p:transition spd="med" advClick="0" advTm="750">
     <p:fade thruBlk="1"/>
   </p:transition>
 </p:sld>
@@ -15229,8 +18281,8 @@
               <a:buNone/>
             </a:pPr>
             <a:r>
-              <a:rPr lang="en" dirty="0"/>
-              <a:t>Cancellations are Most Likely When...</a:t>
+              <a:rPr lang="en-US" dirty="0"/>
+              <a:t>Models and their Results</a:t>
             </a:r>
             <a:endParaRPr dirty="0"/>
           </a:p>
@@ -15382,14 +18434,14 @@
               <a:buNone/>
             </a:pPr>
             <a:r>
-              <a:rPr lang="en" dirty="0">
+              <a:rPr lang="en-US" sz="1700" dirty="0">
                 <a:solidFill>
                   <a:schemeClr val="lt1"/>
                 </a:solidFill>
               </a:rPr>
-              <a:t>Booked for December</a:t>
+              <a:t>Baseline</a:t>
             </a:r>
-            <a:endParaRPr dirty="0">
+            <a:endParaRPr sz="1700" dirty="0">
               <a:solidFill>
                 <a:schemeClr val="lt1"/>
               </a:solidFill>
@@ -15409,8 +18461,8 @@
         </p:nvSpPr>
         <p:spPr>
           <a:xfrm>
-            <a:off x="493524" y="1850300"/>
-            <a:ext cx="2478600" cy="3065424"/>
+            <a:off x="491624" y="1952108"/>
+            <a:ext cx="2478600" cy="1444468"/>
           </a:xfrm>
           <a:prstGeom prst="rect">
             <a:avLst/>
@@ -15429,7 +18481,7 @@
             </a:pPr>
             <a:r>
               <a:rPr lang="en-US" sz="1600" dirty="0"/>
-              <a:t>Increased leisure travel during holidays</a:t>
+              <a:t>50% accuracy </a:t>
             </a:r>
           </a:p>
           <a:p>
@@ -15440,18 +18492,7 @@
             </a:pPr>
             <a:r>
               <a:rPr lang="en-US" sz="1600" dirty="0"/>
-              <a:t>Inclement weather, changing plans lead to cancellations</a:t>
-            </a:r>
-          </a:p>
-          <a:p>
-            <a:pPr marL="285750" indent="-285750">
-              <a:spcAft>
-                <a:spcPts val="1600"/>
-              </a:spcAft>
-            </a:pPr>
-            <a:r>
-              <a:rPr lang="en-US" sz="1600" dirty="0"/>
-              <a:t>Assumes hotel in Northern Hemisphere (winter season)</a:t>
+              <a:t>Not better or worse than random chance.</a:t>
             </a:r>
             <a:endParaRPr sz="1600" dirty="0"/>
           </a:p>
@@ -15591,14 +18632,14 @@
               <a:buNone/>
             </a:pPr>
             <a:r>
-              <a:rPr lang="en-US" dirty="0">
+              <a:rPr lang="en-US" sz="1700" dirty="0">
                 <a:solidFill>
                   <a:schemeClr val="lt1"/>
                 </a:solidFill>
               </a:rPr>
-              <a:t>Book Room Type “P”</a:t>
+              <a:t>Random Forest Classifier</a:t>
             </a:r>
-            <a:endParaRPr dirty="0">
+            <a:endParaRPr sz="1700" dirty="0">
               <a:solidFill>
                 <a:schemeClr val="lt1"/>
               </a:solidFill>
@@ -15618,8 +18659,8 @@
         </p:nvSpPr>
         <p:spPr>
           <a:xfrm>
-            <a:off x="5995601" y="1850300"/>
-            <a:ext cx="2478600" cy="2499115"/>
+            <a:off x="5987651" y="1952108"/>
+            <a:ext cx="2478600" cy="1727622"/>
           </a:xfrm>
           <a:prstGeom prst="rect">
             <a:avLst/>
@@ -15638,7 +18679,7 @@
             </a:pPr>
             <a:r>
               <a:rPr lang="en-US" sz="1600" dirty="0"/>
-              <a:t>Hotel-Specific</a:t>
+              <a:t>88% accurate</a:t>
             </a:r>
           </a:p>
           <a:p>
@@ -15649,18 +18690,7 @@
             </a:pPr>
             <a:r>
               <a:rPr lang="en-US" sz="1600" dirty="0"/>
-              <a:t>May indicate higher-quality room types are more likely to cancel</a:t>
-            </a:r>
-          </a:p>
-          <a:p>
-            <a:pPr marL="285750" indent="-285750">
-              <a:spcAft>
-                <a:spcPts val="1600"/>
-              </a:spcAft>
-            </a:pPr>
-            <a:r>
-              <a:rPr lang="en-US" sz="1600" dirty="0"/>
-              <a:t>Anonymous data limits interpretability</a:t>
+              <a:t>Negatively impacted by imbalanced reservation statuses.</a:t>
             </a:r>
             <a:endParaRPr sz="1600" dirty="0"/>
           </a:p>
@@ -15794,12 +18824,12 @@
               <a:buNone/>
             </a:pPr>
             <a:r>
-              <a:rPr lang="en-US" dirty="0">
+              <a:rPr lang="en-US" sz="1700" dirty="0">
                 <a:solidFill>
                   <a:schemeClr val="lt1"/>
                 </a:solidFill>
               </a:rPr>
-              <a:t>Booked for November</a:t>
+              <a:t>Logistic Regression</a:t>
             </a:r>
           </a:p>
         </p:txBody>
@@ -15816,8 +18846,8 @@
         </p:nvSpPr>
         <p:spPr>
           <a:xfrm>
-            <a:off x="3251525" y="1850300"/>
-            <a:ext cx="2478600" cy="2782270"/>
+            <a:off x="3249625" y="1952108"/>
+            <a:ext cx="2478600" cy="1727622"/>
           </a:xfrm>
           <a:prstGeom prst="rect">
             <a:avLst/>
@@ -15836,7 +18866,7 @@
             </a:pPr>
             <a:r>
               <a:rPr lang="en-US" sz="1600" dirty="0"/>
-              <a:t>Winter weather less likely</a:t>
+              <a:t>80% accuracy</a:t>
             </a:r>
           </a:p>
           <a:p>
@@ -15847,18 +18877,7 @@
             </a:pPr>
             <a:r>
               <a:rPr lang="en-US" sz="1600" dirty="0"/>
-              <a:t>Business travel still active</a:t>
-            </a:r>
-          </a:p>
-          <a:p>
-            <a:pPr marL="285750" indent="-285750">
-              <a:spcAft>
-                <a:spcPts val="1600"/>
-              </a:spcAft>
-            </a:pPr>
-            <a:r>
-              <a:rPr lang="en-US" sz="1600" dirty="0"/>
-              <a:t>Assumes hotel in Northern Hemisphere (winter season)</a:t>
+              <a:t>Negatively impacted by imbalanced reservation statuses.</a:t>
             </a:r>
           </a:p>
         </p:txBody>
@@ -15902,6 +18921,11 @@
         </p:txBody>
       </p:sp>
     </p:spTree>
+    <p:extLst>
+      <p:ext uri="{BB962C8B-B14F-4D97-AF65-F5344CB8AC3E}">
+        <p14:creationId xmlns:p14="http://schemas.microsoft.com/office/powerpoint/2010/main" val="3607670217"/>
+      </p:ext>
+    </p:extLst>
   </p:cSld>
   <p:clrMapOvr>
     <a:masterClrMapping/>

</xml_diff>

<commit_message>
Updating narrative in EDA
</commit_message>
<xml_diff>
--- a/Hotel_Cancel_Culture_Presentation.pptx
+++ b/Hotel_Cancel_Culture_Presentation.pptx
@@ -289,7 +289,7 @@
 
 <file path=ppt/commentAuthors.xml><?xml version="1.0" encoding="utf-8"?>
 <p:cmAuthorLst xmlns:a="http://schemas.openxmlformats.org/drawingml/2006/main" xmlns:r="http://schemas.openxmlformats.org/officeDocument/2006/relationships" xmlns:p="http://schemas.openxmlformats.org/presentationml/2006/main">
-  <p:cmAuthor id="1" name="Benjamin McCarty" initials="BM" lastIdx="1" clrIdx="0">
+  <p:cmAuthor id="1" name="Benjamin McCarty" initials="BM" lastIdx="8" clrIdx="0">
     <p:extLst>
       <p:ext uri="{19B8F6BF-5375-455C-9EA6-DF929625EA0E}">
         <p15:presenceInfo xmlns:p15="http://schemas.microsoft.com/office/powerpoint/2012/main" userId="21987de3918af3ed" providerId="Windows Live"/>
@@ -301,9 +301,93 @@
 
 <file path=ppt/comments/comment1.xml><?xml version="1.0" encoding="utf-8"?>
 <p:cmLst xmlns:a="http://schemas.openxmlformats.org/drawingml/2006/main" xmlns:r="http://schemas.openxmlformats.org/officeDocument/2006/relationships" xmlns:p="http://schemas.openxmlformats.org/presentationml/2006/main">
-  <p:cm authorId="1" dt="2021-09-14T14:16:21.873" idx="1">
+  <p:cm authorId="1" dt="2021-09-15T08:22:01.521" idx="4">
     <p:pos x="10" y="10"/>
-    <p:text/>
+    <p:text>Not enthusiastic - may need to adjust</p:text>
+    <p:extLst>
+      <p:ext uri="{C676402C-5697-4E1C-873F-D02D1690AC5C}">
+        <p15:threadingInfo xmlns:p15="http://schemas.microsoft.com/office/powerpoint/2012/main" timeZoneBias="240"/>
+      </p:ext>
+    </p:extLst>
+  </p:cm>
+</p:cmLst>
+</file>
+
+<file path=ppt/comments/comment2.xml><?xml version="1.0" encoding="utf-8"?>
+<p:cmLst xmlns:a="http://schemas.openxmlformats.org/drawingml/2006/main" xmlns:r="http://schemas.openxmlformats.org/officeDocument/2006/relationships" xmlns:p="http://schemas.openxmlformats.org/presentationml/2006/main">
+  <p:cm authorId="1" dt="2021-09-15T08:24:59.498" idx="5">
+    <p:pos x="10" y="10"/>
+    <p:text>What benefit does this provide? may take up too much time</p:text>
+    <p:extLst>
+      <p:ext uri="{C676402C-5697-4E1C-873F-D02D1690AC5C}">
+        <p15:threadingInfo xmlns:p15="http://schemas.microsoft.com/office/powerpoint/2012/main" timeZoneBias="240"/>
+      </p:ext>
+    </p:extLst>
+  </p:cm>
+</p:cmLst>
+</file>
+
+<file path=ppt/comments/comment3.xml><?xml version="1.0" encoding="utf-8"?>
+<p:cmLst xmlns:a="http://schemas.openxmlformats.org/drawingml/2006/main" xmlns:r="http://schemas.openxmlformats.org/officeDocument/2006/relationships" xmlns:p="http://schemas.openxmlformats.org/presentationml/2006/main">
+  <p:cm authorId="1" dt="2021-09-15T08:26:06.718" idx="6">
+    <p:pos x="10" y="10"/>
+    <p:text>Is it worth keeping this vs. the RFC SHAP?</p:text>
+    <p:extLst>
+      <p:ext uri="{C676402C-5697-4E1C-873F-D02D1690AC5C}">
+        <p15:threadingInfo xmlns:p15="http://schemas.microsoft.com/office/powerpoint/2012/main" timeZoneBias="240"/>
+      </p:ext>
+    </p:extLst>
+  </p:cm>
+</p:cmLst>
+</file>
+
+<file path=ppt/comments/comment4.xml><?xml version="1.0" encoding="utf-8"?>
+<p:cmLst xmlns:a="http://schemas.openxmlformats.org/drawingml/2006/main" xmlns:r="http://schemas.openxmlformats.org/officeDocument/2006/relationships" xmlns:p="http://schemas.openxmlformats.org/presentationml/2006/main">
+  <p:cm authorId="1" dt="2021-09-15T08:26:23.799" idx="7">
+    <p:pos x="10" y="10"/>
+    <p:text>Is it worth keeping this vs. the RFC SHAP?</p:text>
+    <p:extLst>
+      <p:ext uri="{C676402C-5697-4E1C-873F-D02D1690AC5C}">
+        <p15:threadingInfo xmlns:p15="http://schemas.microsoft.com/office/powerpoint/2012/main" timeZoneBias="240"/>
+      </p:ext>
+    </p:extLst>
+  </p:cm>
+</p:cmLst>
+</file>
+
+<file path=ppt/comments/comment5.xml><?xml version="1.0" encoding="utf-8"?>
+<p:cmLst xmlns:a="http://schemas.openxmlformats.org/drawingml/2006/main" xmlns:r="http://schemas.openxmlformats.org/officeDocument/2006/relationships" xmlns:p="http://schemas.openxmlformats.org/presentationml/2006/main">
+  <p:cm authorId="1" dt="2021-09-15T08:21:43.993" idx="3">
+    <p:pos x="10" y="10"/>
+    <p:text>Add H2 read/interpret!</p:text>
+    <p:extLst>
+      <p:ext uri="{C676402C-5697-4E1C-873F-D02D1690AC5C}">
+        <p15:threadingInfo xmlns:p15="http://schemas.microsoft.com/office/powerpoint/2012/main" timeZoneBias="240"/>
+      </p:ext>
+    </p:extLst>
+  </p:cm>
+</p:cmLst>
+</file>
+
+<file path=ppt/comments/comment6.xml><?xml version="1.0" encoding="utf-8"?>
+<p:cmLst xmlns:a="http://schemas.openxmlformats.org/drawingml/2006/main" xmlns:r="http://schemas.openxmlformats.org/officeDocument/2006/relationships" xmlns:p="http://schemas.openxmlformats.org/presentationml/2006/main">
+  <p:cm authorId="1" dt="2021-09-15T08:21:30.367" idx="2">
+    <p:pos x="10" y="10"/>
+    <p:text>Make sure to update this slide's results!</p:text>
+    <p:extLst>
+      <p:ext uri="{C676402C-5697-4E1C-873F-D02D1690AC5C}">
+        <p15:threadingInfo xmlns:p15="http://schemas.microsoft.com/office/powerpoint/2012/main" timeZoneBias="240"/>
+      </p:ext>
+    </p:extLst>
+  </p:cm>
+</p:cmLst>
+</file>
+
+<file path=ppt/comments/comment7.xml><?xml version="1.0" encoding="utf-8"?>
+<p:cmLst xmlns:a="http://schemas.openxmlformats.org/drawingml/2006/main" xmlns:r="http://schemas.openxmlformats.org/officeDocument/2006/relationships" xmlns:p="http://schemas.openxmlformats.org/presentationml/2006/main">
+  <p:cm authorId="1" dt="2021-09-15T08:26:30.999" idx="8">
+    <p:pos x="10" y="10"/>
+    <p:text>Update from RFC SHAP</p:text>
     <p:extLst>
       <p:ext uri="{C676402C-5697-4E1C-873F-D02D1690AC5C}">
         <p15:threadingInfo xmlns:p15="http://schemas.microsoft.com/office/powerpoint/2012/main" timeZoneBias="240"/>
@@ -7250,7 +7334,7 @@
         <p:fade thruBlk="1"/>
       </p:transition>
     </mc:Choice>
-    <mc:Fallback xmlns="" xmlns:mv="urn:schemas-microsoft-com:mac:vml" xmlns:c="http://schemas.openxmlformats.org/drawingml/2006/chart" xmlns:dgm="http://schemas.openxmlformats.org/drawingml/2006/diagram" xmlns:o="urn:schemas-microsoft-com:office:office" xmlns:v="urn:schemas-microsoft-com:vml" xmlns:pvml="urn:schemas-microsoft-com:office:powerpoint" xmlns:com="http://schemas.openxmlformats.org/drawingml/2006/compatibility" xmlns:p15="http://schemas.microsoft.com/office/powerpoint/2012/main" xmlns:ahyp="http://schemas.microsoft.com/office/drawing/2018/hyperlinkcolor">
+    <mc:Fallback xmlns:ahyp="http://schemas.microsoft.com/office/drawing/2018/hyperlinkcolor" xmlns:p15="http://schemas.microsoft.com/office/powerpoint/2012/main" xmlns:com="http://schemas.openxmlformats.org/drawingml/2006/compatibility" xmlns:pvml="urn:schemas-microsoft-com:office:powerpoint" xmlns:v="urn:schemas-microsoft-com:vml" xmlns:o="urn:schemas-microsoft-com:office:office" xmlns:dgm="http://schemas.openxmlformats.org/drawingml/2006/diagram" xmlns:c="http://schemas.openxmlformats.org/drawingml/2006/chart" xmlns:mv="urn:schemas-microsoft-com:mac:vml" xmlns="">
       <p:transition spd="slow">
         <p:fade/>
       </p:transition>
@@ -8468,7 +8552,7 @@
             </a:pPr>
             <a:r>
               <a:rPr lang="en-US" dirty="0"/>
-              <a:t>Most Significant Aspects:</a:t>
+              <a:t>Strongest Characteristics – Logistic Regression:</a:t>
             </a:r>
             <a:endParaRPr dirty="0"/>
           </a:p>
@@ -8666,12 +8750,8 @@
               </a:spcAft>
             </a:pPr>
             <a:r>
-              <a:rPr lang="en-US" sz="1600"/>
-              <a:t>Increased </a:t>
-            </a:r>
-            <a:r>
-              <a:rPr lang="en-US" sz="1600" dirty="0"/>
-              <a:t>odds of cancellations</a:t>
+              <a:rPr lang="en-US" sz="1600" b="1" dirty="0"/>
+              <a:t>Increased odds of cancellations</a:t>
             </a:r>
           </a:p>
           <a:p>
@@ -8880,7 +8960,11 @@
             </a:pPr>
             <a:r>
               <a:rPr lang="en-US" sz="1600" dirty="0"/>
-              <a:t>Room types (standard, premium, suite) may increase odds of cancellation</a:t>
+              <a:t>Room types (standard, premium, suite) </a:t>
+            </a:r>
+            <a:r>
+              <a:rPr lang="en-US" sz="1600" b="1" dirty="0"/>
+              <a:t>may increase odds of cancellation</a:t>
             </a:r>
           </a:p>
           <a:p>
@@ -9066,7 +9150,7 @@
               </a:spcAft>
             </a:pPr>
             <a:r>
-              <a:rPr lang="en-US" sz="1600" dirty="0"/>
+              <a:rPr lang="en-US" sz="1600" b="1" dirty="0"/>
               <a:t>Decreased odds of cancellations</a:t>
             </a:r>
           </a:p>
@@ -9279,24 +9363,15 @@
                                   </p:childTnLst>
                                 </p:cTn>
                               </p:par>
-                            </p:childTnLst>
-                          </p:cTn>
-                        </p:par>
-                        <p:par>
-                          <p:cTn id="15" fill="hold">
-                            <p:stCondLst>
-                              <p:cond delay="1000"/>
-                            </p:stCondLst>
-                            <p:childTnLst>
                               <p:par>
-                                <p:cTn id="16" presetID="10" presetClass="entr" presetSubtype="0" fill="hold" nodeType="afterEffect">
+                                <p:cTn id="15" presetID="10" presetClass="entr" presetSubtype="0" fill="hold" nodeType="withEffect">
                                   <p:stCondLst>
                                     <p:cond delay="0"/>
                                   </p:stCondLst>
                                   <p:childTnLst>
                                     <p:set>
                                       <p:cBhvr>
-                                        <p:cTn id="17" dur="1" fill="hold">
+                                        <p:cTn id="16" dur="1" fill="hold">
                                           <p:stCondLst>
                                             <p:cond delay="0"/>
                                           </p:stCondLst>
@@ -9314,7 +9389,7 @@
                                     </p:set>
                                     <p:animEffect transition="in" filter="fade">
                                       <p:cBhvr>
-                                        <p:cTn id="18" dur="500"/>
+                                        <p:cTn id="17" dur="500"/>
                                         <p:tgtEl>
                                           <p:spTgt spid="110"/>
                                         </p:tgtEl>
@@ -9330,26 +9405,26 @@
                     </p:cTn>
                   </p:par>
                   <p:par>
-                    <p:cTn id="19" fill="hold">
+                    <p:cTn id="18" fill="hold">
                       <p:stCondLst>
                         <p:cond delay="indefinite"/>
                       </p:stCondLst>
                       <p:childTnLst>
                         <p:par>
-                          <p:cTn id="20" fill="hold">
+                          <p:cTn id="19" fill="hold">
                             <p:stCondLst>
                               <p:cond delay="0"/>
                             </p:stCondLst>
                             <p:childTnLst>
                               <p:par>
-                                <p:cTn id="21" presetID="10" presetClass="entr" presetSubtype="0" fill="hold" nodeType="clickEffect">
+                                <p:cTn id="20" presetID="10" presetClass="entr" presetSubtype="0" fill="hold" nodeType="clickEffect">
                                   <p:stCondLst>
                                     <p:cond delay="0"/>
                                   </p:stCondLst>
                                   <p:childTnLst>
                                     <p:set>
                                       <p:cBhvr>
-                                        <p:cTn id="22" dur="1" fill="hold">
+                                        <p:cTn id="21" dur="1" fill="hold">
                                           <p:stCondLst>
                                             <p:cond delay="0"/>
                                           </p:stCondLst>
@@ -9367,7 +9442,7 @@
                                     </p:set>
                                     <p:animEffect transition="in" filter="fade">
                                       <p:cBhvr>
-                                        <p:cTn id="23" dur="500"/>
+                                        <p:cTn id="22" dur="500"/>
                                         <p:tgtEl>
                                           <p:spTgt spid="119"/>
                                         </p:tgtEl>
@@ -9377,14 +9452,14 @@
                                 </p:cTn>
                               </p:par>
                               <p:par>
-                                <p:cTn id="24" presetID="10" presetClass="entr" presetSubtype="0" fill="hold" nodeType="withEffect">
+                                <p:cTn id="23" presetID="10" presetClass="entr" presetSubtype="0" fill="hold" nodeType="withEffect">
                                   <p:stCondLst>
                                     <p:cond delay="0"/>
                                   </p:stCondLst>
                                   <p:childTnLst>
                                     <p:set>
                                       <p:cBhvr>
-                                        <p:cTn id="25" dur="1" fill="hold">
+                                        <p:cTn id="24" dur="1" fill="hold">
                                           <p:stCondLst>
                                             <p:cond delay="0"/>
                                           </p:stCondLst>
@@ -9402,7 +9477,7 @@
                                     </p:set>
                                     <p:animEffect transition="in" filter="fade">
                                       <p:cBhvr>
-                                        <p:cTn id="26" dur="500"/>
+                                        <p:cTn id="25" dur="500"/>
                                         <p:tgtEl>
                                           <p:spTgt spid="116"/>
                                         </p:tgtEl>
@@ -9411,24 +9486,15 @@
                                   </p:childTnLst>
                                 </p:cTn>
                               </p:par>
-                            </p:childTnLst>
-                          </p:cTn>
-                        </p:par>
-                        <p:par>
-                          <p:cTn id="27" fill="hold">
-                            <p:stCondLst>
-                              <p:cond delay="500"/>
-                            </p:stCondLst>
-                            <p:childTnLst>
                               <p:par>
-                                <p:cTn id="28" presetID="10" presetClass="entr" presetSubtype="0" fill="hold" nodeType="afterEffect">
+                                <p:cTn id="26" presetID="10" presetClass="entr" presetSubtype="0" fill="hold" nodeType="withEffect">
                                   <p:stCondLst>
                                     <p:cond delay="0"/>
                                   </p:stCondLst>
                                   <p:childTnLst>
                                     <p:set>
                                       <p:cBhvr>
-                                        <p:cTn id="29" dur="1" fill="hold">
+                                        <p:cTn id="27" dur="1" fill="hold">
                                           <p:stCondLst>
                                             <p:cond delay="0"/>
                                           </p:stCondLst>
@@ -9446,7 +9512,7 @@
                                     </p:set>
                                     <p:animEffect transition="in" filter="fade">
                                       <p:cBhvr>
-                                        <p:cTn id="30" dur="500"/>
+                                        <p:cTn id="28" dur="500"/>
                                         <p:tgtEl>
                                           <p:spTgt spid="120"/>
                                         </p:tgtEl>
@@ -9462,26 +9528,26 @@
                     </p:cTn>
                   </p:par>
                   <p:par>
-                    <p:cTn id="31" fill="hold">
+                    <p:cTn id="29" fill="hold">
                       <p:stCondLst>
                         <p:cond delay="indefinite"/>
                       </p:stCondLst>
                       <p:childTnLst>
                         <p:par>
-                          <p:cTn id="32" fill="hold">
+                          <p:cTn id="30" fill="hold">
                             <p:stCondLst>
                               <p:cond delay="0"/>
                             </p:stCondLst>
                             <p:childTnLst>
                               <p:par>
-                                <p:cTn id="33" presetID="10" presetClass="entr" presetSubtype="0" fill="hold" nodeType="clickEffect">
+                                <p:cTn id="31" presetID="10" presetClass="entr" presetSubtype="0" fill="hold" nodeType="clickEffect">
                                   <p:stCondLst>
                                     <p:cond delay="0"/>
                                   </p:stCondLst>
                                   <p:childTnLst>
                                     <p:set>
                                       <p:cBhvr>
-                                        <p:cTn id="34" dur="1" fill="hold">
+                                        <p:cTn id="32" dur="1" fill="hold">
                                           <p:stCondLst>
                                             <p:cond delay="0"/>
                                           </p:stCondLst>
@@ -9499,7 +9565,7 @@
                                     </p:set>
                                     <p:animEffect transition="in" filter="fade">
                                       <p:cBhvr>
-                                        <p:cTn id="35" dur="500"/>
+                                        <p:cTn id="33" dur="500"/>
                                         <p:tgtEl>
                                           <p:spTgt spid="114"/>
                                         </p:tgtEl>
@@ -9509,14 +9575,14 @@
                                 </p:cTn>
                               </p:par>
                               <p:par>
-                                <p:cTn id="36" presetID="10" presetClass="entr" presetSubtype="0" fill="hold" nodeType="withEffect">
+                                <p:cTn id="34" presetID="10" presetClass="entr" presetSubtype="0" fill="hold" nodeType="withEffect">
                                   <p:stCondLst>
                                     <p:cond delay="0"/>
                                   </p:stCondLst>
                                   <p:childTnLst>
                                     <p:set>
                                       <p:cBhvr>
-                                        <p:cTn id="37" dur="1" fill="hold">
+                                        <p:cTn id="35" dur="1" fill="hold">
                                           <p:stCondLst>
                                             <p:cond delay="0"/>
                                           </p:stCondLst>
@@ -9534,7 +9600,7 @@
                                     </p:set>
                                     <p:animEffect transition="in" filter="fade">
                                       <p:cBhvr>
-                                        <p:cTn id="38" dur="500"/>
+                                        <p:cTn id="36" dur="500"/>
                                         <p:tgtEl>
                                           <p:spTgt spid="111"/>
                                         </p:tgtEl>
@@ -9543,24 +9609,15 @@
                                   </p:childTnLst>
                                 </p:cTn>
                               </p:par>
-                            </p:childTnLst>
-                          </p:cTn>
-                        </p:par>
-                        <p:par>
-                          <p:cTn id="39" fill="hold">
-                            <p:stCondLst>
-                              <p:cond delay="500"/>
-                            </p:stCondLst>
-                            <p:childTnLst>
                               <p:par>
-                                <p:cTn id="40" presetID="10" presetClass="entr" presetSubtype="0" fill="hold" nodeType="afterEffect">
+                                <p:cTn id="37" presetID="10" presetClass="entr" presetSubtype="0" fill="hold" nodeType="withEffect">
                                   <p:stCondLst>
                                     <p:cond delay="0"/>
                                   </p:stCondLst>
                                   <p:childTnLst>
                                     <p:set>
                                       <p:cBhvr>
-                                        <p:cTn id="41" dur="1" fill="hold">
+                                        <p:cTn id="38" dur="1" fill="hold">
                                           <p:stCondLst>
                                             <p:cond delay="0"/>
                                           </p:stCondLst>
@@ -9578,7 +9635,7 @@
                                     </p:set>
                                     <p:animEffect transition="in" filter="fade">
                                       <p:cBhvr>
-                                        <p:cTn id="42" dur="500"/>
+                                        <p:cTn id="39" dur="500"/>
                                         <p:tgtEl>
                                           <p:spTgt spid="115"/>
                                         </p:tgtEl>
@@ -10178,7 +10235,7 @@
         <p:spPr>
           <a:xfrm>
             <a:off x="493524" y="1850300"/>
-            <a:ext cx="2478600" cy="2293931"/>
+            <a:ext cx="2478600" cy="672974"/>
           </a:xfrm>
           <a:prstGeom prst="rect">
             <a:avLst/>
@@ -10197,18 +10254,7 @@
             </a:pPr>
             <a:r>
               <a:rPr lang="en-US" sz="1600" dirty="0"/>
-              <a:t>Reservations from Portugal </a:t>
-            </a:r>
-          </a:p>
-          <a:p>
-            <a:pPr marL="285750" indent="-285750">
-              <a:spcAft>
-                <a:spcPts val="1600"/>
-              </a:spcAft>
-            </a:pPr>
-            <a:r>
-              <a:rPr lang="en-US" sz="1600" dirty="0"/>
-              <a:t>Most reservations from Portugal – limits impact of other countries</a:t>
+              <a:t>Update!</a:t>
             </a:r>
             <a:endParaRPr sz="1200" dirty="0"/>
           </a:p>
@@ -10790,24 +10836,15 @@
                                   </p:childTnLst>
                                 </p:cTn>
                               </p:par>
-                            </p:childTnLst>
-                          </p:cTn>
-                        </p:par>
-                        <p:par>
-                          <p:cTn id="15" fill="hold">
-                            <p:stCondLst>
-                              <p:cond delay="1000"/>
-                            </p:stCondLst>
-                            <p:childTnLst>
                               <p:par>
-                                <p:cTn id="16" presetID="10" presetClass="entr" presetSubtype="0" fill="hold" nodeType="afterEffect">
+                                <p:cTn id="15" presetID="10" presetClass="entr" presetSubtype="0" fill="hold" nodeType="withEffect">
                                   <p:stCondLst>
                                     <p:cond delay="0"/>
                                   </p:stCondLst>
                                   <p:childTnLst>
                                     <p:set>
                                       <p:cBhvr>
-                                        <p:cTn id="17" dur="1" fill="hold">
+                                        <p:cTn id="16" dur="1" fill="hold">
                                           <p:stCondLst>
                                             <p:cond delay="0"/>
                                           </p:stCondLst>
@@ -10825,7 +10862,7 @@
                                     </p:set>
                                     <p:animEffect transition="in" filter="fade">
                                       <p:cBhvr>
-                                        <p:cTn id="18" dur="500"/>
+                                        <p:cTn id="17" dur="500"/>
                                         <p:tgtEl>
                                           <p:spTgt spid="110"/>
                                         </p:tgtEl>
@@ -10841,26 +10878,26 @@
                     </p:cTn>
                   </p:par>
                   <p:par>
-                    <p:cTn id="19" fill="hold">
+                    <p:cTn id="18" fill="hold">
                       <p:stCondLst>
                         <p:cond delay="indefinite"/>
                       </p:stCondLst>
                       <p:childTnLst>
                         <p:par>
-                          <p:cTn id="20" fill="hold">
+                          <p:cTn id="19" fill="hold">
                             <p:stCondLst>
                               <p:cond delay="0"/>
                             </p:stCondLst>
                             <p:childTnLst>
                               <p:par>
-                                <p:cTn id="21" presetID="10" presetClass="entr" presetSubtype="0" fill="hold" nodeType="clickEffect">
+                                <p:cTn id="20" presetID="10" presetClass="entr" presetSubtype="0" fill="hold" nodeType="clickEffect">
                                   <p:stCondLst>
                                     <p:cond delay="0"/>
                                   </p:stCondLst>
                                   <p:childTnLst>
                                     <p:set>
                                       <p:cBhvr>
-                                        <p:cTn id="22" dur="1" fill="hold">
+                                        <p:cTn id="21" dur="1" fill="hold">
                                           <p:stCondLst>
                                             <p:cond delay="0"/>
                                           </p:stCondLst>
@@ -10878,7 +10915,7 @@
                                     </p:set>
                                     <p:animEffect transition="in" filter="fade">
                                       <p:cBhvr>
-                                        <p:cTn id="23" dur="500"/>
+                                        <p:cTn id="22" dur="500"/>
                                         <p:tgtEl>
                                           <p:spTgt spid="119"/>
                                         </p:tgtEl>
@@ -10888,14 +10925,14 @@
                                 </p:cTn>
                               </p:par>
                               <p:par>
-                                <p:cTn id="24" presetID="10" presetClass="entr" presetSubtype="0" fill="hold" nodeType="withEffect">
+                                <p:cTn id="23" presetID="10" presetClass="entr" presetSubtype="0" fill="hold" nodeType="withEffect">
                                   <p:stCondLst>
                                     <p:cond delay="0"/>
                                   </p:stCondLst>
                                   <p:childTnLst>
                                     <p:set>
                                       <p:cBhvr>
-                                        <p:cTn id="25" dur="1" fill="hold">
+                                        <p:cTn id="24" dur="1" fill="hold">
                                           <p:stCondLst>
                                             <p:cond delay="0"/>
                                           </p:stCondLst>
@@ -10913,7 +10950,7 @@
                                     </p:set>
                                     <p:animEffect transition="in" filter="fade">
                                       <p:cBhvr>
-                                        <p:cTn id="26" dur="500"/>
+                                        <p:cTn id="25" dur="500"/>
                                         <p:tgtEl>
                                           <p:spTgt spid="116"/>
                                         </p:tgtEl>
@@ -10922,24 +10959,15 @@
                                   </p:childTnLst>
                                 </p:cTn>
                               </p:par>
-                            </p:childTnLst>
-                          </p:cTn>
-                        </p:par>
-                        <p:par>
-                          <p:cTn id="27" fill="hold">
-                            <p:stCondLst>
-                              <p:cond delay="500"/>
-                            </p:stCondLst>
-                            <p:childTnLst>
                               <p:par>
-                                <p:cTn id="28" presetID="10" presetClass="entr" presetSubtype="0" fill="hold" nodeType="afterEffect">
+                                <p:cTn id="26" presetID="10" presetClass="entr" presetSubtype="0" fill="hold" nodeType="withEffect">
                                   <p:stCondLst>
                                     <p:cond delay="0"/>
                                   </p:stCondLst>
                                   <p:childTnLst>
                                     <p:set>
                                       <p:cBhvr>
-                                        <p:cTn id="29" dur="1" fill="hold">
+                                        <p:cTn id="27" dur="1" fill="hold">
                                           <p:stCondLst>
                                             <p:cond delay="0"/>
                                           </p:stCondLst>
@@ -10957,7 +10985,7 @@
                                     </p:set>
                                     <p:animEffect transition="in" filter="fade">
                                       <p:cBhvr>
-                                        <p:cTn id="30" dur="500"/>
+                                        <p:cTn id="28" dur="500"/>
                                         <p:tgtEl>
                                           <p:spTgt spid="120"/>
                                         </p:tgtEl>
@@ -10973,26 +11001,26 @@
                     </p:cTn>
                   </p:par>
                   <p:par>
-                    <p:cTn id="31" fill="hold">
+                    <p:cTn id="29" fill="hold">
                       <p:stCondLst>
                         <p:cond delay="indefinite"/>
                       </p:stCondLst>
                       <p:childTnLst>
                         <p:par>
-                          <p:cTn id="32" fill="hold">
+                          <p:cTn id="30" fill="hold">
                             <p:stCondLst>
                               <p:cond delay="0"/>
                             </p:stCondLst>
                             <p:childTnLst>
                               <p:par>
-                                <p:cTn id="33" presetID="10" presetClass="entr" presetSubtype="0" fill="hold" nodeType="clickEffect">
+                                <p:cTn id="31" presetID="10" presetClass="entr" presetSubtype="0" fill="hold" nodeType="clickEffect">
                                   <p:stCondLst>
                                     <p:cond delay="0"/>
                                   </p:stCondLst>
                                   <p:childTnLst>
                                     <p:set>
                                       <p:cBhvr>
-                                        <p:cTn id="34" dur="1" fill="hold">
+                                        <p:cTn id="32" dur="1" fill="hold">
                                           <p:stCondLst>
                                             <p:cond delay="0"/>
                                           </p:stCondLst>
@@ -11010,7 +11038,7 @@
                                     </p:set>
                                     <p:animEffect transition="in" filter="fade">
                                       <p:cBhvr>
-                                        <p:cTn id="35" dur="500"/>
+                                        <p:cTn id="33" dur="500"/>
                                         <p:tgtEl>
                                           <p:spTgt spid="114"/>
                                         </p:tgtEl>
@@ -11020,14 +11048,14 @@
                                 </p:cTn>
                               </p:par>
                               <p:par>
-                                <p:cTn id="36" presetID="10" presetClass="entr" presetSubtype="0" fill="hold" nodeType="withEffect">
+                                <p:cTn id="34" presetID="10" presetClass="entr" presetSubtype="0" fill="hold" nodeType="withEffect">
                                   <p:stCondLst>
                                     <p:cond delay="0"/>
                                   </p:stCondLst>
                                   <p:childTnLst>
                                     <p:set>
                                       <p:cBhvr>
-                                        <p:cTn id="37" dur="1" fill="hold">
+                                        <p:cTn id="35" dur="1" fill="hold">
                                           <p:stCondLst>
                                             <p:cond delay="0"/>
                                           </p:stCondLst>
@@ -11045,7 +11073,7 @@
                                     </p:set>
                                     <p:animEffect transition="in" filter="fade">
                                       <p:cBhvr>
-                                        <p:cTn id="38" dur="500"/>
+                                        <p:cTn id="36" dur="500"/>
                                         <p:tgtEl>
                                           <p:spTgt spid="111"/>
                                         </p:tgtEl>
@@ -11054,24 +11082,15 @@
                                   </p:childTnLst>
                                 </p:cTn>
                               </p:par>
-                            </p:childTnLst>
-                          </p:cTn>
-                        </p:par>
-                        <p:par>
-                          <p:cTn id="39" fill="hold">
-                            <p:stCondLst>
-                              <p:cond delay="500"/>
-                            </p:stCondLst>
-                            <p:childTnLst>
                               <p:par>
-                                <p:cTn id="40" presetID="10" presetClass="entr" presetSubtype="0" fill="hold" nodeType="afterEffect">
+                                <p:cTn id="37" presetID="10" presetClass="entr" presetSubtype="0" fill="hold" nodeType="withEffect">
                                   <p:stCondLst>
                                     <p:cond delay="0"/>
                                   </p:stCondLst>
                                   <p:childTnLst>
                                     <p:set>
                                       <p:cBhvr>
-                                        <p:cTn id="41" dur="1" fill="hold">
+                                        <p:cTn id="38" dur="1" fill="hold">
                                           <p:stCondLst>
                                             <p:cond delay="0"/>
                                           </p:stCondLst>
@@ -11089,7 +11108,7 @@
                                     </p:set>
                                     <p:animEffect transition="in" filter="fade">
                                       <p:cBhvr>
-                                        <p:cTn id="42" dur="500"/>
+                                        <p:cTn id="39" dur="500"/>
                                         <p:tgtEl>
                                           <p:spTgt spid="115"/>
                                         </p:tgtEl>
@@ -13971,30 +13990,21 @@
                             </p:childTnLst>
                           </p:cTn>
                         </p:par>
-                      </p:childTnLst>
-                    </p:cTn>
-                  </p:par>
-                  <p:par>
-                    <p:cTn id="12" fill="hold">
-                      <p:stCondLst>
-                        <p:cond delay="indefinite"/>
-                      </p:stCondLst>
-                      <p:childTnLst>
                         <p:par>
-                          <p:cTn id="13" fill="hold">
+                          <p:cTn id="12" fill="hold">
                             <p:stCondLst>
-                              <p:cond delay="0"/>
+                              <p:cond delay="1000"/>
                             </p:stCondLst>
                             <p:childTnLst>
                               <p:par>
-                                <p:cTn id="14" presetID="10" presetClass="entr" presetSubtype="0" fill="hold" nodeType="clickEffect">
+                                <p:cTn id="13" presetID="10" presetClass="entr" presetSubtype="0" fill="hold" nodeType="afterEffect">
                                   <p:stCondLst>
                                     <p:cond delay="0"/>
                                   </p:stCondLst>
                                   <p:childTnLst>
                                     <p:set>
                                       <p:cBhvr>
-                                        <p:cTn id="15" dur="1" fill="hold">
+                                        <p:cTn id="14" dur="1" fill="hold">
                                           <p:stCondLst>
                                             <p:cond delay="0"/>
                                           </p:stCondLst>
@@ -14012,7 +14022,7 @@
                                     </p:set>
                                     <p:animEffect transition="in" filter="fade">
                                       <p:cBhvr>
-                                        <p:cTn id="16" dur="500"/>
+                                        <p:cTn id="15" dur="500"/>
                                         <p:tgtEl>
                                           <p:spTgt spid="176"/>
                                         </p:tgtEl>
@@ -14024,30 +14034,21 @@
                             </p:childTnLst>
                           </p:cTn>
                         </p:par>
-                      </p:childTnLst>
-                    </p:cTn>
-                  </p:par>
-                  <p:par>
-                    <p:cTn id="17" fill="hold">
-                      <p:stCondLst>
-                        <p:cond delay="indefinite"/>
-                      </p:stCondLst>
-                      <p:childTnLst>
                         <p:par>
-                          <p:cTn id="18" fill="hold">
+                          <p:cTn id="16" fill="hold">
                             <p:stCondLst>
-                              <p:cond delay="0"/>
+                              <p:cond delay="1500"/>
                             </p:stCondLst>
                             <p:childTnLst>
                               <p:par>
-                                <p:cTn id="19" presetID="10" presetClass="entr" presetSubtype="0" fill="hold" nodeType="clickEffect">
+                                <p:cTn id="17" presetID="10" presetClass="entr" presetSubtype="0" fill="hold" nodeType="afterEffect">
                                   <p:stCondLst>
                                     <p:cond delay="0"/>
                                   </p:stCondLst>
                                   <p:childTnLst>
                                     <p:set>
                                       <p:cBhvr>
-                                        <p:cTn id="20" dur="1" fill="hold">
+                                        <p:cTn id="18" dur="1" fill="hold">
                                           <p:stCondLst>
                                             <p:cond delay="0"/>
                                           </p:stCondLst>
@@ -14065,7 +14066,7 @@
                                     </p:set>
                                     <p:animEffect transition="in" filter="fade">
                                       <p:cBhvr>
-                                        <p:cTn id="21" dur="500"/>
+                                        <p:cTn id="19" dur="500"/>
                                         <p:tgtEl>
                                           <p:spTgt spid="177"/>
                                         </p:tgtEl>
@@ -16963,30 +16964,21 @@
                             </p:childTnLst>
                           </p:cTn>
                         </p:par>
-                      </p:childTnLst>
-                    </p:cTn>
-                  </p:par>
-                  <p:par>
-                    <p:cTn id="15" fill="hold">
-                      <p:stCondLst>
-                        <p:cond delay="indefinite"/>
-                      </p:stCondLst>
-                      <p:childTnLst>
                         <p:par>
-                          <p:cTn id="16" fill="hold">
+                          <p:cTn id="15" fill="hold">
                             <p:stCondLst>
-                              <p:cond delay="0"/>
+                              <p:cond delay="1000"/>
                             </p:stCondLst>
                             <p:childTnLst>
                               <p:par>
-                                <p:cTn id="17" presetID="10" presetClass="entr" presetSubtype="0" fill="hold" nodeType="clickEffect">
+                                <p:cTn id="16" presetID="10" presetClass="entr" presetSubtype="0" fill="hold" nodeType="afterEffect">
                                   <p:stCondLst>
                                     <p:cond delay="0"/>
                                   </p:stCondLst>
                                   <p:childTnLst>
                                     <p:set>
                                       <p:cBhvr>
-                                        <p:cTn id="18" dur="1" fill="hold">
+                                        <p:cTn id="17" dur="1" fill="hold">
                                           <p:stCondLst>
                                             <p:cond delay="0"/>
                                           </p:stCondLst>
@@ -17004,7 +16996,7 @@
                                     </p:set>
                                     <p:animEffect transition="in" filter="fade">
                                       <p:cBhvr>
-                                        <p:cTn id="19" dur="500"/>
+                                        <p:cTn id="18" dur="500"/>
                                         <p:tgtEl>
                                           <p:spTgt spid="73"/>
                                         </p:tgtEl>
@@ -17014,14 +17006,14 @@
                                 </p:cTn>
                               </p:par>
                               <p:par>
-                                <p:cTn id="20" presetID="10" presetClass="entr" presetSubtype="0" fill="hold" nodeType="withEffect">
+                                <p:cTn id="19" presetID="10" presetClass="entr" presetSubtype="0" fill="hold" nodeType="withEffect">
                                   <p:stCondLst>
                                     <p:cond delay="0"/>
                                   </p:stCondLst>
                                   <p:childTnLst>
                                     <p:set>
                                       <p:cBhvr>
-                                        <p:cTn id="21" dur="1" fill="hold">
+                                        <p:cTn id="20" dur="1" fill="hold">
                                           <p:stCondLst>
                                             <p:cond delay="0"/>
                                           </p:stCondLst>
@@ -17039,7 +17031,7 @@
                                     </p:set>
                                     <p:animEffect transition="in" filter="fade">
                                       <p:cBhvr>
-                                        <p:cTn id="22" dur="500"/>
+                                        <p:cTn id="21" dur="500"/>
                                         <p:tgtEl>
                                           <p:spTgt spid="79"/>
                                         </p:tgtEl>
@@ -17055,26 +17047,26 @@
                     </p:cTn>
                   </p:par>
                   <p:par>
-                    <p:cTn id="23" fill="hold">
+                    <p:cTn id="22" fill="hold">
                       <p:stCondLst>
                         <p:cond delay="indefinite"/>
                       </p:stCondLst>
                       <p:childTnLst>
                         <p:par>
-                          <p:cTn id="24" fill="hold">
+                          <p:cTn id="23" fill="hold">
                             <p:stCondLst>
                               <p:cond delay="0"/>
                             </p:stCondLst>
                             <p:childTnLst>
                               <p:par>
-                                <p:cTn id="25" presetID="10" presetClass="entr" presetSubtype="0" fill="hold" nodeType="clickEffect">
+                                <p:cTn id="24" presetID="10" presetClass="entr" presetSubtype="0" fill="hold" nodeType="clickEffect">
                                   <p:stCondLst>
                                     <p:cond delay="0"/>
                                   </p:stCondLst>
                                   <p:childTnLst>
                                     <p:set>
                                       <p:cBhvr>
-                                        <p:cTn id="26" dur="1" fill="hold">
+                                        <p:cTn id="25" dur="1" fill="hold">
                                           <p:stCondLst>
                                             <p:cond delay="0"/>
                                           </p:stCondLst>
@@ -17092,7 +17084,7 @@
                                     </p:set>
                                     <p:animEffect transition="in" filter="fade">
                                       <p:cBhvr>
-                                        <p:cTn id="27" dur="500"/>
+                                        <p:cTn id="26" dur="500"/>
                                         <p:tgtEl>
                                           <p:spTgt spid="75"/>
                                         </p:tgtEl>
@@ -17102,14 +17094,14 @@
                                 </p:cTn>
                               </p:par>
                               <p:par>
-                                <p:cTn id="28" presetID="10" presetClass="entr" presetSubtype="0" fill="hold" nodeType="withEffect">
+                                <p:cTn id="27" presetID="10" presetClass="entr" presetSubtype="0" fill="hold" nodeType="withEffect">
                                   <p:stCondLst>
                                     <p:cond delay="0"/>
                                   </p:stCondLst>
                                   <p:childTnLst>
                                     <p:set>
                                       <p:cBhvr>
-                                        <p:cTn id="29" dur="1" fill="hold">
+                                        <p:cTn id="28" dur="1" fill="hold">
                                           <p:stCondLst>
                                             <p:cond delay="0"/>
                                           </p:stCondLst>
@@ -17127,7 +17119,7 @@
                                     </p:set>
                                     <p:animEffect transition="in" filter="fade">
                                       <p:cBhvr>
-                                        <p:cTn id="30" dur="500"/>
+                                        <p:cTn id="29" dur="500"/>
                                         <p:tgtEl>
                                           <p:spTgt spid="78"/>
                                         </p:tgtEl>
@@ -17139,30 +17131,21 @@
                             </p:childTnLst>
                           </p:cTn>
                         </p:par>
-                      </p:childTnLst>
-                    </p:cTn>
-                  </p:par>
-                  <p:par>
-                    <p:cTn id="31" fill="hold">
-                      <p:stCondLst>
-                        <p:cond delay="indefinite"/>
-                      </p:stCondLst>
-                      <p:childTnLst>
                         <p:par>
-                          <p:cTn id="32" fill="hold">
+                          <p:cTn id="30" fill="hold">
                             <p:stCondLst>
-                              <p:cond delay="0"/>
+                              <p:cond delay="500"/>
                             </p:stCondLst>
                             <p:childTnLst>
                               <p:par>
-                                <p:cTn id="33" presetID="10" presetClass="entr" presetSubtype="0" fill="hold" nodeType="clickEffect">
+                                <p:cTn id="31" presetID="10" presetClass="entr" presetSubtype="0" fill="hold" nodeType="afterEffect">
                                   <p:stCondLst>
                                     <p:cond delay="0"/>
                                   </p:stCondLst>
                                   <p:childTnLst>
                                     <p:set>
                                       <p:cBhvr>
-                                        <p:cTn id="34" dur="1" fill="hold">
+                                        <p:cTn id="32" dur="1" fill="hold">
                                           <p:stCondLst>
                                             <p:cond delay="0"/>
                                           </p:stCondLst>
@@ -17180,7 +17163,7 @@
                                     </p:set>
                                     <p:animEffect transition="in" filter="fade">
                                       <p:cBhvr>
-                                        <p:cTn id="35" dur="500"/>
+                                        <p:cTn id="33" dur="500"/>
                                         <p:tgtEl>
                                           <p:spTgt spid="76"/>
                                         </p:tgtEl>
@@ -17190,14 +17173,14 @@
                                 </p:cTn>
                               </p:par>
                               <p:par>
-                                <p:cTn id="36" presetID="10" presetClass="entr" presetSubtype="0" fill="hold" nodeType="withEffect">
+                                <p:cTn id="34" presetID="10" presetClass="entr" presetSubtype="0" fill="hold" nodeType="withEffect">
                                   <p:stCondLst>
                                     <p:cond delay="0"/>
                                   </p:stCondLst>
                                   <p:childTnLst>
                                     <p:set>
                                       <p:cBhvr>
-                                        <p:cTn id="37" dur="1" fill="hold">
+                                        <p:cTn id="35" dur="1" fill="hold">
                                           <p:stCondLst>
                                             <p:cond delay="0"/>
                                           </p:stCondLst>
@@ -17215,7 +17198,7 @@
                                     </p:set>
                                     <p:animEffect transition="in" filter="fade">
                                       <p:cBhvr>
-                                        <p:cTn id="38" dur="500"/>
+                                        <p:cTn id="36" dur="500"/>
                                         <p:tgtEl>
                                           <p:spTgt spid="80"/>
                                         </p:tgtEl>
@@ -17644,30 +17627,21 @@
                             </p:childTnLst>
                           </p:cTn>
                         </p:par>
-                      </p:childTnLst>
-                    </p:cTn>
-                  </p:par>
-                  <p:par>
-                    <p:cTn id="12" fill="hold">
-                      <p:stCondLst>
-                        <p:cond delay="indefinite"/>
-                      </p:stCondLst>
-                      <p:childTnLst>
                         <p:par>
-                          <p:cTn id="13" fill="hold">
+                          <p:cTn id="12" fill="hold">
                             <p:stCondLst>
-                              <p:cond delay="0"/>
+                              <p:cond delay="1000"/>
                             </p:stCondLst>
                             <p:childTnLst>
                               <p:par>
-                                <p:cTn id="14" presetID="10" presetClass="entr" presetSubtype="0" fill="hold" nodeType="clickEffect">
+                                <p:cTn id="13" presetID="10" presetClass="entr" presetSubtype="0" fill="hold" nodeType="afterEffect">
                                   <p:stCondLst>
                                     <p:cond delay="0"/>
                                   </p:stCondLst>
                                   <p:childTnLst>
                                     <p:set>
                                       <p:cBhvr>
-                                        <p:cTn id="15" dur="1" fill="hold">
+                                        <p:cTn id="14" dur="1" fill="hold">
                                           <p:stCondLst>
                                             <p:cond delay="0"/>
                                           </p:stCondLst>
@@ -17685,7 +17659,7 @@
                                     </p:set>
                                     <p:animEffect transition="in" filter="fade">
                                       <p:cBhvr>
-                                        <p:cTn id="16" dur="500"/>
+                                        <p:cTn id="15" dur="500"/>
                                         <p:tgtEl>
                                           <p:spTgt spid="87"/>
                                         </p:tgtEl>
@@ -17697,30 +17671,21 @@
                             </p:childTnLst>
                           </p:cTn>
                         </p:par>
-                      </p:childTnLst>
-                    </p:cTn>
-                  </p:par>
-                  <p:par>
-                    <p:cTn id="17" fill="hold">
-                      <p:stCondLst>
-                        <p:cond delay="indefinite"/>
-                      </p:stCondLst>
-                      <p:childTnLst>
                         <p:par>
-                          <p:cTn id="18" fill="hold">
+                          <p:cTn id="16" fill="hold">
                             <p:stCondLst>
-                              <p:cond delay="0"/>
+                              <p:cond delay="1500"/>
                             </p:stCondLst>
                             <p:childTnLst>
                               <p:par>
-                                <p:cTn id="19" presetID="10" presetClass="entr" presetSubtype="0" fill="hold" nodeType="clickEffect">
+                                <p:cTn id="17" presetID="10" presetClass="entr" presetSubtype="0" fill="hold" nodeType="afterEffect">
                                   <p:stCondLst>
                                     <p:cond delay="0"/>
                                   </p:stCondLst>
                                   <p:childTnLst>
                                     <p:set>
                                       <p:cBhvr>
-                                        <p:cTn id="20" dur="1" fill="hold">
+                                        <p:cTn id="18" dur="1" fill="hold">
                                           <p:stCondLst>
                                             <p:cond delay="0"/>
                                           </p:stCondLst>
@@ -17738,7 +17703,7 @@
                                     </p:set>
                                     <p:animEffect transition="in" filter="fade">
                                       <p:cBhvr>
-                                        <p:cTn id="21" dur="500"/>
+                                        <p:cTn id="19" dur="500"/>
                                         <p:tgtEl>
                                           <p:spTgt spid="88"/>
                                         </p:tgtEl>
@@ -18660,7 +18625,7 @@
         <p:spPr>
           <a:xfrm>
             <a:off x="5987651" y="1952108"/>
-            <a:ext cx="2478600" cy="1727622"/>
+            <a:ext cx="2478600" cy="1640932"/>
           </a:xfrm>
           <a:prstGeom prst="rect">
             <a:avLst/>
@@ -18672,13 +18637,23 @@
           </a:bodyPr>
           <a:lstStyle/>
           <a:p>
-            <a:pPr marL="285750" indent="-285750">
-              <a:spcAft>
-                <a:spcPts val="1600"/>
+            <a:pPr marL="285750" indent="-285750"/>
+            <a:r>
+              <a:rPr lang="en-US" sz="1600" dirty="0"/>
+              <a:t>Best model results</a:t>
+            </a:r>
+          </a:p>
+          <a:p>
+            <a:pPr marL="742950" lvl="1" indent="-285750">
+              <a:spcBef>
+                <a:spcPts val="600"/>
+              </a:spcBef>
+              <a:spcAft>
+                <a:spcPts val="600"/>
               </a:spcAft>
             </a:pPr>
             <a:r>
-              <a:rPr lang="en-US" sz="1600" dirty="0"/>
+              <a:rPr lang="en-US" dirty="0"/>
               <a:t>88% accurate</a:t>
             </a:r>
           </a:p>
@@ -18690,7 +18665,7 @@
             </a:pPr>
             <a:r>
               <a:rPr lang="en-US" sz="1600" dirty="0"/>
-              <a:t>Negatively impacted by imbalanced reservation statuses.</a:t>
+              <a:t>Negatively impacted by imbalance.</a:t>
             </a:r>
             <a:endParaRPr sz="1600" dirty="0"/>
           </a:p>
@@ -19067,24 +19042,15 @@
                                   </p:childTnLst>
                                 </p:cTn>
                               </p:par>
-                            </p:childTnLst>
-                          </p:cTn>
-                        </p:par>
-                        <p:par>
-                          <p:cTn id="15" fill="hold">
-                            <p:stCondLst>
-                              <p:cond delay="1000"/>
-                            </p:stCondLst>
-                            <p:childTnLst>
                               <p:par>
-                                <p:cTn id="16" presetID="10" presetClass="entr" presetSubtype="0" fill="hold" nodeType="afterEffect">
+                                <p:cTn id="15" presetID="10" presetClass="entr" presetSubtype="0" fill="hold" nodeType="withEffect">
                                   <p:stCondLst>
                                     <p:cond delay="0"/>
                                   </p:stCondLst>
                                   <p:childTnLst>
                                     <p:set>
                                       <p:cBhvr>
-                                        <p:cTn id="17" dur="1" fill="hold">
+                                        <p:cTn id="16" dur="1" fill="hold">
                                           <p:stCondLst>
                                             <p:cond delay="0"/>
                                           </p:stCondLst>
@@ -19102,7 +19068,7 @@
                                     </p:set>
                                     <p:animEffect transition="in" filter="fade">
                                       <p:cBhvr>
-                                        <p:cTn id="18" dur="500"/>
+                                        <p:cTn id="17" dur="500"/>
                                         <p:tgtEl>
                                           <p:spTgt spid="110"/>
                                         </p:tgtEl>
@@ -19118,26 +19084,26 @@
                     </p:cTn>
                   </p:par>
                   <p:par>
-                    <p:cTn id="19" fill="hold">
+                    <p:cTn id="18" fill="hold">
                       <p:stCondLst>
                         <p:cond delay="indefinite"/>
                       </p:stCondLst>
                       <p:childTnLst>
                         <p:par>
-                          <p:cTn id="20" fill="hold">
+                          <p:cTn id="19" fill="hold">
                             <p:stCondLst>
                               <p:cond delay="0"/>
                             </p:stCondLst>
                             <p:childTnLst>
                               <p:par>
-                                <p:cTn id="21" presetID="10" presetClass="entr" presetSubtype="0" fill="hold" nodeType="clickEffect">
+                                <p:cTn id="20" presetID="10" presetClass="entr" presetSubtype="0" fill="hold" nodeType="clickEffect">
                                   <p:stCondLst>
                                     <p:cond delay="0"/>
                                   </p:stCondLst>
                                   <p:childTnLst>
                                     <p:set>
                                       <p:cBhvr>
-                                        <p:cTn id="22" dur="1" fill="hold">
+                                        <p:cTn id="21" dur="1" fill="hold">
                                           <p:stCondLst>
                                             <p:cond delay="0"/>
                                           </p:stCondLst>
@@ -19155,7 +19121,7 @@
                                     </p:set>
                                     <p:animEffect transition="in" filter="fade">
                                       <p:cBhvr>
-                                        <p:cTn id="23" dur="500"/>
+                                        <p:cTn id="22" dur="500"/>
                                         <p:tgtEl>
                                           <p:spTgt spid="119"/>
                                         </p:tgtEl>
@@ -19165,14 +19131,14 @@
                                 </p:cTn>
                               </p:par>
                               <p:par>
-                                <p:cTn id="24" presetID="10" presetClass="entr" presetSubtype="0" fill="hold" nodeType="withEffect">
+                                <p:cTn id="23" presetID="10" presetClass="entr" presetSubtype="0" fill="hold" nodeType="withEffect">
                                   <p:stCondLst>
                                     <p:cond delay="0"/>
                                   </p:stCondLst>
                                   <p:childTnLst>
                                     <p:set>
                                       <p:cBhvr>
-                                        <p:cTn id="25" dur="1" fill="hold">
+                                        <p:cTn id="24" dur="1" fill="hold">
                                           <p:stCondLst>
                                             <p:cond delay="0"/>
                                           </p:stCondLst>
@@ -19190,7 +19156,7 @@
                                     </p:set>
                                     <p:animEffect transition="in" filter="fade">
                                       <p:cBhvr>
-                                        <p:cTn id="26" dur="500"/>
+                                        <p:cTn id="25" dur="500"/>
                                         <p:tgtEl>
                                           <p:spTgt spid="116"/>
                                         </p:tgtEl>
@@ -19199,24 +19165,15 @@
                                   </p:childTnLst>
                                 </p:cTn>
                               </p:par>
-                            </p:childTnLst>
-                          </p:cTn>
-                        </p:par>
-                        <p:par>
-                          <p:cTn id="27" fill="hold">
-                            <p:stCondLst>
-                              <p:cond delay="500"/>
-                            </p:stCondLst>
-                            <p:childTnLst>
                               <p:par>
-                                <p:cTn id="28" presetID="10" presetClass="entr" presetSubtype="0" fill="hold" nodeType="afterEffect">
+                                <p:cTn id="26" presetID="10" presetClass="entr" presetSubtype="0" fill="hold" nodeType="withEffect">
                                   <p:stCondLst>
                                     <p:cond delay="0"/>
                                   </p:stCondLst>
                                   <p:childTnLst>
                                     <p:set>
                                       <p:cBhvr>
-                                        <p:cTn id="29" dur="1" fill="hold">
+                                        <p:cTn id="27" dur="1" fill="hold">
                                           <p:stCondLst>
                                             <p:cond delay="0"/>
                                           </p:stCondLst>
@@ -19234,7 +19191,7 @@
                                     </p:set>
                                     <p:animEffect transition="in" filter="fade">
                                       <p:cBhvr>
-                                        <p:cTn id="30" dur="500"/>
+                                        <p:cTn id="28" dur="500"/>
                                         <p:tgtEl>
                                           <p:spTgt spid="120"/>
                                         </p:tgtEl>
@@ -19250,26 +19207,26 @@
                     </p:cTn>
                   </p:par>
                   <p:par>
-                    <p:cTn id="31" fill="hold">
+                    <p:cTn id="29" fill="hold">
                       <p:stCondLst>
                         <p:cond delay="indefinite"/>
                       </p:stCondLst>
                       <p:childTnLst>
                         <p:par>
-                          <p:cTn id="32" fill="hold">
+                          <p:cTn id="30" fill="hold">
                             <p:stCondLst>
                               <p:cond delay="0"/>
                             </p:stCondLst>
                             <p:childTnLst>
                               <p:par>
-                                <p:cTn id="33" presetID="10" presetClass="entr" presetSubtype="0" fill="hold" nodeType="clickEffect">
+                                <p:cTn id="31" presetID="10" presetClass="entr" presetSubtype="0" fill="hold" nodeType="clickEffect">
                                   <p:stCondLst>
                                     <p:cond delay="0"/>
                                   </p:stCondLst>
                                   <p:childTnLst>
                                     <p:set>
                                       <p:cBhvr>
-                                        <p:cTn id="34" dur="1" fill="hold">
+                                        <p:cTn id="32" dur="1" fill="hold">
                                           <p:stCondLst>
                                             <p:cond delay="0"/>
                                           </p:stCondLst>
@@ -19287,7 +19244,7 @@
                                     </p:set>
                                     <p:animEffect transition="in" filter="fade">
                                       <p:cBhvr>
-                                        <p:cTn id="35" dur="500"/>
+                                        <p:cTn id="33" dur="500"/>
                                         <p:tgtEl>
                                           <p:spTgt spid="114"/>
                                         </p:tgtEl>
@@ -19297,14 +19254,14 @@
                                 </p:cTn>
                               </p:par>
                               <p:par>
-                                <p:cTn id="36" presetID="10" presetClass="entr" presetSubtype="0" fill="hold" nodeType="withEffect">
+                                <p:cTn id="34" presetID="10" presetClass="entr" presetSubtype="0" fill="hold" nodeType="withEffect">
                                   <p:stCondLst>
                                     <p:cond delay="0"/>
                                   </p:stCondLst>
                                   <p:childTnLst>
                                     <p:set>
                                       <p:cBhvr>
-                                        <p:cTn id="37" dur="1" fill="hold">
+                                        <p:cTn id="35" dur="1" fill="hold">
                                           <p:stCondLst>
                                             <p:cond delay="0"/>
                                           </p:stCondLst>
@@ -19322,7 +19279,7 @@
                                     </p:set>
                                     <p:animEffect transition="in" filter="fade">
                                       <p:cBhvr>
-                                        <p:cTn id="38" dur="500"/>
+                                        <p:cTn id="36" dur="500"/>
                                         <p:tgtEl>
                                           <p:spTgt spid="111"/>
                                         </p:tgtEl>
@@ -19331,24 +19288,15 @@
                                   </p:childTnLst>
                                 </p:cTn>
                               </p:par>
-                            </p:childTnLst>
-                          </p:cTn>
-                        </p:par>
-                        <p:par>
-                          <p:cTn id="39" fill="hold">
-                            <p:stCondLst>
-                              <p:cond delay="500"/>
-                            </p:stCondLst>
-                            <p:childTnLst>
                               <p:par>
-                                <p:cTn id="40" presetID="10" presetClass="entr" presetSubtype="0" fill="hold" nodeType="afterEffect">
+                                <p:cTn id="37" presetID="10" presetClass="entr" presetSubtype="0" fill="hold" nodeType="withEffect">
                                   <p:stCondLst>
                                     <p:cond delay="0"/>
                                   </p:stCondLst>
                                   <p:childTnLst>
                                     <p:set>
                                       <p:cBhvr>
-                                        <p:cTn id="41" dur="1" fill="hold">
+                                        <p:cTn id="38" dur="1" fill="hold">
                                           <p:stCondLst>
                                             <p:cond delay="0"/>
                                           </p:stCondLst>
@@ -19366,7 +19314,7 @@
                                     </p:set>
                                     <p:animEffect transition="in" filter="fade">
                                       <p:cBhvr>
-                                        <p:cTn id="42" dur="500"/>
+                                        <p:cTn id="39" dur="500"/>
                                         <p:tgtEl>
                                           <p:spTgt spid="115"/>
                                         </p:tgtEl>

</xml_diff>